<commit_message>
Allowed for adding titles to image slides
</commit_message>
<xml_diff>
--- a/data/powerpoint/template.pptx
+++ b/data/powerpoint/template.pptx
@@ -4,6 +4,9 @@
   <p:sldMasterIdLst>
     <p:sldMasterId id="2147483672" r:id="rId1"/>
   </p:sldMasterIdLst>
+  <p:notesMasterIdLst>
+    <p:notesMasterId r:id="rId2"/>
+  </p:notesMasterIdLst>
   <p:sldSz cx="12192000" cy="6858000"/>
   <p:notesSz cx="6858000" cy="9144000"/>
   <p:defaultTextStyle>
@@ -101,7 +104,362 @@
       </a:defRPr>
     </a:lvl9pPr>
   </p:defaultTextStyle>
+  <p:extLst>
+    <p:ext uri="{EFAFB233-063F-42B5-8137-9DF3F51BA10A}">
+      <p15:sldGuideLst xmlns:p15="http://schemas.microsoft.com/office/powerpoint/2012/main"/>
+    </p:ext>
+  </p:extLst>
 </p:presentation>
+</file>
+
+<file path=ppt/notesMasters/notesMaster1.xml><?xml version="1.0" encoding="utf-8"?>
+<p:notesMaster xmlns:a="http://schemas.openxmlformats.org/drawingml/2006/main" xmlns:r="http://schemas.openxmlformats.org/officeDocument/2006/relationships" xmlns:p="http://schemas.openxmlformats.org/presentationml/2006/main">
+  <p:cSld>
+    <p:bg>
+      <p:bgRef idx="1001">
+        <a:schemeClr val="bg1"/>
+      </p:bgRef>
+    </p:bg>
+    <p:spTree>
+      <p:nvGrpSpPr>
+        <p:cNvPr id="1" name=""/>
+        <p:cNvGrpSpPr/>
+        <p:nvPr/>
+      </p:nvGrpSpPr>
+      <p:grpSpPr>
+        <a:xfrm>
+          <a:off x="0" y="0"/>
+          <a:ext cx="0" cy="0"/>
+          <a:chOff x="0" y="0"/>
+          <a:chExt cx="0" cy="0"/>
+        </a:xfrm>
+      </p:grpSpPr>
+      <p:sp>
+        <p:nvSpPr>
+          <p:cNvPr id="2" name="Tijdelijke aanduiding voor koptekst 1"/>
+          <p:cNvSpPr>
+            <a:spLocks noGrp="1"/>
+          </p:cNvSpPr>
+          <p:nvPr>
+            <p:ph type="hdr" sz="quarter"/>
+          </p:nvPr>
+        </p:nvSpPr>
+        <p:spPr>
+          <a:xfrm>
+            <a:off x="0" y="0"/>
+            <a:ext cx="2971800" cy="458788"/>
+          </a:xfrm>
+          <a:prstGeom prst="rect">
+            <a:avLst/>
+          </a:prstGeom>
+        </p:spPr>
+        <p:txBody>
+          <a:bodyPr vert="horz" lIns="91440" tIns="45720" rIns="91440" bIns="45720" rtlCol="0"/>
+          <a:lstStyle>
+            <a:lvl1pPr algn="l">
+              <a:defRPr sz="1200"/>
+            </a:lvl1pPr>
+          </a:lstStyle>
+          <a:p>
+            <a:endParaRPr lang="en-GB"/>
+          </a:p>
+        </p:txBody>
+      </p:sp>
+      <p:sp>
+        <p:nvSpPr>
+          <p:cNvPr id="3" name="Tijdelijke aanduiding voor datum 2"/>
+          <p:cNvSpPr>
+            <a:spLocks noGrp="1"/>
+          </p:cNvSpPr>
+          <p:nvPr>
+            <p:ph type="dt" idx="1"/>
+          </p:nvPr>
+        </p:nvSpPr>
+        <p:spPr>
+          <a:xfrm>
+            <a:off x="3884613" y="0"/>
+            <a:ext cx="2971800" cy="458788"/>
+          </a:xfrm>
+          <a:prstGeom prst="rect">
+            <a:avLst/>
+          </a:prstGeom>
+        </p:spPr>
+        <p:txBody>
+          <a:bodyPr vert="horz" lIns="91440" tIns="45720" rIns="91440" bIns="45720" rtlCol="0"/>
+          <a:lstStyle>
+            <a:lvl1pPr algn="r">
+              <a:defRPr sz="1200"/>
+            </a:lvl1pPr>
+          </a:lstStyle>
+          <a:p>
+            <a:fld id="{FEE386D4-E0F5-48ED-B382-C5D6AB88A5B0}" type="datetimeFigureOut">
+              <a:rPr lang="en-GB" smtClean="0"/>
+              <a:t>22/07/2018</a:t>
+            </a:fld>
+            <a:endParaRPr lang="en-GB"/>
+          </a:p>
+        </p:txBody>
+      </p:sp>
+      <p:sp>
+        <p:nvSpPr>
+          <p:cNvPr id="4" name="Tijdelijke aanduiding voor dia-afbeelding 3"/>
+          <p:cNvSpPr>
+            <a:spLocks noGrp="1" noRot="1" noChangeAspect="1"/>
+          </p:cNvSpPr>
+          <p:nvPr>
+            <p:ph type="sldImg" idx="2"/>
+          </p:nvPr>
+        </p:nvSpPr>
+        <p:spPr>
+          <a:xfrm>
+            <a:off x="685800" y="1143000"/>
+            <a:ext cx="5486400" cy="3086100"/>
+          </a:xfrm>
+          <a:prstGeom prst="rect">
+            <a:avLst/>
+          </a:prstGeom>
+          <a:noFill/>
+          <a:ln w="12700">
+            <a:solidFill>
+              <a:prstClr val="black"/>
+            </a:solidFill>
+          </a:ln>
+        </p:spPr>
+        <p:txBody>
+          <a:bodyPr vert="horz" lIns="91440" tIns="45720" rIns="91440" bIns="45720" rtlCol="0" anchor="ctr"/>
+          <a:lstStyle/>
+          <a:p>
+            <a:endParaRPr lang="en-GB"/>
+          </a:p>
+        </p:txBody>
+      </p:sp>
+      <p:sp>
+        <p:nvSpPr>
+          <p:cNvPr id="5" name="Tijdelijke aanduiding voor notities 4"/>
+          <p:cNvSpPr>
+            <a:spLocks noGrp="1"/>
+          </p:cNvSpPr>
+          <p:nvPr>
+            <p:ph type="body" sz="quarter" idx="3"/>
+          </p:nvPr>
+        </p:nvSpPr>
+        <p:spPr>
+          <a:xfrm>
+            <a:off x="685800" y="4400550"/>
+            <a:ext cx="5486400" cy="3600450"/>
+          </a:xfrm>
+          <a:prstGeom prst="rect">
+            <a:avLst/>
+          </a:prstGeom>
+        </p:spPr>
+        <p:txBody>
+          <a:bodyPr vert="horz" lIns="91440" tIns="45720" rIns="91440" bIns="45720" rtlCol="0"/>
+          <a:lstStyle/>
+          <a:p>
+            <a:pPr lvl="0"/>
+            <a:r>
+              <a:rPr lang="nl-NL"/>
+              <a:t>Tekststijl van het model bewerken</a:t>
+            </a:r>
+          </a:p>
+          <a:p>
+            <a:pPr lvl="1"/>
+            <a:r>
+              <a:rPr lang="nl-NL"/>
+              <a:t>Tweede niveau</a:t>
+            </a:r>
+          </a:p>
+          <a:p>
+            <a:pPr lvl="2"/>
+            <a:r>
+              <a:rPr lang="nl-NL"/>
+              <a:t>Derde niveau</a:t>
+            </a:r>
+          </a:p>
+          <a:p>
+            <a:pPr lvl="3"/>
+            <a:r>
+              <a:rPr lang="nl-NL"/>
+              <a:t>Vierde niveau</a:t>
+            </a:r>
+          </a:p>
+          <a:p>
+            <a:pPr lvl="4"/>
+            <a:r>
+              <a:rPr lang="nl-NL"/>
+              <a:t>Vijfde niveau</a:t>
+            </a:r>
+            <a:endParaRPr lang="en-GB"/>
+          </a:p>
+        </p:txBody>
+      </p:sp>
+      <p:sp>
+        <p:nvSpPr>
+          <p:cNvPr id="6" name="Tijdelijke aanduiding voor voettekst 5"/>
+          <p:cNvSpPr>
+            <a:spLocks noGrp="1"/>
+          </p:cNvSpPr>
+          <p:nvPr>
+            <p:ph type="ftr" sz="quarter" idx="4"/>
+          </p:nvPr>
+        </p:nvSpPr>
+        <p:spPr>
+          <a:xfrm>
+            <a:off x="0" y="8685213"/>
+            <a:ext cx="2971800" cy="458787"/>
+          </a:xfrm>
+          <a:prstGeom prst="rect">
+            <a:avLst/>
+          </a:prstGeom>
+        </p:spPr>
+        <p:txBody>
+          <a:bodyPr vert="horz" lIns="91440" tIns="45720" rIns="91440" bIns="45720" rtlCol="0" anchor="b"/>
+          <a:lstStyle>
+            <a:lvl1pPr algn="l">
+              <a:defRPr sz="1200"/>
+            </a:lvl1pPr>
+          </a:lstStyle>
+          <a:p>
+            <a:endParaRPr lang="en-GB"/>
+          </a:p>
+        </p:txBody>
+      </p:sp>
+      <p:sp>
+        <p:nvSpPr>
+          <p:cNvPr id="7" name="Tijdelijke aanduiding voor dianummer 6"/>
+          <p:cNvSpPr>
+            <a:spLocks noGrp="1"/>
+          </p:cNvSpPr>
+          <p:nvPr>
+            <p:ph type="sldNum" sz="quarter" idx="5"/>
+          </p:nvPr>
+        </p:nvSpPr>
+        <p:spPr>
+          <a:xfrm>
+            <a:off x="3884613" y="8685213"/>
+            <a:ext cx="2971800" cy="458787"/>
+          </a:xfrm>
+          <a:prstGeom prst="rect">
+            <a:avLst/>
+          </a:prstGeom>
+        </p:spPr>
+        <p:txBody>
+          <a:bodyPr vert="horz" lIns="91440" tIns="45720" rIns="91440" bIns="45720" rtlCol="0" anchor="b"/>
+          <a:lstStyle>
+            <a:lvl1pPr algn="r">
+              <a:defRPr sz="1200"/>
+            </a:lvl1pPr>
+          </a:lstStyle>
+          <a:p>
+            <a:fld id="{1CBEF53D-F467-4724-8C38-3F4795731E32}" type="slidenum">
+              <a:rPr lang="en-GB" smtClean="0"/>
+              <a:t>‹nr.›</a:t>
+            </a:fld>
+            <a:endParaRPr lang="en-GB"/>
+          </a:p>
+        </p:txBody>
+      </p:sp>
+    </p:spTree>
+    <p:extLst>
+      <p:ext uri="{BB962C8B-B14F-4D97-AF65-F5344CB8AC3E}">
+        <p14:creationId xmlns:p14="http://schemas.microsoft.com/office/powerpoint/2010/main" val="1672840071"/>
+      </p:ext>
+    </p:extLst>
+  </p:cSld>
+  <p:clrMap bg1="lt1" tx1="dk1" bg2="lt2" tx2="dk2" accent1="accent1" accent2="accent2" accent3="accent3" accent4="accent4" accent5="accent5" accent6="accent6" hlink="hlink" folHlink="folHlink"/>
+  <p:notesStyle>
+    <a:lvl1pPr marL="0" algn="l" defTabSz="914400" rtl="0" eaLnBrk="1" latinLnBrk="0" hangingPunct="1">
+      <a:defRPr sz="1200" kern="1200">
+        <a:solidFill>
+          <a:schemeClr val="tx1"/>
+        </a:solidFill>
+        <a:latin typeface="+mn-lt"/>
+        <a:ea typeface="+mn-ea"/>
+        <a:cs typeface="+mn-cs"/>
+      </a:defRPr>
+    </a:lvl1pPr>
+    <a:lvl2pPr marL="457200" algn="l" defTabSz="914400" rtl="0" eaLnBrk="1" latinLnBrk="0" hangingPunct="1">
+      <a:defRPr sz="1200" kern="1200">
+        <a:solidFill>
+          <a:schemeClr val="tx1"/>
+        </a:solidFill>
+        <a:latin typeface="+mn-lt"/>
+        <a:ea typeface="+mn-ea"/>
+        <a:cs typeface="+mn-cs"/>
+      </a:defRPr>
+    </a:lvl2pPr>
+    <a:lvl3pPr marL="914400" algn="l" defTabSz="914400" rtl="0" eaLnBrk="1" latinLnBrk="0" hangingPunct="1">
+      <a:defRPr sz="1200" kern="1200">
+        <a:solidFill>
+          <a:schemeClr val="tx1"/>
+        </a:solidFill>
+        <a:latin typeface="+mn-lt"/>
+        <a:ea typeface="+mn-ea"/>
+        <a:cs typeface="+mn-cs"/>
+      </a:defRPr>
+    </a:lvl3pPr>
+    <a:lvl4pPr marL="1371600" algn="l" defTabSz="914400" rtl="0" eaLnBrk="1" latinLnBrk="0" hangingPunct="1">
+      <a:defRPr sz="1200" kern="1200">
+        <a:solidFill>
+          <a:schemeClr val="tx1"/>
+        </a:solidFill>
+        <a:latin typeface="+mn-lt"/>
+        <a:ea typeface="+mn-ea"/>
+        <a:cs typeface="+mn-cs"/>
+      </a:defRPr>
+    </a:lvl4pPr>
+    <a:lvl5pPr marL="1828800" algn="l" defTabSz="914400" rtl="0" eaLnBrk="1" latinLnBrk="0" hangingPunct="1">
+      <a:defRPr sz="1200" kern="1200">
+        <a:solidFill>
+          <a:schemeClr val="tx1"/>
+        </a:solidFill>
+        <a:latin typeface="+mn-lt"/>
+        <a:ea typeface="+mn-ea"/>
+        <a:cs typeface="+mn-cs"/>
+      </a:defRPr>
+    </a:lvl5pPr>
+    <a:lvl6pPr marL="2286000" algn="l" defTabSz="914400" rtl="0" eaLnBrk="1" latinLnBrk="0" hangingPunct="1">
+      <a:defRPr sz="1200" kern="1200">
+        <a:solidFill>
+          <a:schemeClr val="tx1"/>
+        </a:solidFill>
+        <a:latin typeface="+mn-lt"/>
+        <a:ea typeface="+mn-ea"/>
+        <a:cs typeface="+mn-cs"/>
+      </a:defRPr>
+    </a:lvl6pPr>
+    <a:lvl7pPr marL="2743200" algn="l" defTabSz="914400" rtl="0" eaLnBrk="1" latinLnBrk="0" hangingPunct="1">
+      <a:defRPr sz="1200" kern="1200">
+        <a:solidFill>
+          <a:schemeClr val="tx1"/>
+        </a:solidFill>
+        <a:latin typeface="+mn-lt"/>
+        <a:ea typeface="+mn-ea"/>
+        <a:cs typeface="+mn-cs"/>
+      </a:defRPr>
+    </a:lvl7pPr>
+    <a:lvl8pPr marL="3200400" algn="l" defTabSz="914400" rtl="0" eaLnBrk="1" latinLnBrk="0" hangingPunct="1">
+      <a:defRPr sz="1200" kern="1200">
+        <a:solidFill>
+          <a:schemeClr val="tx1"/>
+        </a:solidFill>
+        <a:latin typeface="+mn-lt"/>
+        <a:ea typeface="+mn-ea"/>
+        <a:cs typeface="+mn-cs"/>
+      </a:defRPr>
+    </a:lvl8pPr>
+    <a:lvl9pPr marL="3657600" algn="l" defTabSz="914400" rtl="0" eaLnBrk="1" latinLnBrk="0" hangingPunct="1">
+      <a:defRPr sz="1200" kern="1200">
+        <a:solidFill>
+          <a:schemeClr val="tx1"/>
+        </a:solidFill>
+        <a:latin typeface="+mn-lt"/>
+        <a:ea typeface="+mn-ea"/>
+        <a:cs typeface="+mn-cs"/>
+      </a:defRPr>
+    </a:lvl9pPr>
+  </p:notesStyle>
+</p:notesMaster>
 </file>
 
 <file path=ppt/slideLayouts/slideLayout1.xml><?xml version="1.0" encoding="utf-8"?>
@@ -235,7 +593,7 @@
           <a:p>
             <a:fld id="{09E22B56-B39A-4609-ACAF-221672A708D5}" type="datetimeFigureOut">
               <a:rPr lang="en-GB" smtClean="0"/>
-              <a:t>06/07/2018</a:t>
+              <a:t>22/07/2018</a:t>
             </a:fld>
             <a:endParaRPr lang="en-GB"/>
           </a:p>
@@ -405,7 +763,7 @@
           <a:p>
             <a:fld id="{09E22B56-B39A-4609-ACAF-221672A708D5}" type="datetimeFigureOut">
               <a:rPr lang="en-GB" smtClean="0"/>
-              <a:t>06/07/2018</a:t>
+              <a:t>22/07/2018</a:t>
             </a:fld>
             <a:endParaRPr lang="en-GB"/>
           </a:p>
@@ -585,7 +943,7 @@
           <a:p>
             <a:fld id="{09E22B56-B39A-4609-ACAF-221672A708D5}" type="datetimeFigureOut">
               <a:rPr lang="en-GB" smtClean="0"/>
-              <a:t>06/07/2018</a:t>
+              <a:t>22/07/2018</a:t>
             </a:fld>
             <a:endParaRPr lang="en-GB"/>
           </a:p>
@@ -637,6 +995,195 @@
     <p:extLst>
       <p:ext uri="{BB962C8B-B14F-4D97-AF65-F5344CB8AC3E}">
         <p14:creationId xmlns:p14="http://schemas.microsoft.com/office/powerpoint/2010/main" val="707697017"/>
+      </p:ext>
+    </p:extLst>
+  </p:cSld>
+  <p:clrMapOvr>
+    <a:masterClrMapping/>
+  </p:clrMapOvr>
+</p:sldLayout>
+</file>
+
+<file path=ppt/slideLayouts/slideLayout12.xml><?xml version="1.0" encoding="utf-8"?>
+<p:sldLayout xmlns:a="http://schemas.openxmlformats.org/drawingml/2006/main" xmlns:r="http://schemas.openxmlformats.org/officeDocument/2006/relationships" xmlns:p="http://schemas.openxmlformats.org/presentationml/2006/main" preserve="1" userDrawn="1">
+  <p:cSld name="1_Alleen titel">
+    <p:spTree>
+      <p:nvGrpSpPr>
+        <p:cNvPr id="1" name=""/>
+        <p:cNvGrpSpPr/>
+        <p:nvPr/>
+      </p:nvGrpSpPr>
+      <p:grpSpPr>
+        <a:xfrm>
+          <a:off x="0" y="0"/>
+          <a:ext cx="0" cy="0"/>
+          <a:chOff x="0" y="0"/>
+          <a:chExt cx="0" cy="0"/>
+        </a:xfrm>
+      </p:grpSpPr>
+      <p:sp>
+        <p:nvSpPr>
+          <p:cNvPr id="2" name="Title 1"/>
+          <p:cNvSpPr>
+            <a:spLocks noGrp="1"/>
+          </p:cNvSpPr>
+          <p:nvPr>
+            <p:ph type="title"/>
+          </p:nvPr>
+        </p:nvSpPr>
+        <p:spPr/>
+        <p:txBody>
+          <a:bodyPr/>
+          <a:lstStyle/>
+          <a:p>
+            <a:r>
+              <a:rPr lang="nl-NL"/>
+              <a:t>Klik om stijl te bewerken</a:t>
+            </a:r>
+            <a:endParaRPr lang="en-US" dirty="0"/>
+          </a:p>
+        </p:txBody>
+      </p:sp>
+      <p:sp>
+        <p:nvSpPr>
+          <p:cNvPr id="3" name="Date Placeholder 2"/>
+          <p:cNvSpPr>
+            <a:spLocks noGrp="1"/>
+          </p:cNvSpPr>
+          <p:nvPr>
+            <p:ph type="dt" sz="half" idx="10"/>
+          </p:nvPr>
+        </p:nvSpPr>
+        <p:spPr/>
+        <p:txBody>
+          <a:bodyPr/>
+          <a:lstStyle/>
+          <a:p>
+            <a:fld id="{09E22B56-B39A-4609-ACAF-221672A708D5}" type="datetimeFigureOut">
+              <a:rPr lang="en-GB" smtClean="0"/>
+              <a:t>22/07/2018</a:t>
+            </a:fld>
+            <a:endParaRPr lang="en-GB"/>
+          </a:p>
+        </p:txBody>
+      </p:sp>
+      <p:sp>
+        <p:nvSpPr>
+          <p:cNvPr id="4" name="Footer Placeholder 3"/>
+          <p:cNvSpPr>
+            <a:spLocks noGrp="1"/>
+          </p:cNvSpPr>
+          <p:nvPr>
+            <p:ph type="ftr" sz="quarter" idx="11"/>
+          </p:nvPr>
+        </p:nvSpPr>
+        <p:spPr/>
+        <p:txBody>
+          <a:bodyPr/>
+          <a:lstStyle/>
+          <a:p>
+            <a:endParaRPr lang="en-GB"/>
+          </a:p>
+        </p:txBody>
+      </p:sp>
+      <p:sp>
+        <p:nvSpPr>
+          <p:cNvPr id="5" name="Slide Number Placeholder 4"/>
+          <p:cNvSpPr>
+            <a:spLocks noGrp="1"/>
+          </p:cNvSpPr>
+          <p:nvPr>
+            <p:ph type="sldNum" sz="quarter" idx="12"/>
+          </p:nvPr>
+        </p:nvSpPr>
+        <p:spPr/>
+        <p:txBody>
+          <a:bodyPr/>
+          <a:lstStyle/>
+          <a:p>
+            <a:fld id="{1F469EBC-A649-4E3E-8046-4745AB923F3E}" type="slidenum">
+              <a:rPr lang="en-GB" smtClean="0"/>
+              <a:t>‹nr.›</a:t>
+            </a:fld>
+            <a:endParaRPr lang="en-GB"/>
+          </a:p>
+        </p:txBody>
+      </p:sp>
+      <p:sp>
+        <p:nvSpPr>
+          <p:cNvPr id="6" name="Picture Placeholder 2">
+            <a:extLst>
+              <a:ext uri="{FF2B5EF4-FFF2-40B4-BE49-F238E27FC236}">
+                <a16:creationId xmlns:a16="http://schemas.microsoft.com/office/drawing/2014/main" id="{54D98500-8BFE-41C0-AD24-5C91F459200F}"/>
+              </a:ext>
+            </a:extLst>
+          </p:cNvPr>
+          <p:cNvSpPr>
+            <a:spLocks noGrp="1" noChangeAspect="1"/>
+          </p:cNvSpPr>
+          <p:nvPr>
+            <p:ph type="pic" idx="1"/>
+          </p:nvPr>
+        </p:nvSpPr>
+        <p:spPr>
+          <a:xfrm>
+            <a:off x="0" y="0"/>
+            <a:ext cx="12192000" cy="6858000"/>
+          </a:xfrm>
+        </p:spPr>
+        <p:txBody>
+          <a:bodyPr anchor="t"/>
+          <a:lstStyle>
+            <a:lvl1pPr marL="0" indent="0">
+              <a:buNone/>
+              <a:defRPr sz="3200"/>
+            </a:lvl1pPr>
+            <a:lvl2pPr marL="457200" indent="0">
+              <a:buNone/>
+              <a:defRPr sz="2800"/>
+            </a:lvl2pPr>
+            <a:lvl3pPr marL="914400" indent="0">
+              <a:buNone/>
+              <a:defRPr sz="2400"/>
+            </a:lvl3pPr>
+            <a:lvl4pPr marL="1371600" indent="0">
+              <a:buNone/>
+              <a:defRPr sz="2000"/>
+            </a:lvl4pPr>
+            <a:lvl5pPr marL="1828800" indent="0">
+              <a:buNone/>
+              <a:defRPr sz="2000"/>
+            </a:lvl5pPr>
+            <a:lvl6pPr marL="2286000" indent="0">
+              <a:buNone/>
+              <a:defRPr sz="2000"/>
+            </a:lvl6pPr>
+            <a:lvl7pPr marL="2743200" indent="0">
+              <a:buNone/>
+              <a:defRPr sz="2000"/>
+            </a:lvl7pPr>
+            <a:lvl8pPr marL="3200400" indent="0">
+              <a:buNone/>
+              <a:defRPr sz="2000"/>
+            </a:lvl8pPr>
+            <a:lvl9pPr marL="3657600" indent="0">
+              <a:buNone/>
+              <a:defRPr sz="2000"/>
+            </a:lvl9pPr>
+          </a:lstStyle>
+          <a:p>
+            <a:r>
+              <a:rPr lang="nl-NL"/>
+              <a:t>Klik op het pictogram als u een afbeelding wilt toevoegen</a:t>
+            </a:r>
+            <a:endParaRPr lang="en-US" dirty="0"/>
+          </a:p>
+        </p:txBody>
+      </p:sp>
+    </p:spTree>
+    <p:extLst>
+      <p:ext uri="{BB962C8B-B14F-4D97-AF65-F5344CB8AC3E}">
+        <p14:creationId xmlns:p14="http://schemas.microsoft.com/office/powerpoint/2010/main" val="1891384512"/>
       </p:ext>
     </p:extLst>
   </p:cSld>
@@ -755,7 +1302,7 @@
           <a:p>
             <a:fld id="{09E22B56-B39A-4609-ACAF-221672A708D5}" type="datetimeFigureOut">
               <a:rPr lang="en-GB" smtClean="0"/>
-              <a:t>06/07/2018</a:t>
+              <a:t>22/07/2018</a:t>
             </a:fld>
             <a:endParaRPr lang="en-GB"/>
           </a:p>
@@ -1001,7 +1548,7 @@
           <a:p>
             <a:fld id="{09E22B56-B39A-4609-ACAF-221672A708D5}" type="datetimeFigureOut">
               <a:rPr lang="en-GB" smtClean="0"/>
-              <a:t>06/07/2018</a:t>
+              <a:t>22/07/2018</a:t>
             </a:fld>
             <a:endParaRPr lang="en-GB"/>
           </a:p>
@@ -1233,7 +1780,7 @@
           <a:p>
             <a:fld id="{09E22B56-B39A-4609-ACAF-221672A708D5}" type="datetimeFigureOut">
               <a:rPr lang="en-GB" smtClean="0"/>
-              <a:t>06/07/2018</a:t>
+              <a:t>22/07/2018</a:t>
             </a:fld>
             <a:endParaRPr lang="en-GB"/>
           </a:p>
@@ -1600,7 +2147,7 @@
           <a:p>
             <a:fld id="{09E22B56-B39A-4609-ACAF-221672A708D5}" type="datetimeFigureOut">
               <a:rPr lang="en-GB" smtClean="0"/>
-              <a:t>06/07/2018</a:t>
+              <a:t>22/07/2018</a:t>
             </a:fld>
             <a:endParaRPr lang="en-GB"/>
           </a:p>
@@ -1718,7 +2265,7 @@
           <a:p>
             <a:fld id="{09E22B56-B39A-4609-ACAF-221672A708D5}" type="datetimeFigureOut">
               <a:rPr lang="en-GB" smtClean="0"/>
-              <a:t>06/07/2018</a:t>
+              <a:t>22/07/2018</a:t>
             </a:fld>
             <a:endParaRPr lang="en-GB"/>
           </a:p>
@@ -1813,7 +2360,7 @@
           <a:p>
             <a:fld id="{09E22B56-B39A-4609-ACAF-221672A708D5}" type="datetimeFigureOut">
               <a:rPr lang="en-GB" smtClean="0"/>
-              <a:t>06/07/2018</a:t>
+              <a:t>22/07/2018</a:t>
             </a:fld>
             <a:endParaRPr lang="en-GB"/>
           </a:p>
@@ -2090,7 +2637,7 @@
           <a:p>
             <a:fld id="{09E22B56-B39A-4609-ACAF-221672A708D5}" type="datetimeFigureOut">
               <a:rPr lang="en-GB" smtClean="0"/>
-              <a:t>06/07/2018</a:t>
+              <a:t>22/07/2018</a:t>
             </a:fld>
             <a:endParaRPr lang="en-GB"/>
           </a:p>
@@ -2347,7 +2894,7 @@
           <a:p>
             <a:fld id="{09E22B56-B39A-4609-ACAF-221672A708D5}" type="datetimeFigureOut">
               <a:rPr lang="en-GB" smtClean="0"/>
-              <a:t>06/07/2018</a:t>
+              <a:t>22/07/2018</a:t>
             </a:fld>
             <a:endParaRPr lang="en-GB"/>
           </a:p>
@@ -2560,7 +3107,7 @@
           <a:p>
             <a:fld id="{09E22B56-B39A-4609-ACAF-221672A708D5}" type="datetimeFigureOut">
               <a:rPr lang="en-GB" smtClean="0"/>
-              <a:t>06/07/2018</a:t>
+              <a:t>22/07/2018</a:t>
             </a:fld>
             <a:endParaRPr lang="en-GB"/>
           </a:p>
@@ -2664,6 +3211,7 @@
     <p:sldLayoutId id="2147483681" r:id="rId9"/>
     <p:sldLayoutId id="2147483682" r:id="rId10"/>
     <p:sldLayoutId id="2147483683" r:id="rId11"/>
+    <p:sldLayoutId id="2147483684" r:id="rId12"/>
   </p:sldLayoutIdLst>
   <p:txStyles>
     <p:titleStyle>
@@ -3207,4 +3755,299 @@
     </a:ext>
   </a:extLst>
 </a:theme>
+</file>
+
+<file path=ppt/theme/theme2.xml><?xml version="1.0" encoding="utf-8"?>
+<a:theme xmlns:a="http://schemas.openxmlformats.org/drawingml/2006/main" name="Kantoorthema">
+  <a:themeElements>
+    <a:clrScheme name="Office">
+      <a:dk1>
+        <a:sysClr val="windowText" lastClr="000000"/>
+      </a:dk1>
+      <a:lt1>
+        <a:sysClr val="window" lastClr="FFFFFF"/>
+      </a:lt1>
+      <a:dk2>
+        <a:srgbClr val="44546A"/>
+      </a:dk2>
+      <a:lt2>
+        <a:srgbClr val="E7E6E6"/>
+      </a:lt2>
+      <a:accent1>
+        <a:srgbClr val="4472C4"/>
+      </a:accent1>
+      <a:accent2>
+        <a:srgbClr val="ED7D31"/>
+      </a:accent2>
+      <a:accent3>
+        <a:srgbClr val="A5A5A5"/>
+      </a:accent3>
+      <a:accent4>
+        <a:srgbClr val="FFC000"/>
+      </a:accent4>
+      <a:accent5>
+        <a:srgbClr val="5B9BD5"/>
+      </a:accent5>
+      <a:accent6>
+        <a:srgbClr val="70AD47"/>
+      </a:accent6>
+      <a:hlink>
+        <a:srgbClr val="0563C1"/>
+      </a:hlink>
+      <a:folHlink>
+        <a:srgbClr val="954F72"/>
+      </a:folHlink>
+    </a:clrScheme>
+    <a:fontScheme name="Office">
+      <a:majorFont>
+        <a:latin typeface="Calibri Light" panose="020F0302020204030204"/>
+        <a:ea typeface=""/>
+        <a:cs typeface=""/>
+        <a:font script="Jpan" typeface="游ゴシック Light"/>
+        <a:font script="Hang" typeface="맑은 고딕"/>
+        <a:font script="Hans" typeface="等线 Light"/>
+        <a:font script="Hant" typeface="新細明體"/>
+        <a:font script="Arab" typeface="Times New Roman"/>
+        <a:font script="Hebr" typeface="Times New Roman"/>
+        <a:font script="Thai" typeface="Angsana New"/>
+        <a:font script="Ethi" typeface="Nyala"/>
+        <a:font script="Beng" typeface="Vrinda"/>
+        <a:font script="Gujr" typeface="Shruti"/>
+        <a:font script="Khmr" typeface="MoolBoran"/>
+        <a:font script="Knda" typeface="Tunga"/>
+        <a:font script="Guru" typeface="Raavi"/>
+        <a:font script="Cans" typeface="Euphemia"/>
+        <a:font script="Cher" typeface="Plantagenet Cherokee"/>
+        <a:font script="Yiii" typeface="Microsoft Yi Baiti"/>
+        <a:font script="Tibt" typeface="Microsoft Himalaya"/>
+        <a:font script="Thaa" typeface="MV Boli"/>
+        <a:font script="Deva" typeface="Mangal"/>
+        <a:font script="Telu" typeface="Gautami"/>
+        <a:font script="Taml" typeface="Latha"/>
+        <a:font script="Syrc" typeface="Estrangelo Edessa"/>
+        <a:font script="Orya" typeface="Kalinga"/>
+        <a:font script="Mlym" typeface="Kartika"/>
+        <a:font script="Laoo" typeface="DokChampa"/>
+        <a:font script="Sinh" typeface="Iskoola Pota"/>
+        <a:font script="Mong" typeface="Mongolian Baiti"/>
+        <a:font script="Viet" typeface="Times New Roman"/>
+        <a:font script="Uigh" typeface="Microsoft Uighur"/>
+        <a:font script="Geor" typeface="Sylfaen"/>
+        <a:font script="Armn" typeface="Arial"/>
+        <a:font script="Bugi" typeface="Leelawadee UI"/>
+        <a:font script="Bopo" typeface="Microsoft JhengHei"/>
+        <a:font script="Java" typeface="Javanese Text"/>
+        <a:font script="Lisu" typeface="Segoe UI"/>
+        <a:font script="Mymr" typeface="Myanmar Text"/>
+        <a:font script="Nkoo" typeface="Ebrima"/>
+        <a:font script="Olck" typeface="Nirmala UI"/>
+        <a:font script="Osma" typeface="Ebrima"/>
+        <a:font script="Phag" typeface="Phagspa"/>
+        <a:font script="Syrn" typeface="Estrangelo Edessa"/>
+        <a:font script="Syrj" typeface="Estrangelo Edessa"/>
+        <a:font script="Syre" typeface="Estrangelo Edessa"/>
+        <a:font script="Sora" typeface="Nirmala UI"/>
+        <a:font script="Tale" typeface="Microsoft Tai Le"/>
+        <a:font script="Talu" typeface="Microsoft New Tai Lue"/>
+        <a:font script="Tfng" typeface="Ebrima"/>
+      </a:majorFont>
+      <a:minorFont>
+        <a:latin typeface="Calibri" panose="020F0502020204030204"/>
+        <a:ea typeface=""/>
+        <a:cs typeface=""/>
+        <a:font script="Jpan" typeface="游ゴシック"/>
+        <a:font script="Hang" typeface="맑은 고딕"/>
+        <a:font script="Hans" typeface="等线"/>
+        <a:font script="Hant" typeface="新細明體"/>
+        <a:font script="Arab" typeface="Arial"/>
+        <a:font script="Hebr" typeface="Arial"/>
+        <a:font script="Thai" typeface="Cordia New"/>
+        <a:font script="Ethi" typeface="Nyala"/>
+        <a:font script="Beng" typeface="Vrinda"/>
+        <a:font script="Gujr" typeface="Shruti"/>
+        <a:font script="Khmr" typeface="DaunPenh"/>
+        <a:font script="Knda" typeface="Tunga"/>
+        <a:font script="Guru" typeface="Raavi"/>
+        <a:font script="Cans" typeface="Euphemia"/>
+        <a:font script="Cher" typeface="Plantagenet Cherokee"/>
+        <a:font script="Yiii" typeface="Microsoft Yi Baiti"/>
+        <a:font script="Tibt" typeface="Microsoft Himalaya"/>
+        <a:font script="Thaa" typeface="MV Boli"/>
+        <a:font script="Deva" typeface="Mangal"/>
+        <a:font script="Telu" typeface="Gautami"/>
+        <a:font script="Taml" typeface="Latha"/>
+        <a:font script="Syrc" typeface="Estrangelo Edessa"/>
+        <a:font script="Orya" typeface="Kalinga"/>
+        <a:font script="Mlym" typeface="Kartika"/>
+        <a:font script="Laoo" typeface="DokChampa"/>
+        <a:font script="Sinh" typeface="Iskoola Pota"/>
+        <a:font script="Mong" typeface="Mongolian Baiti"/>
+        <a:font script="Viet" typeface="Arial"/>
+        <a:font script="Uigh" typeface="Microsoft Uighur"/>
+        <a:font script="Geor" typeface="Sylfaen"/>
+        <a:font script="Armn" typeface="Arial"/>
+        <a:font script="Bugi" typeface="Leelawadee UI"/>
+        <a:font script="Bopo" typeface="Microsoft JhengHei"/>
+        <a:font script="Java" typeface="Javanese Text"/>
+        <a:font script="Lisu" typeface="Segoe UI"/>
+        <a:font script="Mymr" typeface="Myanmar Text"/>
+        <a:font script="Nkoo" typeface="Ebrima"/>
+        <a:font script="Olck" typeface="Nirmala UI"/>
+        <a:font script="Osma" typeface="Ebrima"/>
+        <a:font script="Phag" typeface="Phagspa"/>
+        <a:font script="Syrn" typeface="Estrangelo Edessa"/>
+        <a:font script="Syrj" typeface="Estrangelo Edessa"/>
+        <a:font script="Syre" typeface="Estrangelo Edessa"/>
+        <a:font script="Sora" typeface="Nirmala UI"/>
+        <a:font script="Tale" typeface="Microsoft Tai Le"/>
+        <a:font script="Talu" typeface="Microsoft New Tai Lue"/>
+        <a:font script="Tfng" typeface="Ebrima"/>
+      </a:minorFont>
+    </a:fontScheme>
+    <a:fmtScheme name="Office">
+      <a:fillStyleLst>
+        <a:solidFill>
+          <a:schemeClr val="phClr"/>
+        </a:solidFill>
+        <a:gradFill rotWithShape="1">
+          <a:gsLst>
+            <a:gs pos="0">
+              <a:schemeClr val="phClr">
+                <a:lumMod val="110000"/>
+                <a:satMod val="105000"/>
+                <a:tint val="67000"/>
+              </a:schemeClr>
+            </a:gs>
+            <a:gs pos="50000">
+              <a:schemeClr val="phClr">
+                <a:lumMod val="105000"/>
+                <a:satMod val="103000"/>
+                <a:tint val="73000"/>
+              </a:schemeClr>
+            </a:gs>
+            <a:gs pos="100000">
+              <a:schemeClr val="phClr">
+                <a:lumMod val="105000"/>
+                <a:satMod val="109000"/>
+                <a:tint val="81000"/>
+              </a:schemeClr>
+            </a:gs>
+          </a:gsLst>
+          <a:lin ang="5400000" scaled="0"/>
+        </a:gradFill>
+        <a:gradFill rotWithShape="1">
+          <a:gsLst>
+            <a:gs pos="0">
+              <a:schemeClr val="phClr">
+                <a:satMod val="103000"/>
+                <a:lumMod val="102000"/>
+                <a:tint val="94000"/>
+              </a:schemeClr>
+            </a:gs>
+            <a:gs pos="50000">
+              <a:schemeClr val="phClr">
+                <a:satMod val="110000"/>
+                <a:lumMod val="100000"/>
+                <a:shade val="100000"/>
+              </a:schemeClr>
+            </a:gs>
+            <a:gs pos="100000">
+              <a:schemeClr val="phClr">
+                <a:lumMod val="99000"/>
+                <a:satMod val="120000"/>
+                <a:shade val="78000"/>
+              </a:schemeClr>
+            </a:gs>
+          </a:gsLst>
+          <a:lin ang="5400000" scaled="0"/>
+        </a:gradFill>
+      </a:fillStyleLst>
+      <a:lnStyleLst>
+        <a:ln w="6350" cap="flat" cmpd="sng" algn="ctr">
+          <a:solidFill>
+            <a:schemeClr val="phClr"/>
+          </a:solidFill>
+          <a:prstDash val="solid"/>
+          <a:miter lim="800000"/>
+        </a:ln>
+        <a:ln w="12700" cap="flat" cmpd="sng" algn="ctr">
+          <a:solidFill>
+            <a:schemeClr val="phClr"/>
+          </a:solidFill>
+          <a:prstDash val="solid"/>
+          <a:miter lim="800000"/>
+        </a:ln>
+        <a:ln w="19050" cap="flat" cmpd="sng" algn="ctr">
+          <a:solidFill>
+            <a:schemeClr val="phClr"/>
+          </a:solidFill>
+          <a:prstDash val="solid"/>
+          <a:miter lim="800000"/>
+        </a:ln>
+      </a:lnStyleLst>
+      <a:effectStyleLst>
+        <a:effectStyle>
+          <a:effectLst/>
+        </a:effectStyle>
+        <a:effectStyle>
+          <a:effectLst/>
+        </a:effectStyle>
+        <a:effectStyle>
+          <a:effectLst>
+            <a:outerShdw blurRad="57150" dist="19050" dir="5400000" algn="ctr" rotWithShape="0">
+              <a:srgbClr val="000000">
+                <a:alpha val="63000"/>
+              </a:srgbClr>
+            </a:outerShdw>
+          </a:effectLst>
+        </a:effectStyle>
+      </a:effectStyleLst>
+      <a:bgFillStyleLst>
+        <a:solidFill>
+          <a:schemeClr val="phClr"/>
+        </a:solidFill>
+        <a:solidFill>
+          <a:schemeClr val="phClr">
+            <a:tint val="95000"/>
+            <a:satMod val="170000"/>
+          </a:schemeClr>
+        </a:solidFill>
+        <a:gradFill rotWithShape="1">
+          <a:gsLst>
+            <a:gs pos="0">
+              <a:schemeClr val="phClr">
+                <a:tint val="93000"/>
+                <a:satMod val="150000"/>
+                <a:shade val="98000"/>
+                <a:lumMod val="102000"/>
+              </a:schemeClr>
+            </a:gs>
+            <a:gs pos="50000">
+              <a:schemeClr val="phClr">
+                <a:tint val="98000"/>
+                <a:satMod val="130000"/>
+                <a:shade val="90000"/>
+                <a:lumMod val="103000"/>
+              </a:schemeClr>
+            </a:gs>
+            <a:gs pos="100000">
+              <a:schemeClr val="phClr">
+                <a:shade val="63000"/>
+                <a:satMod val="120000"/>
+              </a:schemeClr>
+            </a:gs>
+          </a:gsLst>
+          <a:lin ang="5400000" scaled="0"/>
+        </a:gradFill>
+      </a:bgFillStyleLst>
+    </a:fmtScheme>
+  </a:themeElements>
+  <a:objectDefaults/>
+  <a:extraClrSchemeLst/>
+  <a:extLst>
+    <a:ext uri="{05A4C25C-085E-4340-85A3-A5531E510DB2}">
+      <thm15:themeFamily xmlns:thm15="http://schemas.microsoft.com/office/thememl/2012/main" name="Office Theme" id="{62F939B6-93AF-4DB8-9C6B-D6C7DFDC589F}" vid="{4A3C46E8-61CC-4603-A589-7422A47A8E4A}"/>
+    </a:ext>
+  </a:extLst>
+</a:theme>
 </file>
</xml_diff>

<commit_message>
Made it easier to add full-slide images using the powerpoint template
</commit_message>
<xml_diff>
--- a/data/powerpoint/template.pptx
+++ b/data/powerpoint/template.pptx
@@ -108,6 +108,9 @@
     <p:ext uri="{EFAFB233-063F-42B5-8137-9DF3F51BA10A}">
       <p15:sldGuideLst xmlns:p15="http://schemas.microsoft.com/office/powerpoint/2012/main"/>
     </p:ext>
+    <p:ext uri="{2D200454-40CA-4A62-9FC3-DE9A4176ACB9}">
+      <p15:notesGuideLst xmlns:p15="http://schemas.microsoft.com/office/powerpoint/2012/main"/>
+    </p:ext>
   </p:extLst>
 </p:presentation>
 </file>
@@ -194,7 +197,7 @@
           <a:p>
             <a:fld id="{FEE386D4-E0F5-48ED-B382-C5D6AB88A5B0}" type="datetimeFigureOut">
               <a:rPr lang="en-GB" smtClean="0"/>
-              <a:t>22/07/2018</a:t>
+              <a:t>27/07/2018</a:t>
             </a:fld>
             <a:endParaRPr lang="en-GB"/>
           </a:p>
@@ -593,7 +596,7 @@
           <a:p>
             <a:fld id="{09E22B56-B39A-4609-ACAF-221672A708D5}" type="datetimeFigureOut">
               <a:rPr lang="en-GB" smtClean="0"/>
-              <a:t>22/07/2018</a:t>
+              <a:t>27/07/2018</a:t>
             </a:fld>
             <a:endParaRPr lang="en-GB"/>
           </a:p>
@@ -763,7 +766,7 @@
           <a:p>
             <a:fld id="{09E22B56-B39A-4609-ACAF-221672A708D5}" type="datetimeFigureOut">
               <a:rPr lang="en-GB" smtClean="0"/>
-              <a:t>22/07/2018</a:t>
+              <a:t>27/07/2018</a:t>
             </a:fld>
             <a:endParaRPr lang="en-GB"/>
           </a:p>
@@ -943,7 +946,7 @@
           <a:p>
             <a:fld id="{09E22B56-B39A-4609-ACAF-221672A708D5}" type="datetimeFigureOut">
               <a:rPr lang="en-GB" smtClean="0"/>
-              <a:t>22/07/2018</a:t>
+              <a:t>27/07/2018</a:t>
             </a:fld>
             <a:endParaRPr lang="en-GB"/>
           </a:p>
@@ -1061,7 +1064,7 @@
           <a:p>
             <a:fld id="{09E22B56-B39A-4609-ACAF-221672A708D5}" type="datetimeFigureOut">
               <a:rPr lang="en-GB" smtClean="0"/>
-              <a:t>22/07/2018</a:t>
+              <a:t>27/07/2018</a:t>
             </a:fld>
             <a:endParaRPr lang="en-GB"/>
           </a:p>
@@ -1302,7 +1305,7 @@
           <a:p>
             <a:fld id="{09E22B56-B39A-4609-ACAF-221672A708D5}" type="datetimeFigureOut">
               <a:rPr lang="en-GB" smtClean="0"/>
-              <a:t>22/07/2018</a:t>
+              <a:t>27/07/2018</a:t>
             </a:fld>
             <a:endParaRPr lang="en-GB"/>
           </a:p>
@@ -1548,7 +1551,7 @@
           <a:p>
             <a:fld id="{09E22B56-B39A-4609-ACAF-221672A708D5}" type="datetimeFigureOut">
               <a:rPr lang="en-GB" smtClean="0"/>
-              <a:t>22/07/2018</a:t>
+              <a:t>27/07/2018</a:t>
             </a:fld>
             <a:endParaRPr lang="en-GB"/>
           </a:p>
@@ -1780,7 +1783,7 @@
           <a:p>
             <a:fld id="{09E22B56-B39A-4609-ACAF-221672A708D5}" type="datetimeFigureOut">
               <a:rPr lang="en-GB" smtClean="0"/>
-              <a:t>22/07/2018</a:t>
+              <a:t>27/07/2018</a:t>
             </a:fld>
             <a:endParaRPr lang="en-GB"/>
           </a:p>
@@ -2147,7 +2150,7 @@
           <a:p>
             <a:fld id="{09E22B56-B39A-4609-ACAF-221672A708D5}" type="datetimeFigureOut">
               <a:rPr lang="en-GB" smtClean="0"/>
-              <a:t>22/07/2018</a:t>
+              <a:t>27/07/2018</a:t>
             </a:fld>
             <a:endParaRPr lang="en-GB"/>
           </a:p>
@@ -2265,7 +2268,7 @@
           <a:p>
             <a:fld id="{09E22B56-B39A-4609-ACAF-221672A708D5}" type="datetimeFigureOut">
               <a:rPr lang="en-GB" smtClean="0"/>
-              <a:t>22/07/2018</a:t>
+              <a:t>27/07/2018</a:t>
             </a:fld>
             <a:endParaRPr lang="en-GB"/>
           </a:p>
@@ -2360,7 +2363,7 @@
           <a:p>
             <a:fld id="{09E22B56-B39A-4609-ACAF-221672A708D5}" type="datetimeFigureOut">
               <a:rPr lang="en-GB" smtClean="0"/>
-              <a:t>22/07/2018</a:t>
+              <a:t>27/07/2018</a:t>
             </a:fld>
             <a:endParaRPr lang="en-GB"/>
           </a:p>
@@ -2637,7 +2640,7 @@
           <a:p>
             <a:fld id="{09E22B56-B39A-4609-ACAF-221672A708D5}" type="datetimeFigureOut">
               <a:rPr lang="en-GB" smtClean="0"/>
-              <a:t>22/07/2018</a:t>
+              <a:t>27/07/2018</a:t>
             </a:fld>
             <a:endParaRPr lang="en-GB"/>
           </a:p>
@@ -2894,7 +2897,7 @@
           <a:p>
             <a:fld id="{09E22B56-B39A-4609-ACAF-221672A708D5}" type="datetimeFigureOut">
               <a:rPr lang="en-GB" smtClean="0"/>
-              <a:t>22/07/2018</a:t>
+              <a:t>27/07/2018</a:t>
             </a:fld>
             <a:endParaRPr lang="en-GB"/>
           </a:p>
@@ -3107,7 +3110,7 @@
           <a:p>
             <a:fld id="{09E22B56-B39A-4609-ACAF-221672A708D5}" type="datetimeFigureOut">
               <a:rPr lang="en-GB" smtClean="0"/>
-              <a:t>22/07/2018</a:t>
+              <a:t>27/07/2018</a:t>
             </a:fld>
             <a:endParaRPr lang="en-GB"/>
           </a:p>

</xml_diff>

<commit_message>
Made the title of full image slides visible
</commit_message>
<xml_diff>
--- a/data/powerpoint/template.pptx
+++ b/data/powerpoint/template.pptx
@@ -1026,94 +1026,6 @@
       </p:grpSpPr>
       <p:sp>
         <p:nvSpPr>
-          <p:cNvPr id="2" name="Title 1"/>
-          <p:cNvSpPr>
-            <a:spLocks noGrp="1"/>
-          </p:cNvSpPr>
-          <p:nvPr>
-            <p:ph type="title"/>
-          </p:nvPr>
-        </p:nvSpPr>
-        <p:spPr/>
-        <p:txBody>
-          <a:bodyPr/>
-          <a:lstStyle/>
-          <a:p>
-            <a:r>
-              <a:rPr lang="nl-NL"/>
-              <a:t>Klik om stijl te bewerken</a:t>
-            </a:r>
-            <a:endParaRPr lang="en-US" dirty="0"/>
-          </a:p>
-        </p:txBody>
-      </p:sp>
-      <p:sp>
-        <p:nvSpPr>
-          <p:cNvPr id="3" name="Date Placeholder 2"/>
-          <p:cNvSpPr>
-            <a:spLocks noGrp="1"/>
-          </p:cNvSpPr>
-          <p:nvPr>
-            <p:ph type="dt" sz="half" idx="10"/>
-          </p:nvPr>
-        </p:nvSpPr>
-        <p:spPr/>
-        <p:txBody>
-          <a:bodyPr/>
-          <a:lstStyle/>
-          <a:p>
-            <a:fld id="{09E22B56-B39A-4609-ACAF-221672A708D5}" type="datetimeFigureOut">
-              <a:rPr lang="en-GB" smtClean="0"/>
-              <a:t>27/07/2018</a:t>
-            </a:fld>
-            <a:endParaRPr lang="en-GB"/>
-          </a:p>
-        </p:txBody>
-      </p:sp>
-      <p:sp>
-        <p:nvSpPr>
-          <p:cNvPr id="4" name="Footer Placeholder 3"/>
-          <p:cNvSpPr>
-            <a:spLocks noGrp="1"/>
-          </p:cNvSpPr>
-          <p:nvPr>
-            <p:ph type="ftr" sz="quarter" idx="11"/>
-          </p:nvPr>
-        </p:nvSpPr>
-        <p:spPr/>
-        <p:txBody>
-          <a:bodyPr/>
-          <a:lstStyle/>
-          <a:p>
-            <a:endParaRPr lang="en-GB"/>
-          </a:p>
-        </p:txBody>
-      </p:sp>
-      <p:sp>
-        <p:nvSpPr>
-          <p:cNvPr id="5" name="Slide Number Placeholder 4"/>
-          <p:cNvSpPr>
-            <a:spLocks noGrp="1"/>
-          </p:cNvSpPr>
-          <p:nvPr>
-            <p:ph type="sldNum" sz="quarter" idx="12"/>
-          </p:nvPr>
-        </p:nvSpPr>
-        <p:spPr/>
-        <p:txBody>
-          <a:bodyPr/>
-          <a:lstStyle/>
-          <a:p>
-            <a:fld id="{1F469EBC-A649-4E3E-8046-4745AB923F3E}" type="slidenum">
-              <a:rPr lang="en-GB" smtClean="0"/>
-              <a:t>‹nr.›</a:t>
-            </a:fld>
-            <a:endParaRPr lang="en-GB"/>
-          </a:p>
-        </p:txBody>
-      </p:sp>
-      <p:sp>
-        <p:nvSpPr>
           <p:cNvPr id="6" name="Picture Placeholder 2">
             <a:extLst>
               <a:ext uri="{FF2B5EF4-FFF2-40B4-BE49-F238E27FC236}">
@@ -1180,6 +1092,94 @@
               <a:t>Klik op het pictogram als u een afbeelding wilt toevoegen</a:t>
             </a:r>
             <a:endParaRPr lang="en-US" dirty="0"/>
+          </a:p>
+        </p:txBody>
+      </p:sp>
+      <p:sp>
+        <p:nvSpPr>
+          <p:cNvPr id="2" name="Title 1"/>
+          <p:cNvSpPr>
+            <a:spLocks noGrp="1"/>
+          </p:cNvSpPr>
+          <p:nvPr>
+            <p:ph type="title"/>
+          </p:nvPr>
+        </p:nvSpPr>
+        <p:spPr/>
+        <p:txBody>
+          <a:bodyPr/>
+          <a:lstStyle/>
+          <a:p>
+            <a:r>
+              <a:rPr lang="nl-NL"/>
+              <a:t>Klik om stijl te bewerken</a:t>
+            </a:r>
+            <a:endParaRPr lang="en-US" dirty="0"/>
+          </a:p>
+        </p:txBody>
+      </p:sp>
+      <p:sp>
+        <p:nvSpPr>
+          <p:cNvPr id="3" name="Date Placeholder 2"/>
+          <p:cNvSpPr>
+            <a:spLocks noGrp="1"/>
+          </p:cNvSpPr>
+          <p:nvPr>
+            <p:ph type="dt" sz="half" idx="10"/>
+          </p:nvPr>
+        </p:nvSpPr>
+        <p:spPr/>
+        <p:txBody>
+          <a:bodyPr/>
+          <a:lstStyle/>
+          <a:p>
+            <a:fld id="{09E22B56-B39A-4609-ACAF-221672A708D5}" type="datetimeFigureOut">
+              <a:rPr lang="en-GB" smtClean="0"/>
+              <a:t>27/07/2018</a:t>
+            </a:fld>
+            <a:endParaRPr lang="en-GB"/>
+          </a:p>
+        </p:txBody>
+      </p:sp>
+      <p:sp>
+        <p:nvSpPr>
+          <p:cNvPr id="4" name="Footer Placeholder 3"/>
+          <p:cNvSpPr>
+            <a:spLocks noGrp="1"/>
+          </p:cNvSpPr>
+          <p:nvPr>
+            <p:ph type="ftr" sz="quarter" idx="11"/>
+          </p:nvPr>
+        </p:nvSpPr>
+        <p:spPr/>
+        <p:txBody>
+          <a:bodyPr/>
+          <a:lstStyle/>
+          <a:p>
+            <a:endParaRPr lang="en-GB"/>
+          </a:p>
+        </p:txBody>
+      </p:sp>
+      <p:sp>
+        <p:nvSpPr>
+          <p:cNvPr id="5" name="Slide Number Placeholder 4"/>
+          <p:cNvSpPr>
+            <a:spLocks noGrp="1"/>
+          </p:cNvSpPr>
+          <p:nvPr>
+            <p:ph type="sldNum" sz="quarter" idx="12"/>
+          </p:nvPr>
+        </p:nvSpPr>
+        <p:spPr/>
+        <p:txBody>
+          <a:bodyPr/>
+          <a:lstStyle/>
+          <a:p>
+            <a:fld id="{1F469EBC-A649-4E3E-8046-4745AB923F3E}" type="slidenum">
+              <a:rPr lang="en-GB" smtClean="0"/>
+              <a:t>‹nr.›</a:t>
+            </a:fld>
+            <a:endParaRPr lang="en-GB"/>
           </a:p>
         </p:txBody>
       </p:sp>

</xml_diff>

<commit_message>
Updated template to have shadow on white text for readability
</commit_message>
<xml_diff>
--- a/data/powerpoint/template.pptx
+++ b/data/powerpoint/template.pptx
@@ -3104,12 +3104,20 @@
                     <a:tint val="75000"/>
                   </a:schemeClr>
                 </a:solidFill>
+                <a:effectLst>
+                  <a:outerShdw blurRad="38100" dist="38100" dir="2700000" algn="tl">
+                    <a:srgbClr val="000000">
+                      <a:alpha val="43137"/>
+                    </a:srgbClr>
+                  </a:outerShdw>
+                </a:effectLst>
               </a:defRPr>
             </a:lvl1pPr>
           </a:lstStyle>
           <a:p>
             <a:fld id="{09E22B56-B39A-4609-ACAF-221672A708D5}" type="datetimeFigureOut">
               <a:rPr lang="en-GB" smtClean="0"/>
+              <a:pPr/>
               <a:t>27/07/2018</a:t>
             </a:fld>
             <a:endParaRPr lang="en-GB"/>
@@ -3145,6 +3153,13 @@
                     <a:tint val="75000"/>
                   </a:schemeClr>
                 </a:solidFill>
+                <a:effectLst>
+                  <a:outerShdw blurRad="38100" dist="38100" dir="2700000" algn="tl">
+                    <a:srgbClr val="000000">
+                      <a:alpha val="43137"/>
+                    </a:srgbClr>
+                  </a:outerShdw>
+                </a:effectLst>
               </a:defRPr>
             </a:lvl1pPr>
           </a:lstStyle>
@@ -3182,12 +3197,20 @@
                     <a:tint val="75000"/>
                   </a:schemeClr>
                 </a:solidFill>
+                <a:effectLst>
+                  <a:outerShdw blurRad="38100" dist="38100" dir="2700000" algn="tl">
+                    <a:srgbClr val="000000">
+                      <a:alpha val="43137"/>
+                    </a:srgbClr>
+                  </a:outerShdw>
+                </a:effectLst>
               </a:defRPr>
             </a:lvl1pPr>
           </a:lstStyle>
           <a:p>
             <a:fld id="{1F469EBC-A649-4E3E-8046-4745AB923F3E}" type="slidenum">
               <a:rPr lang="en-GB" smtClean="0"/>
+              <a:pPr/>
               <a:t>‹nr.›</a:t>
             </a:fld>
             <a:endParaRPr lang="en-GB"/>
@@ -3230,6 +3253,13 @@
           <a:solidFill>
             <a:schemeClr val="tx1"/>
           </a:solidFill>
+          <a:effectLst>
+            <a:outerShdw blurRad="38100" dist="38100" dir="2700000" algn="tl">
+              <a:srgbClr val="000000">
+                <a:alpha val="43137"/>
+              </a:srgbClr>
+            </a:outerShdw>
+          </a:effectLst>
           <a:latin typeface="+mj-lt"/>
           <a:ea typeface="+mj-ea"/>
           <a:cs typeface="+mj-cs"/>
@@ -3250,6 +3280,13 @@
           <a:solidFill>
             <a:schemeClr val="tx1"/>
           </a:solidFill>
+          <a:effectLst>
+            <a:outerShdw blurRad="38100" dist="38100" dir="2700000" algn="tl">
+              <a:srgbClr val="000000">
+                <a:alpha val="43137"/>
+              </a:srgbClr>
+            </a:outerShdw>
+          </a:effectLst>
           <a:latin typeface="+mn-lt"/>
           <a:ea typeface="+mn-ea"/>
           <a:cs typeface="+mn-cs"/>
@@ -3268,6 +3305,13 @@
           <a:solidFill>
             <a:schemeClr val="tx1"/>
           </a:solidFill>
+          <a:effectLst>
+            <a:outerShdw blurRad="38100" dist="38100" dir="2700000" algn="tl">
+              <a:srgbClr val="000000">
+                <a:alpha val="43137"/>
+              </a:srgbClr>
+            </a:outerShdw>
+          </a:effectLst>
           <a:latin typeface="+mn-lt"/>
           <a:ea typeface="+mn-ea"/>
           <a:cs typeface="+mn-cs"/>
@@ -3286,6 +3330,13 @@
           <a:solidFill>
             <a:schemeClr val="tx1"/>
           </a:solidFill>
+          <a:effectLst>
+            <a:outerShdw blurRad="38100" dist="38100" dir="2700000" algn="tl">
+              <a:srgbClr val="000000">
+                <a:alpha val="43137"/>
+              </a:srgbClr>
+            </a:outerShdw>
+          </a:effectLst>
           <a:latin typeface="+mn-lt"/>
           <a:ea typeface="+mn-ea"/>
           <a:cs typeface="+mn-cs"/>
@@ -3304,6 +3355,13 @@
           <a:solidFill>
             <a:schemeClr val="tx1"/>
           </a:solidFill>
+          <a:effectLst>
+            <a:outerShdw blurRad="38100" dist="38100" dir="2700000" algn="tl">
+              <a:srgbClr val="000000">
+                <a:alpha val="43137"/>
+              </a:srgbClr>
+            </a:outerShdw>
+          </a:effectLst>
           <a:latin typeface="+mn-lt"/>
           <a:ea typeface="+mn-ea"/>
           <a:cs typeface="+mn-cs"/>
@@ -3322,6 +3380,13 @@
           <a:solidFill>
             <a:schemeClr val="tx1"/>
           </a:solidFill>
+          <a:effectLst>
+            <a:outerShdw blurRad="38100" dist="38100" dir="2700000" algn="tl">
+              <a:srgbClr val="000000">
+                <a:alpha val="43137"/>
+              </a:srgbClr>
+            </a:outerShdw>
+          </a:effectLst>
           <a:latin typeface="+mn-lt"/>
           <a:ea typeface="+mn-ea"/>
           <a:cs typeface="+mn-cs"/>

</xml_diff>

<commit_message>
Updated powerpoint template to use less space for the title
</commit_message>
<xml_diff>
--- a/data/powerpoint/template.pptx
+++ b/data/powerpoint/template.pptx
@@ -1319,8 +1319,8 @@
         </p:nvSpPr>
         <p:spPr>
           <a:xfrm>
-            <a:off x="838200" y="1803862"/>
-            <a:ext cx="10517188" cy="4480560"/>
+            <a:off x="838200" y="1251283"/>
+            <a:ext cx="10517188" cy="5470191"/>
           </a:xfrm>
         </p:spPr>
         <p:txBody>
@@ -3182,7 +3182,7 @@
         <p:spPr>
           <a:xfrm>
             <a:off x="838200" y="365126"/>
-            <a:ext cx="10515600" cy="985029"/>
+            <a:ext cx="10515600" cy="773863"/>
           </a:xfrm>
           <a:prstGeom prst="rect">
             <a:avLst/>
@@ -3195,7 +3195,7 @@
           <a:lstStyle/>
           <a:p>
             <a:r>
-              <a:rPr lang="nl-NL"/>
+              <a:rPr lang="nl-NL" dirty="0"/>
               <a:t>Klik om stijl te bewerken</a:t>
             </a:r>
             <a:endParaRPr lang="en-US" dirty="0"/>
@@ -3214,8 +3214,8 @@
         </p:nvSpPr>
         <p:spPr>
           <a:xfrm>
-            <a:off x="838200" y="1529542"/>
-            <a:ext cx="10515600" cy="4647421"/>
+            <a:off x="838200" y="1267326"/>
+            <a:ext cx="10515600" cy="4909637"/>
           </a:xfrm>
           <a:prstGeom prst="rect">
             <a:avLst/>

</xml_diff>

<commit_message>
Added generation of two columns
</commit_message>
<xml_diff>
--- a/data/powerpoint/template.pptx
+++ b/data/powerpoint/template.pptx
@@ -2063,7 +2063,7 @@
         <p:spPr>
           <a:xfrm>
             <a:off x="839788" y="365125"/>
-            <a:ext cx="10515600" cy="1325563"/>
+            <a:ext cx="10515600" cy="774000"/>
           </a:xfrm>
         </p:spPr>
         <p:txBody>
@@ -2090,14 +2090,14 @@
         </p:nvSpPr>
         <p:spPr>
           <a:xfrm>
-            <a:off x="839788" y="1681163"/>
+            <a:off x="839788" y="1185863"/>
             <a:ext cx="5157787" cy="823912"/>
           </a:xfrm>
         </p:spPr>
         <p:txBody>
-          <a:bodyPr anchor="b"/>
+          <a:bodyPr anchor="ctr"/>
           <a:lstStyle>
-            <a:lvl1pPr marL="0" indent="0">
+            <a:lvl1pPr marL="0" indent="0" algn="ctr">
               <a:buNone/>
               <a:defRPr sz="2400" b="1"/>
             </a:lvl1pPr>
@@ -2155,8 +2155,8 @@
         </p:nvSpPr>
         <p:spPr>
           <a:xfrm>
-            <a:off x="839788" y="2505075"/>
-            <a:ext cx="5157787" cy="3684588"/>
+            <a:off x="839788" y="2009775"/>
+            <a:ext cx="5157787" cy="4179888"/>
           </a:xfrm>
         </p:spPr>
         <p:txBody>
@@ -2165,35 +2165,35 @@
           <a:p>
             <a:pPr lvl="0"/>
             <a:r>
-              <a:rPr lang="nl-NL"/>
+              <a:rPr lang="nl-NL" dirty="0"/>
               <a:t>Tekststijl van het model bewerken</a:t>
             </a:r>
           </a:p>
           <a:p>
             <a:pPr lvl="1"/>
             <a:r>
-              <a:rPr lang="nl-NL"/>
+              <a:rPr lang="nl-NL" dirty="0"/>
               <a:t>Tweede niveau</a:t>
             </a:r>
           </a:p>
           <a:p>
             <a:pPr lvl="2"/>
             <a:r>
-              <a:rPr lang="nl-NL"/>
+              <a:rPr lang="nl-NL" dirty="0"/>
               <a:t>Derde niveau</a:t>
             </a:r>
           </a:p>
           <a:p>
             <a:pPr lvl="3"/>
             <a:r>
-              <a:rPr lang="nl-NL"/>
+              <a:rPr lang="nl-NL" dirty="0"/>
               <a:t>Vierde niveau</a:t>
             </a:r>
           </a:p>
           <a:p>
             <a:pPr lvl="4"/>
             <a:r>
-              <a:rPr lang="nl-NL"/>
+              <a:rPr lang="nl-NL" dirty="0"/>
               <a:t>Vijfde niveau</a:t>
             </a:r>
             <a:endParaRPr lang="en-US" dirty="0"/>
@@ -2212,14 +2212,14 @@
         </p:nvSpPr>
         <p:spPr>
           <a:xfrm>
-            <a:off x="6172200" y="1681163"/>
+            <a:off x="6172200" y="1185863"/>
             <a:ext cx="5183188" cy="823912"/>
           </a:xfrm>
         </p:spPr>
         <p:txBody>
-          <a:bodyPr anchor="b"/>
+          <a:bodyPr anchor="ctr"/>
           <a:lstStyle>
-            <a:lvl1pPr marL="0" indent="0">
+            <a:lvl1pPr marL="0" indent="0" algn="ctr">
               <a:buNone/>
               <a:defRPr sz="2400" b="1"/>
             </a:lvl1pPr>
@@ -2277,8 +2277,8 @@
         </p:nvSpPr>
         <p:spPr>
           <a:xfrm>
-            <a:off x="6172200" y="2505075"/>
-            <a:ext cx="5183188" cy="3684588"/>
+            <a:off x="6172200" y="2009775"/>
+            <a:ext cx="5183188" cy="4179888"/>
           </a:xfrm>
         </p:spPr>
         <p:txBody>
@@ -2397,6 +2397,888 @@
   <p:clrMapOvr>
     <a:masterClrMapping/>
   </p:clrMapOvr>
+  <p:timing>
+    <p:tnLst>
+      <p:par>
+        <p:cTn id="1" dur="indefinite" restart="never" nodeType="tmRoot">
+          <p:childTnLst>
+            <p:seq concurrent="1" nextAc="seek">
+              <p:cTn id="2" dur="indefinite" nodeType="mainSeq">
+                <p:childTnLst>
+                  <p:par>
+                    <p:cTn id="3" fill="hold">
+                      <p:stCondLst>
+                        <p:cond delay="indefinite"/>
+                      </p:stCondLst>
+                      <p:childTnLst>
+                        <p:par>
+                          <p:cTn id="4" fill="hold">
+                            <p:stCondLst>
+                              <p:cond delay="0"/>
+                            </p:stCondLst>
+                            <p:childTnLst>
+                              <p:par>
+                                <p:cTn id="5" presetID="1" presetClass="entr" presetSubtype="0" fill="hold" grpId="0" nodeType="clickEffect">
+                                  <p:stCondLst>
+                                    <p:cond delay="0"/>
+                                  </p:stCondLst>
+                                  <p:childTnLst>
+                                    <p:set>
+                                      <p:cBhvr>
+                                        <p:cTn id="6" dur="1" fill="hold">
+                                          <p:stCondLst>
+                                            <p:cond delay="0"/>
+                                          </p:stCondLst>
+                                        </p:cTn>
+                                        <p:tgtEl>
+                                          <p:spTgt spid="5">
+                                            <p:txEl>
+                                              <p:pRg st="0" end="0"/>
+                                            </p:txEl>
+                                          </p:spTgt>
+                                        </p:tgtEl>
+                                        <p:attrNameLst>
+                                          <p:attrName>style.visibility</p:attrName>
+                                        </p:attrNameLst>
+                                      </p:cBhvr>
+                                      <p:to>
+                                        <p:strVal val="visible"/>
+                                      </p:to>
+                                    </p:set>
+                                  </p:childTnLst>
+                                </p:cTn>
+                              </p:par>
+                              <p:par>
+                                <p:cTn id="7" presetID="1" presetClass="entr" presetSubtype="0" fill="hold" grpId="0" nodeType="withEffect">
+                                  <p:stCondLst>
+                                    <p:cond delay="0"/>
+                                  </p:stCondLst>
+                                  <p:childTnLst>
+                                    <p:set>
+                                      <p:cBhvr>
+                                        <p:cTn id="8" dur="1" fill="hold">
+                                          <p:stCondLst>
+                                            <p:cond delay="0"/>
+                                          </p:stCondLst>
+                                        </p:cTn>
+                                        <p:tgtEl>
+                                          <p:spTgt spid="6">
+                                            <p:txEl>
+                                              <p:pRg st="0" end="0"/>
+                                            </p:txEl>
+                                          </p:spTgt>
+                                        </p:tgtEl>
+                                        <p:attrNameLst>
+                                          <p:attrName>style.visibility</p:attrName>
+                                        </p:attrNameLst>
+                                      </p:cBhvr>
+                                      <p:to>
+                                        <p:strVal val="visible"/>
+                                      </p:to>
+                                    </p:set>
+                                  </p:childTnLst>
+                                </p:cTn>
+                              </p:par>
+                              <p:par>
+                                <p:cTn id="9" presetID="1" presetClass="entr" presetSubtype="0" fill="hold" grpId="0" nodeType="withEffect">
+                                  <p:stCondLst>
+                                    <p:cond delay="0"/>
+                                  </p:stCondLst>
+                                  <p:childTnLst>
+                                    <p:set>
+                                      <p:cBhvr>
+                                        <p:cTn id="10" dur="1" fill="hold">
+                                          <p:stCondLst>
+                                            <p:cond delay="0"/>
+                                          </p:stCondLst>
+                                        </p:cTn>
+                                        <p:tgtEl>
+                                          <p:spTgt spid="6">
+                                            <p:txEl>
+                                              <p:pRg st="1" end="1"/>
+                                            </p:txEl>
+                                          </p:spTgt>
+                                        </p:tgtEl>
+                                        <p:attrNameLst>
+                                          <p:attrName>style.visibility</p:attrName>
+                                        </p:attrNameLst>
+                                      </p:cBhvr>
+                                      <p:to>
+                                        <p:strVal val="visible"/>
+                                      </p:to>
+                                    </p:set>
+                                  </p:childTnLst>
+                                </p:cTn>
+                              </p:par>
+                              <p:par>
+                                <p:cTn id="11" presetID="1" presetClass="entr" presetSubtype="0" fill="hold" grpId="0" nodeType="withEffect">
+                                  <p:stCondLst>
+                                    <p:cond delay="0"/>
+                                  </p:stCondLst>
+                                  <p:childTnLst>
+                                    <p:set>
+                                      <p:cBhvr>
+                                        <p:cTn id="12" dur="1" fill="hold">
+                                          <p:stCondLst>
+                                            <p:cond delay="0"/>
+                                          </p:stCondLst>
+                                        </p:cTn>
+                                        <p:tgtEl>
+                                          <p:spTgt spid="6">
+                                            <p:txEl>
+                                              <p:pRg st="2" end="2"/>
+                                            </p:txEl>
+                                          </p:spTgt>
+                                        </p:tgtEl>
+                                        <p:attrNameLst>
+                                          <p:attrName>style.visibility</p:attrName>
+                                        </p:attrNameLst>
+                                      </p:cBhvr>
+                                      <p:to>
+                                        <p:strVal val="visible"/>
+                                      </p:to>
+                                    </p:set>
+                                  </p:childTnLst>
+                                </p:cTn>
+                              </p:par>
+                              <p:par>
+                                <p:cTn id="13" presetID="1" presetClass="entr" presetSubtype="0" fill="hold" grpId="0" nodeType="withEffect">
+                                  <p:stCondLst>
+                                    <p:cond delay="0"/>
+                                  </p:stCondLst>
+                                  <p:childTnLst>
+                                    <p:set>
+                                      <p:cBhvr>
+                                        <p:cTn id="14" dur="1" fill="hold">
+                                          <p:stCondLst>
+                                            <p:cond delay="0"/>
+                                          </p:stCondLst>
+                                        </p:cTn>
+                                        <p:tgtEl>
+                                          <p:spTgt spid="6">
+                                            <p:txEl>
+                                              <p:pRg st="3" end="3"/>
+                                            </p:txEl>
+                                          </p:spTgt>
+                                        </p:tgtEl>
+                                        <p:attrNameLst>
+                                          <p:attrName>style.visibility</p:attrName>
+                                        </p:attrNameLst>
+                                      </p:cBhvr>
+                                      <p:to>
+                                        <p:strVal val="visible"/>
+                                      </p:to>
+                                    </p:set>
+                                  </p:childTnLst>
+                                </p:cTn>
+                              </p:par>
+                              <p:par>
+                                <p:cTn id="15" presetID="1" presetClass="entr" presetSubtype="0" fill="hold" grpId="0" nodeType="withEffect">
+                                  <p:stCondLst>
+                                    <p:cond delay="0"/>
+                                  </p:stCondLst>
+                                  <p:childTnLst>
+                                    <p:set>
+                                      <p:cBhvr>
+                                        <p:cTn id="16" dur="1" fill="hold">
+                                          <p:stCondLst>
+                                            <p:cond delay="0"/>
+                                          </p:stCondLst>
+                                        </p:cTn>
+                                        <p:tgtEl>
+                                          <p:spTgt spid="6">
+                                            <p:txEl>
+                                              <p:pRg st="4" end="4"/>
+                                            </p:txEl>
+                                          </p:spTgt>
+                                        </p:tgtEl>
+                                        <p:attrNameLst>
+                                          <p:attrName>style.visibility</p:attrName>
+                                        </p:attrNameLst>
+                                      </p:cBhvr>
+                                      <p:to>
+                                        <p:strVal val="visible"/>
+                                      </p:to>
+                                    </p:set>
+                                  </p:childTnLst>
+                                </p:cTn>
+                              </p:par>
+                              <p:par>
+                                <p:cTn id="17" presetID="9" presetClass="emph" presetSubtype="0" grpId="0" nodeType="withEffect">
+                                  <p:stCondLst>
+                                    <p:cond delay="0"/>
+                                  </p:stCondLst>
+                                  <p:childTnLst>
+                                    <p:set>
+                                      <p:cBhvr>
+                                        <p:cTn id="18" dur="indefinite"/>
+                                        <p:tgtEl>
+                                          <p:spTgt spid="3">
+                                            <p:txEl>
+                                              <p:pRg st="0" end="0"/>
+                                            </p:txEl>
+                                          </p:spTgt>
+                                        </p:tgtEl>
+                                        <p:attrNameLst>
+                                          <p:attrName>style.opacity</p:attrName>
+                                        </p:attrNameLst>
+                                      </p:cBhvr>
+                                      <p:to>
+                                        <p:strVal val="0.5"/>
+                                      </p:to>
+                                    </p:set>
+                                    <p:animEffect filter="image" prLst="opacity: 0.5">
+                                      <p:cBhvr rctx="IE">
+                                        <p:cTn id="19" dur="indefinite"/>
+                                        <p:tgtEl>
+                                          <p:spTgt spid="3">
+                                            <p:txEl>
+                                              <p:pRg st="0" end="0"/>
+                                            </p:txEl>
+                                          </p:spTgt>
+                                        </p:tgtEl>
+                                      </p:cBhvr>
+                                    </p:animEffect>
+                                  </p:childTnLst>
+                                </p:cTn>
+                              </p:par>
+                              <p:par>
+                                <p:cTn id="20" presetID="9" presetClass="emph" presetSubtype="0" grpId="0" nodeType="withEffect">
+                                  <p:stCondLst>
+                                    <p:cond delay="0"/>
+                                  </p:stCondLst>
+                                  <p:childTnLst>
+                                    <p:set>
+                                      <p:cBhvr>
+                                        <p:cTn id="21" dur="indefinite"/>
+                                        <p:tgtEl>
+                                          <p:spTgt spid="4">
+                                            <p:txEl>
+                                              <p:pRg st="0" end="0"/>
+                                            </p:txEl>
+                                          </p:spTgt>
+                                        </p:tgtEl>
+                                        <p:attrNameLst>
+                                          <p:attrName>style.opacity</p:attrName>
+                                        </p:attrNameLst>
+                                      </p:cBhvr>
+                                      <p:to>
+                                        <p:strVal val="0.5"/>
+                                      </p:to>
+                                    </p:set>
+                                    <p:animEffect filter="image" prLst="opacity: 0.5">
+                                      <p:cBhvr rctx="IE">
+                                        <p:cTn id="22" dur="indefinite"/>
+                                        <p:tgtEl>
+                                          <p:spTgt spid="4">
+                                            <p:txEl>
+                                              <p:pRg st="0" end="0"/>
+                                            </p:txEl>
+                                          </p:spTgt>
+                                        </p:tgtEl>
+                                      </p:cBhvr>
+                                    </p:animEffect>
+                                  </p:childTnLst>
+                                </p:cTn>
+                              </p:par>
+                              <p:par>
+                                <p:cTn id="23" presetID="9" presetClass="emph" presetSubtype="0" grpId="0" nodeType="withEffect">
+                                  <p:stCondLst>
+                                    <p:cond delay="0"/>
+                                  </p:stCondLst>
+                                  <p:childTnLst>
+                                    <p:set>
+                                      <p:cBhvr>
+                                        <p:cTn id="24" dur="indefinite"/>
+                                        <p:tgtEl>
+                                          <p:spTgt spid="4">
+                                            <p:txEl>
+                                              <p:pRg st="1" end="1"/>
+                                            </p:txEl>
+                                          </p:spTgt>
+                                        </p:tgtEl>
+                                        <p:attrNameLst>
+                                          <p:attrName>style.opacity</p:attrName>
+                                        </p:attrNameLst>
+                                      </p:cBhvr>
+                                      <p:to>
+                                        <p:strVal val="0.5"/>
+                                      </p:to>
+                                    </p:set>
+                                    <p:animEffect filter="image" prLst="opacity: 0.5">
+                                      <p:cBhvr rctx="IE">
+                                        <p:cTn id="25" dur="indefinite"/>
+                                        <p:tgtEl>
+                                          <p:spTgt spid="4">
+                                            <p:txEl>
+                                              <p:pRg st="1" end="1"/>
+                                            </p:txEl>
+                                          </p:spTgt>
+                                        </p:tgtEl>
+                                      </p:cBhvr>
+                                    </p:animEffect>
+                                  </p:childTnLst>
+                                </p:cTn>
+                              </p:par>
+                              <p:par>
+                                <p:cTn id="26" presetID="9" presetClass="emph" presetSubtype="0" grpId="0" nodeType="withEffect">
+                                  <p:stCondLst>
+                                    <p:cond delay="0"/>
+                                  </p:stCondLst>
+                                  <p:childTnLst>
+                                    <p:set>
+                                      <p:cBhvr>
+                                        <p:cTn id="27" dur="indefinite"/>
+                                        <p:tgtEl>
+                                          <p:spTgt spid="4">
+                                            <p:txEl>
+                                              <p:pRg st="2" end="2"/>
+                                            </p:txEl>
+                                          </p:spTgt>
+                                        </p:tgtEl>
+                                        <p:attrNameLst>
+                                          <p:attrName>style.opacity</p:attrName>
+                                        </p:attrNameLst>
+                                      </p:cBhvr>
+                                      <p:to>
+                                        <p:strVal val="0.5"/>
+                                      </p:to>
+                                    </p:set>
+                                    <p:animEffect filter="image" prLst="opacity: 0.5">
+                                      <p:cBhvr rctx="IE">
+                                        <p:cTn id="28" dur="indefinite"/>
+                                        <p:tgtEl>
+                                          <p:spTgt spid="4">
+                                            <p:txEl>
+                                              <p:pRg st="2" end="2"/>
+                                            </p:txEl>
+                                          </p:spTgt>
+                                        </p:tgtEl>
+                                      </p:cBhvr>
+                                    </p:animEffect>
+                                  </p:childTnLst>
+                                </p:cTn>
+                              </p:par>
+                              <p:par>
+                                <p:cTn id="29" presetID="9" presetClass="emph" presetSubtype="0" grpId="0" nodeType="withEffect">
+                                  <p:stCondLst>
+                                    <p:cond delay="0"/>
+                                  </p:stCondLst>
+                                  <p:childTnLst>
+                                    <p:set>
+                                      <p:cBhvr>
+                                        <p:cTn id="30" dur="indefinite"/>
+                                        <p:tgtEl>
+                                          <p:spTgt spid="4">
+                                            <p:txEl>
+                                              <p:pRg st="3" end="3"/>
+                                            </p:txEl>
+                                          </p:spTgt>
+                                        </p:tgtEl>
+                                        <p:attrNameLst>
+                                          <p:attrName>style.opacity</p:attrName>
+                                        </p:attrNameLst>
+                                      </p:cBhvr>
+                                      <p:to>
+                                        <p:strVal val="0.5"/>
+                                      </p:to>
+                                    </p:set>
+                                    <p:animEffect filter="image" prLst="opacity: 0.5">
+                                      <p:cBhvr rctx="IE">
+                                        <p:cTn id="31" dur="indefinite"/>
+                                        <p:tgtEl>
+                                          <p:spTgt spid="4">
+                                            <p:txEl>
+                                              <p:pRg st="3" end="3"/>
+                                            </p:txEl>
+                                          </p:spTgt>
+                                        </p:tgtEl>
+                                      </p:cBhvr>
+                                    </p:animEffect>
+                                  </p:childTnLst>
+                                </p:cTn>
+                              </p:par>
+                              <p:par>
+                                <p:cTn id="32" presetID="9" presetClass="emph" presetSubtype="0" grpId="0" nodeType="withEffect">
+                                  <p:stCondLst>
+                                    <p:cond delay="0"/>
+                                  </p:stCondLst>
+                                  <p:childTnLst>
+                                    <p:set>
+                                      <p:cBhvr>
+                                        <p:cTn id="33" dur="indefinite"/>
+                                        <p:tgtEl>
+                                          <p:spTgt spid="4">
+                                            <p:txEl>
+                                              <p:pRg st="4" end="4"/>
+                                            </p:txEl>
+                                          </p:spTgt>
+                                        </p:tgtEl>
+                                        <p:attrNameLst>
+                                          <p:attrName>style.opacity</p:attrName>
+                                        </p:attrNameLst>
+                                      </p:cBhvr>
+                                      <p:to>
+                                        <p:strVal val="0.5"/>
+                                      </p:to>
+                                    </p:set>
+                                    <p:animEffect filter="image" prLst="opacity: 0.5">
+                                      <p:cBhvr rctx="IE">
+                                        <p:cTn id="34" dur="indefinite"/>
+                                        <p:tgtEl>
+                                          <p:spTgt spid="4">
+                                            <p:txEl>
+                                              <p:pRg st="4" end="4"/>
+                                            </p:txEl>
+                                          </p:spTgt>
+                                        </p:tgtEl>
+                                      </p:cBhvr>
+                                    </p:animEffect>
+                                  </p:childTnLst>
+                                </p:cTn>
+                              </p:par>
+                            </p:childTnLst>
+                          </p:cTn>
+                        </p:par>
+                      </p:childTnLst>
+                    </p:cTn>
+                  </p:par>
+                </p:childTnLst>
+              </p:cTn>
+              <p:prevCondLst>
+                <p:cond evt="onPrev" delay="0">
+                  <p:tgtEl>
+                    <p:sldTgt/>
+                  </p:tgtEl>
+                </p:cond>
+              </p:prevCondLst>
+              <p:nextCondLst>
+                <p:cond evt="onNext" delay="0">
+                  <p:tgtEl>
+                    <p:sldTgt/>
+                  </p:tgtEl>
+                </p:cond>
+              </p:nextCondLst>
+            </p:seq>
+          </p:childTnLst>
+        </p:cTn>
+      </p:par>
+    </p:tnLst>
+    <p:bldLst>
+      <p:bldP spid="3" grpId="0" build="p">
+        <p:tmplLst>
+          <p:tmpl lvl="1">
+            <p:tnLst>
+              <p:par>
+                <p:cTn presetID="9" presetClass="emph" presetSubtype="0" nodeType="withEffect">
+                  <p:stCondLst>
+                    <p:cond delay="0"/>
+                  </p:stCondLst>
+                  <p:childTnLst>
+                    <p:set>
+                      <p:cBhvr>
+                        <p:cTn dur="indefinite"/>
+                        <p:tgtEl>
+                          <p:spTgt spid="3"/>
+                        </p:tgtEl>
+                        <p:attrNameLst>
+                          <p:attrName>style.opacity</p:attrName>
+                        </p:attrNameLst>
+                      </p:cBhvr>
+                      <p:to>
+                        <p:strVal val="0.5"/>
+                      </p:to>
+                    </p:set>
+                    <p:animEffect filter="image" prLst="opacity: 0.5">
+                      <p:cBhvr rctx="IE">
+                        <p:cTn dur="indefinite"/>
+                        <p:tgtEl>
+                          <p:spTgt spid="3"/>
+                        </p:tgtEl>
+                      </p:cBhvr>
+                    </p:animEffect>
+                  </p:childTnLst>
+                </p:cTn>
+              </p:par>
+            </p:tnLst>
+          </p:tmpl>
+        </p:tmplLst>
+      </p:bldP>
+      <p:bldP spid="4" grpId="0" build="p">
+        <p:tmplLst>
+          <p:tmpl lvl="1">
+            <p:tnLst>
+              <p:par>
+                <p:cTn presetID="9" presetClass="emph" presetSubtype="0" nodeType="withEffect">
+                  <p:stCondLst>
+                    <p:cond delay="0"/>
+                  </p:stCondLst>
+                  <p:childTnLst>
+                    <p:set>
+                      <p:cBhvr>
+                        <p:cTn dur="indefinite"/>
+                        <p:tgtEl>
+                          <p:spTgt spid="4"/>
+                        </p:tgtEl>
+                        <p:attrNameLst>
+                          <p:attrName>style.opacity</p:attrName>
+                        </p:attrNameLst>
+                      </p:cBhvr>
+                      <p:to>
+                        <p:strVal val="0.5"/>
+                      </p:to>
+                    </p:set>
+                    <p:animEffect filter="image" prLst="opacity: 0.5">
+                      <p:cBhvr rctx="IE">
+                        <p:cTn dur="indefinite"/>
+                        <p:tgtEl>
+                          <p:spTgt spid="4"/>
+                        </p:tgtEl>
+                      </p:cBhvr>
+                    </p:animEffect>
+                  </p:childTnLst>
+                </p:cTn>
+              </p:par>
+            </p:tnLst>
+          </p:tmpl>
+          <p:tmpl lvl="2">
+            <p:tnLst>
+              <p:par>
+                <p:cTn presetID="9" presetClass="emph" presetSubtype="0" nodeType="withEffect">
+                  <p:stCondLst>
+                    <p:cond delay="0"/>
+                  </p:stCondLst>
+                  <p:childTnLst>
+                    <p:set>
+                      <p:cBhvr>
+                        <p:cTn dur="indefinite"/>
+                        <p:tgtEl>
+                          <p:spTgt spid="4"/>
+                        </p:tgtEl>
+                        <p:attrNameLst>
+                          <p:attrName>style.opacity</p:attrName>
+                        </p:attrNameLst>
+                      </p:cBhvr>
+                      <p:to>
+                        <p:strVal val="0.5"/>
+                      </p:to>
+                    </p:set>
+                    <p:animEffect filter="image" prLst="opacity: 0.5">
+                      <p:cBhvr rctx="IE">
+                        <p:cTn dur="indefinite"/>
+                        <p:tgtEl>
+                          <p:spTgt spid="4"/>
+                        </p:tgtEl>
+                      </p:cBhvr>
+                    </p:animEffect>
+                  </p:childTnLst>
+                </p:cTn>
+              </p:par>
+            </p:tnLst>
+          </p:tmpl>
+          <p:tmpl lvl="3">
+            <p:tnLst>
+              <p:par>
+                <p:cTn presetID="9" presetClass="emph" presetSubtype="0" nodeType="withEffect">
+                  <p:stCondLst>
+                    <p:cond delay="0"/>
+                  </p:stCondLst>
+                  <p:childTnLst>
+                    <p:set>
+                      <p:cBhvr>
+                        <p:cTn dur="indefinite"/>
+                        <p:tgtEl>
+                          <p:spTgt spid="4"/>
+                        </p:tgtEl>
+                        <p:attrNameLst>
+                          <p:attrName>style.opacity</p:attrName>
+                        </p:attrNameLst>
+                      </p:cBhvr>
+                      <p:to>
+                        <p:strVal val="0.5"/>
+                      </p:to>
+                    </p:set>
+                    <p:animEffect filter="image" prLst="opacity: 0.5">
+                      <p:cBhvr rctx="IE">
+                        <p:cTn dur="indefinite"/>
+                        <p:tgtEl>
+                          <p:spTgt spid="4"/>
+                        </p:tgtEl>
+                      </p:cBhvr>
+                    </p:animEffect>
+                  </p:childTnLst>
+                </p:cTn>
+              </p:par>
+            </p:tnLst>
+          </p:tmpl>
+          <p:tmpl lvl="4">
+            <p:tnLst>
+              <p:par>
+                <p:cTn presetID="9" presetClass="emph" presetSubtype="0" nodeType="withEffect">
+                  <p:stCondLst>
+                    <p:cond delay="0"/>
+                  </p:stCondLst>
+                  <p:childTnLst>
+                    <p:set>
+                      <p:cBhvr>
+                        <p:cTn dur="indefinite"/>
+                        <p:tgtEl>
+                          <p:spTgt spid="4"/>
+                        </p:tgtEl>
+                        <p:attrNameLst>
+                          <p:attrName>style.opacity</p:attrName>
+                        </p:attrNameLst>
+                      </p:cBhvr>
+                      <p:to>
+                        <p:strVal val="0.5"/>
+                      </p:to>
+                    </p:set>
+                    <p:animEffect filter="image" prLst="opacity: 0.5">
+                      <p:cBhvr rctx="IE">
+                        <p:cTn dur="indefinite"/>
+                        <p:tgtEl>
+                          <p:spTgt spid="4"/>
+                        </p:tgtEl>
+                      </p:cBhvr>
+                    </p:animEffect>
+                  </p:childTnLst>
+                </p:cTn>
+              </p:par>
+            </p:tnLst>
+          </p:tmpl>
+          <p:tmpl lvl="5">
+            <p:tnLst>
+              <p:par>
+                <p:cTn presetID="9" presetClass="emph" presetSubtype="0" nodeType="withEffect">
+                  <p:stCondLst>
+                    <p:cond delay="0"/>
+                  </p:stCondLst>
+                  <p:childTnLst>
+                    <p:set>
+                      <p:cBhvr>
+                        <p:cTn dur="indefinite"/>
+                        <p:tgtEl>
+                          <p:spTgt spid="4"/>
+                        </p:tgtEl>
+                        <p:attrNameLst>
+                          <p:attrName>style.opacity</p:attrName>
+                        </p:attrNameLst>
+                      </p:cBhvr>
+                      <p:to>
+                        <p:strVal val="0.5"/>
+                      </p:to>
+                    </p:set>
+                    <p:animEffect filter="image" prLst="opacity: 0.5">
+                      <p:cBhvr rctx="IE">
+                        <p:cTn dur="indefinite"/>
+                        <p:tgtEl>
+                          <p:spTgt spid="4"/>
+                        </p:tgtEl>
+                      </p:cBhvr>
+                    </p:animEffect>
+                  </p:childTnLst>
+                </p:cTn>
+              </p:par>
+            </p:tnLst>
+          </p:tmpl>
+        </p:tmplLst>
+      </p:bldP>
+      <p:bldP spid="5" grpId="0" build="p">
+        <p:tmplLst>
+          <p:tmpl lvl="1">
+            <p:tnLst>
+              <p:par>
+                <p:cTn presetID="1" presetClass="entr" presetSubtype="0" fill="hold" nodeType="clickEffect">
+                  <p:stCondLst>
+                    <p:cond delay="0"/>
+                  </p:stCondLst>
+                  <p:childTnLst>
+                    <p:set>
+                      <p:cBhvr>
+                        <p:cTn dur="1" fill="hold">
+                          <p:stCondLst>
+                            <p:cond delay="0"/>
+                          </p:stCondLst>
+                        </p:cTn>
+                        <p:tgtEl>
+                          <p:spTgt spid="5"/>
+                        </p:tgtEl>
+                        <p:attrNameLst>
+                          <p:attrName>style.visibility</p:attrName>
+                        </p:attrNameLst>
+                      </p:cBhvr>
+                      <p:to>
+                        <p:strVal val="visible"/>
+                      </p:to>
+                    </p:set>
+                  </p:childTnLst>
+                </p:cTn>
+              </p:par>
+            </p:tnLst>
+          </p:tmpl>
+        </p:tmplLst>
+      </p:bldP>
+      <p:bldP spid="6" grpId="0" build="p">
+        <p:tmplLst>
+          <p:tmpl lvl="1">
+            <p:tnLst>
+              <p:par>
+                <p:cTn presetID="1" presetClass="entr" presetSubtype="0" fill="hold" nodeType="withEffect">
+                  <p:stCondLst>
+                    <p:cond delay="0"/>
+                  </p:stCondLst>
+                  <p:childTnLst>
+                    <p:set>
+                      <p:cBhvr>
+                        <p:cTn dur="1" fill="hold">
+                          <p:stCondLst>
+                            <p:cond delay="0"/>
+                          </p:stCondLst>
+                        </p:cTn>
+                        <p:tgtEl>
+                          <p:spTgt spid="6"/>
+                        </p:tgtEl>
+                        <p:attrNameLst>
+                          <p:attrName>style.visibility</p:attrName>
+                        </p:attrNameLst>
+                      </p:cBhvr>
+                      <p:to>
+                        <p:strVal val="visible"/>
+                      </p:to>
+                    </p:set>
+                  </p:childTnLst>
+                </p:cTn>
+              </p:par>
+            </p:tnLst>
+          </p:tmpl>
+          <p:tmpl lvl="2">
+            <p:tnLst>
+              <p:par>
+                <p:cTn presetID="1" presetClass="entr" presetSubtype="0" fill="hold" nodeType="withEffect">
+                  <p:stCondLst>
+                    <p:cond delay="0"/>
+                  </p:stCondLst>
+                  <p:childTnLst>
+                    <p:set>
+                      <p:cBhvr>
+                        <p:cTn dur="1" fill="hold">
+                          <p:stCondLst>
+                            <p:cond delay="0"/>
+                          </p:stCondLst>
+                        </p:cTn>
+                        <p:tgtEl>
+                          <p:spTgt spid="6"/>
+                        </p:tgtEl>
+                        <p:attrNameLst>
+                          <p:attrName>style.visibility</p:attrName>
+                        </p:attrNameLst>
+                      </p:cBhvr>
+                      <p:to>
+                        <p:strVal val="visible"/>
+                      </p:to>
+                    </p:set>
+                  </p:childTnLst>
+                </p:cTn>
+              </p:par>
+            </p:tnLst>
+          </p:tmpl>
+          <p:tmpl lvl="3">
+            <p:tnLst>
+              <p:par>
+                <p:cTn presetID="1" presetClass="entr" presetSubtype="0" fill="hold" nodeType="withEffect">
+                  <p:stCondLst>
+                    <p:cond delay="0"/>
+                  </p:stCondLst>
+                  <p:childTnLst>
+                    <p:set>
+                      <p:cBhvr>
+                        <p:cTn dur="1" fill="hold">
+                          <p:stCondLst>
+                            <p:cond delay="0"/>
+                          </p:stCondLst>
+                        </p:cTn>
+                        <p:tgtEl>
+                          <p:spTgt spid="6"/>
+                        </p:tgtEl>
+                        <p:attrNameLst>
+                          <p:attrName>style.visibility</p:attrName>
+                        </p:attrNameLst>
+                      </p:cBhvr>
+                      <p:to>
+                        <p:strVal val="visible"/>
+                      </p:to>
+                    </p:set>
+                  </p:childTnLst>
+                </p:cTn>
+              </p:par>
+            </p:tnLst>
+          </p:tmpl>
+          <p:tmpl lvl="4">
+            <p:tnLst>
+              <p:par>
+                <p:cTn presetID="1" presetClass="entr" presetSubtype="0" fill="hold" nodeType="withEffect">
+                  <p:stCondLst>
+                    <p:cond delay="0"/>
+                  </p:stCondLst>
+                  <p:childTnLst>
+                    <p:set>
+                      <p:cBhvr>
+                        <p:cTn dur="1" fill="hold">
+                          <p:stCondLst>
+                            <p:cond delay="0"/>
+                          </p:stCondLst>
+                        </p:cTn>
+                        <p:tgtEl>
+                          <p:spTgt spid="6"/>
+                        </p:tgtEl>
+                        <p:attrNameLst>
+                          <p:attrName>style.visibility</p:attrName>
+                        </p:attrNameLst>
+                      </p:cBhvr>
+                      <p:to>
+                        <p:strVal val="visible"/>
+                      </p:to>
+                    </p:set>
+                  </p:childTnLst>
+                </p:cTn>
+              </p:par>
+            </p:tnLst>
+          </p:tmpl>
+          <p:tmpl lvl="5">
+            <p:tnLst>
+              <p:par>
+                <p:cTn presetID="1" presetClass="entr" presetSubtype="0" fill="hold" nodeType="withEffect">
+                  <p:stCondLst>
+                    <p:cond delay="0"/>
+                  </p:stCondLst>
+                  <p:childTnLst>
+                    <p:set>
+                      <p:cBhvr>
+                        <p:cTn dur="1" fill="hold">
+                          <p:stCondLst>
+                            <p:cond delay="0"/>
+                          </p:stCondLst>
+                        </p:cTn>
+                        <p:tgtEl>
+                          <p:spTgt spid="6"/>
+                        </p:tgtEl>
+                        <p:attrNameLst>
+                          <p:attrName>style.visibility</p:attrName>
+                        </p:attrNameLst>
+                      </p:cBhvr>
+                      <p:to>
+                        <p:strVal val="visible"/>
+                      </p:to>
+                    </p:set>
+                  </p:childTnLst>
+                </p:cTn>
+              </p:par>
+            </p:tnLst>
+          </p:tmpl>
+        </p:tmplLst>
+      </p:bldP>
+    </p:bldLst>
+  </p:timing>
 </p:sldLayout>
 </file>
 
@@ -2655,7 +3537,7 @@
           </a:lstStyle>
           <a:p>
             <a:r>
-              <a:rPr lang="nl-NL"/>
+              <a:rPr lang="nl-NL" dirty="0"/>
               <a:t>Klik om stijl te bewerken</a:t>
             </a:r>
             <a:endParaRPr lang="en-US" dirty="0"/>

</xml_diff>

<commit_message>
Added large quote template
</commit_message>
<xml_diff>
--- a/data/powerpoint/template.pptx
+++ b/data/powerpoint/template.pptx
@@ -1376,6 +1376,137 @@
     <p:extLst>
       <p:ext uri="{BB962C8B-B14F-4D97-AF65-F5344CB8AC3E}">
         <p14:creationId xmlns:p14="http://schemas.microsoft.com/office/powerpoint/2010/main" val="473232637"/>
+      </p:ext>
+    </p:extLst>
+  </p:cSld>
+  <p:clrMapOvr>
+    <a:masterClrMapping/>
+  </p:clrMapOvr>
+</p:sldLayout>
+</file>
+
+<file path=ppt/slideLayouts/slideLayout14.xml><?xml version="1.0" encoding="utf-8"?>
+<p:sldLayout xmlns:a="http://schemas.openxmlformats.org/drawingml/2006/main" xmlns:r="http://schemas.openxmlformats.org/officeDocument/2006/relationships" xmlns:p="http://schemas.openxmlformats.org/presentationml/2006/main" preserve="1" userDrawn="1">
+  <p:cSld name="2_Titel en object">
+    <p:spTree>
+      <p:nvGrpSpPr>
+        <p:cNvPr id="1" name=""/>
+        <p:cNvGrpSpPr/>
+        <p:nvPr/>
+      </p:nvGrpSpPr>
+      <p:grpSpPr>
+        <a:xfrm>
+          <a:off x="0" y="0"/>
+          <a:ext cx="0" cy="0"/>
+          <a:chOff x="0" y="0"/>
+          <a:chExt cx="0" cy="0"/>
+        </a:xfrm>
+      </p:grpSpPr>
+      <p:sp>
+        <p:nvSpPr>
+          <p:cNvPr id="3" name="Content Placeholder 2"/>
+          <p:cNvSpPr>
+            <a:spLocks noGrp="1"/>
+          </p:cNvSpPr>
+          <p:nvPr>
+            <p:ph idx="1" hasCustomPrompt="1"/>
+          </p:nvPr>
+        </p:nvSpPr>
+        <p:spPr>
+          <a:xfrm>
+            <a:off x="838200" y="0"/>
+            <a:ext cx="10515600" cy="6858000"/>
+          </a:xfrm>
+        </p:spPr>
+        <p:txBody>
+          <a:bodyPr anchor="ctr">
+            <a:normAutofit/>
+          </a:bodyPr>
+          <a:lstStyle>
+            <a:lvl1pPr marL="0" indent="0" algn="ctr">
+              <a:buNone/>
+              <a:defRPr sz="5400"/>
+            </a:lvl1pPr>
+          </a:lstStyle>
+          <a:p>
+            <a:pPr lvl="0"/>
+            <a:r>
+              <a:rPr lang="nl-NL" dirty="0"/>
+              <a:t>TEKSTSTIJL VAN HET MODEL BEWERKEN</a:t>
+            </a:r>
+            <a:endParaRPr lang="en-US" dirty="0"/>
+          </a:p>
+        </p:txBody>
+      </p:sp>
+      <p:sp>
+        <p:nvSpPr>
+          <p:cNvPr id="4" name="Date Placeholder 3"/>
+          <p:cNvSpPr>
+            <a:spLocks noGrp="1"/>
+          </p:cNvSpPr>
+          <p:nvPr>
+            <p:ph type="dt" sz="half" idx="10"/>
+          </p:nvPr>
+        </p:nvSpPr>
+        <p:spPr/>
+        <p:txBody>
+          <a:bodyPr/>
+          <a:lstStyle/>
+          <a:p>
+            <a:fld id="{09E22B56-B39A-4609-ACAF-221672A708D5}" type="datetimeFigureOut">
+              <a:rPr lang="en-GB" smtClean="0"/>
+              <a:t>05/08/2018</a:t>
+            </a:fld>
+            <a:endParaRPr lang="en-GB"/>
+          </a:p>
+        </p:txBody>
+      </p:sp>
+      <p:sp>
+        <p:nvSpPr>
+          <p:cNvPr id="5" name="Footer Placeholder 4"/>
+          <p:cNvSpPr>
+            <a:spLocks noGrp="1"/>
+          </p:cNvSpPr>
+          <p:nvPr>
+            <p:ph type="ftr" sz="quarter" idx="11"/>
+          </p:nvPr>
+        </p:nvSpPr>
+        <p:spPr/>
+        <p:txBody>
+          <a:bodyPr/>
+          <a:lstStyle/>
+          <a:p>
+            <a:endParaRPr lang="en-GB"/>
+          </a:p>
+        </p:txBody>
+      </p:sp>
+      <p:sp>
+        <p:nvSpPr>
+          <p:cNvPr id="6" name="Slide Number Placeholder 5"/>
+          <p:cNvSpPr>
+            <a:spLocks noGrp="1"/>
+          </p:cNvSpPr>
+          <p:nvPr>
+            <p:ph type="sldNum" sz="quarter" idx="12"/>
+          </p:nvPr>
+        </p:nvSpPr>
+        <p:spPr/>
+        <p:txBody>
+          <a:bodyPr/>
+          <a:lstStyle/>
+          <a:p>
+            <a:fld id="{1F469EBC-A649-4E3E-8046-4745AB923F3E}" type="slidenum">
+              <a:rPr lang="en-GB" smtClean="0"/>
+              <a:t>‹nr.›</a:t>
+            </a:fld>
+            <a:endParaRPr lang="en-GB"/>
+          </a:p>
+        </p:txBody>
+      </p:sp>
+    </p:spTree>
+    <p:extLst>
+      <p:ext uri="{BB962C8B-B14F-4D97-AF65-F5344CB8AC3E}">
+        <p14:creationId xmlns:p14="http://schemas.microsoft.com/office/powerpoint/2010/main" val="2432124027"/>
       </p:ext>
     </p:extLst>
   </p:cSld>
@@ -4310,6 +4441,7 @@
     <p:sldLayoutId id="2147483683" r:id="rId11"/>
     <p:sldLayoutId id="2147483684" r:id="rId12"/>
     <p:sldLayoutId id="2147483685" r:id="rId13"/>
+    <p:sldLayoutId id="2147483686" r:id="rId14"/>
   </p:sldLayoutIdLst>
   <p:txStyles>
     <p:titleStyle>

</xml_diff>

<commit_message>
Added generation using tupled generators
</commit_message>
<xml_diff>
--- a/data/powerpoint/template.pptx
+++ b/data/powerpoint/template.pptx
@@ -1513,6 +1513,595 @@
   <p:clrMapOvr>
     <a:masterClrMapping/>
   </p:clrMapOvr>
+</p:sldLayout>
+</file>
+
+<file path=ppt/slideLayouts/slideLayout15.xml><?xml version="1.0" encoding="utf-8"?>
+<p:sldLayout xmlns:a="http://schemas.openxmlformats.org/drawingml/2006/main" xmlns:r="http://schemas.openxmlformats.org/officeDocument/2006/relationships" xmlns:p="http://schemas.openxmlformats.org/presentationml/2006/main" preserve="1" userDrawn="1">
+  <p:cSld name="1_Vergelijking">
+    <p:spTree>
+      <p:nvGrpSpPr>
+        <p:cNvPr id="1" name=""/>
+        <p:cNvGrpSpPr/>
+        <p:nvPr/>
+      </p:nvGrpSpPr>
+      <p:grpSpPr>
+        <a:xfrm>
+          <a:off x="0" y="0"/>
+          <a:ext cx="0" cy="0"/>
+          <a:chOff x="0" y="0"/>
+          <a:chExt cx="0" cy="0"/>
+        </a:xfrm>
+      </p:grpSpPr>
+      <p:sp>
+        <p:nvSpPr>
+          <p:cNvPr id="2" name="Title 1"/>
+          <p:cNvSpPr>
+            <a:spLocks noGrp="1"/>
+          </p:cNvSpPr>
+          <p:nvPr>
+            <p:ph type="title"/>
+          </p:nvPr>
+        </p:nvSpPr>
+        <p:spPr>
+          <a:xfrm>
+            <a:off x="839788" y="365125"/>
+            <a:ext cx="10515600" cy="774000"/>
+          </a:xfrm>
+        </p:spPr>
+        <p:txBody>
+          <a:bodyPr/>
+          <a:lstStyle/>
+          <a:p>
+            <a:r>
+              <a:rPr lang="nl-NL"/>
+              <a:t>Klik om stijl te bewerken</a:t>
+            </a:r>
+            <a:endParaRPr lang="en-US" dirty="0"/>
+          </a:p>
+        </p:txBody>
+      </p:sp>
+      <p:sp>
+        <p:nvSpPr>
+          <p:cNvPr id="3" name="Text Placeholder 2"/>
+          <p:cNvSpPr>
+            <a:spLocks noGrp="1"/>
+          </p:cNvSpPr>
+          <p:nvPr>
+            <p:ph type="body" idx="1"/>
+          </p:nvPr>
+        </p:nvSpPr>
+        <p:spPr>
+          <a:xfrm>
+            <a:off x="839788" y="1185863"/>
+            <a:ext cx="5157787" cy="823912"/>
+          </a:xfrm>
+        </p:spPr>
+        <p:txBody>
+          <a:bodyPr anchor="ctr"/>
+          <a:lstStyle>
+            <a:lvl1pPr marL="0" indent="0" algn="ctr">
+              <a:buNone/>
+              <a:defRPr sz="2400" b="1"/>
+            </a:lvl1pPr>
+            <a:lvl2pPr marL="457200" indent="0">
+              <a:buNone/>
+              <a:defRPr sz="2000" b="1"/>
+            </a:lvl2pPr>
+            <a:lvl3pPr marL="914400" indent="0">
+              <a:buNone/>
+              <a:defRPr sz="1800" b="1"/>
+            </a:lvl3pPr>
+            <a:lvl4pPr marL="1371600" indent="0">
+              <a:buNone/>
+              <a:defRPr sz="1600" b="1"/>
+            </a:lvl4pPr>
+            <a:lvl5pPr marL="1828800" indent="0">
+              <a:buNone/>
+              <a:defRPr sz="1600" b="1"/>
+            </a:lvl5pPr>
+            <a:lvl6pPr marL="2286000" indent="0">
+              <a:buNone/>
+              <a:defRPr sz="1600" b="1"/>
+            </a:lvl6pPr>
+            <a:lvl7pPr marL="2743200" indent="0">
+              <a:buNone/>
+              <a:defRPr sz="1600" b="1"/>
+            </a:lvl7pPr>
+            <a:lvl8pPr marL="3200400" indent="0">
+              <a:buNone/>
+              <a:defRPr sz="1600" b="1"/>
+            </a:lvl8pPr>
+            <a:lvl9pPr marL="3657600" indent="0">
+              <a:buNone/>
+              <a:defRPr sz="1600" b="1"/>
+            </a:lvl9pPr>
+          </a:lstStyle>
+          <a:p>
+            <a:pPr lvl="0"/>
+            <a:r>
+              <a:rPr lang="nl-NL"/>
+              <a:t>Tekststijl van het model bewerken</a:t>
+            </a:r>
+          </a:p>
+        </p:txBody>
+      </p:sp>
+      <p:sp>
+        <p:nvSpPr>
+          <p:cNvPr id="7" name="Date Placeholder 6"/>
+          <p:cNvSpPr>
+            <a:spLocks noGrp="1"/>
+          </p:cNvSpPr>
+          <p:nvPr>
+            <p:ph type="dt" sz="half" idx="10"/>
+          </p:nvPr>
+        </p:nvSpPr>
+        <p:spPr/>
+        <p:txBody>
+          <a:bodyPr/>
+          <a:lstStyle/>
+          <a:p>
+            <a:fld id="{09E22B56-B39A-4609-ACAF-221672A708D5}" type="datetimeFigureOut">
+              <a:rPr lang="en-GB" smtClean="0"/>
+              <a:t>05/08/2018</a:t>
+            </a:fld>
+            <a:endParaRPr lang="en-GB"/>
+          </a:p>
+        </p:txBody>
+      </p:sp>
+      <p:sp>
+        <p:nvSpPr>
+          <p:cNvPr id="8" name="Footer Placeholder 7"/>
+          <p:cNvSpPr>
+            <a:spLocks noGrp="1"/>
+          </p:cNvSpPr>
+          <p:nvPr>
+            <p:ph type="ftr" sz="quarter" idx="11"/>
+          </p:nvPr>
+        </p:nvSpPr>
+        <p:spPr/>
+        <p:txBody>
+          <a:bodyPr/>
+          <a:lstStyle/>
+          <a:p>
+            <a:endParaRPr lang="en-GB"/>
+          </a:p>
+        </p:txBody>
+      </p:sp>
+      <p:sp>
+        <p:nvSpPr>
+          <p:cNvPr id="9" name="Slide Number Placeholder 8"/>
+          <p:cNvSpPr>
+            <a:spLocks noGrp="1"/>
+          </p:cNvSpPr>
+          <p:nvPr>
+            <p:ph type="sldNum" sz="quarter" idx="12"/>
+          </p:nvPr>
+        </p:nvSpPr>
+        <p:spPr/>
+        <p:txBody>
+          <a:bodyPr/>
+          <a:lstStyle/>
+          <a:p>
+            <a:fld id="{1F469EBC-A649-4E3E-8046-4745AB923F3E}" type="slidenum">
+              <a:rPr lang="en-GB" smtClean="0"/>
+              <a:t>‹nr.›</a:t>
+            </a:fld>
+            <a:endParaRPr lang="en-GB"/>
+          </a:p>
+        </p:txBody>
+      </p:sp>
+      <p:sp>
+        <p:nvSpPr>
+          <p:cNvPr id="5" name="Text Placeholder 4"/>
+          <p:cNvSpPr>
+            <a:spLocks noGrp="1"/>
+          </p:cNvSpPr>
+          <p:nvPr>
+            <p:ph type="body" sz="quarter" idx="3"/>
+          </p:nvPr>
+        </p:nvSpPr>
+        <p:spPr>
+          <a:xfrm>
+            <a:off x="6169024" y="1185863"/>
+            <a:ext cx="5183188" cy="823912"/>
+          </a:xfrm>
+        </p:spPr>
+        <p:txBody>
+          <a:bodyPr anchor="ctr"/>
+          <a:lstStyle>
+            <a:lvl1pPr marL="0" indent="0" algn="ctr">
+              <a:buNone/>
+              <a:defRPr sz="2400" b="1"/>
+            </a:lvl1pPr>
+            <a:lvl2pPr marL="457200" indent="0">
+              <a:buNone/>
+              <a:defRPr sz="2000" b="1"/>
+            </a:lvl2pPr>
+            <a:lvl3pPr marL="914400" indent="0">
+              <a:buNone/>
+              <a:defRPr sz="1800" b="1"/>
+            </a:lvl3pPr>
+            <a:lvl4pPr marL="1371600" indent="0">
+              <a:buNone/>
+              <a:defRPr sz="1600" b="1"/>
+            </a:lvl4pPr>
+            <a:lvl5pPr marL="1828800" indent="0">
+              <a:buNone/>
+              <a:defRPr sz="1600" b="1"/>
+            </a:lvl5pPr>
+            <a:lvl6pPr marL="2286000" indent="0">
+              <a:buNone/>
+              <a:defRPr sz="1600" b="1"/>
+            </a:lvl6pPr>
+            <a:lvl7pPr marL="2743200" indent="0">
+              <a:buNone/>
+              <a:defRPr sz="1600" b="1"/>
+            </a:lvl7pPr>
+            <a:lvl8pPr marL="3200400" indent="0">
+              <a:buNone/>
+              <a:defRPr sz="1600" b="1"/>
+            </a:lvl8pPr>
+            <a:lvl9pPr marL="3657600" indent="0">
+              <a:buNone/>
+              <a:defRPr sz="1600" b="1"/>
+            </a:lvl9pPr>
+          </a:lstStyle>
+          <a:p>
+            <a:pPr lvl="0"/>
+            <a:r>
+              <a:rPr lang="nl-NL" dirty="0"/>
+              <a:t>Tekststijl van het model bewerken</a:t>
+            </a:r>
+          </a:p>
+        </p:txBody>
+      </p:sp>
+      <p:sp>
+        <p:nvSpPr>
+          <p:cNvPr id="10" name="Picture Placeholder 2">
+            <a:extLst>
+              <a:ext uri="{FF2B5EF4-FFF2-40B4-BE49-F238E27FC236}">
+                <a16:creationId xmlns:a16="http://schemas.microsoft.com/office/drawing/2014/main" id="{F6240A81-61E1-4F0E-8486-34C6FA7C8F1D}"/>
+              </a:ext>
+            </a:extLst>
+          </p:cNvPr>
+          <p:cNvSpPr>
+            <a:spLocks noGrp="1" noChangeAspect="1"/>
+          </p:cNvSpPr>
+          <p:nvPr>
+            <p:ph type="pic" idx="13"/>
+          </p:nvPr>
+        </p:nvSpPr>
+        <p:spPr>
+          <a:xfrm>
+            <a:off x="824706" y="2009775"/>
+            <a:ext cx="5172869" cy="4346575"/>
+          </a:xfrm>
+        </p:spPr>
+        <p:txBody>
+          <a:bodyPr anchor="t"/>
+          <a:lstStyle>
+            <a:lvl1pPr marL="0" indent="0">
+              <a:buNone/>
+              <a:defRPr sz="3200"/>
+            </a:lvl1pPr>
+            <a:lvl2pPr marL="457200" indent="0">
+              <a:buNone/>
+              <a:defRPr sz="2800"/>
+            </a:lvl2pPr>
+            <a:lvl3pPr marL="914400" indent="0">
+              <a:buNone/>
+              <a:defRPr sz="2400"/>
+            </a:lvl3pPr>
+            <a:lvl4pPr marL="1371600" indent="0">
+              <a:buNone/>
+              <a:defRPr sz="2000"/>
+            </a:lvl4pPr>
+            <a:lvl5pPr marL="1828800" indent="0">
+              <a:buNone/>
+              <a:defRPr sz="2000"/>
+            </a:lvl5pPr>
+            <a:lvl6pPr marL="2286000" indent="0">
+              <a:buNone/>
+              <a:defRPr sz="2000"/>
+            </a:lvl6pPr>
+            <a:lvl7pPr marL="2743200" indent="0">
+              <a:buNone/>
+              <a:defRPr sz="2000"/>
+            </a:lvl7pPr>
+            <a:lvl8pPr marL="3200400" indent="0">
+              <a:buNone/>
+              <a:defRPr sz="2000"/>
+            </a:lvl8pPr>
+            <a:lvl9pPr marL="3657600" indent="0">
+              <a:buNone/>
+              <a:defRPr sz="2000"/>
+            </a:lvl9pPr>
+          </a:lstStyle>
+          <a:p>
+            <a:r>
+              <a:rPr lang="nl-NL"/>
+              <a:t>Klik op het pictogram als u een afbeelding wilt toevoegen</a:t>
+            </a:r>
+            <a:endParaRPr lang="en-US" dirty="0"/>
+          </a:p>
+        </p:txBody>
+      </p:sp>
+      <p:sp>
+        <p:nvSpPr>
+          <p:cNvPr id="13" name="Picture Placeholder 2">
+            <a:extLst>
+              <a:ext uri="{FF2B5EF4-FFF2-40B4-BE49-F238E27FC236}">
+                <a16:creationId xmlns:a16="http://schemas.microsoft.com/office/drawing/2014/main" id="{0B9372D3-59C0-456D-89B2-9ED076865C2E}"/>
+              </a:ext>
+            </a:extLst>
+          </p:cNvPr>
+          <p:cNvSpPr>
+            <a:spLocks noGrp="1" noChangeAspect="1"/>
+          </p:cNvSpPr>
+          <p:nvPr>
+            <p:ph type="pic" idx="14"/>
+          </p:nvPr>
+        </p:nvSpPr>
+        <p:spPr>
+          <a:xfrm>
+            <a:off x="6165848" y="2009775"/>
+            <a:ext cx="5172869" cy="4346575"/>
+          </a:xfrm>
+        </p:spPr>
+        <p:txBody>
+          <a:bodyPr anchor="t"/>
+          <a:lstStyle>
+            <a:lvl1pPr marL="0" indent="0">
+              <a:buNone/>
+              <a:defRPr sz="3200"/>
+            </a:lvl1pPr>
+            <a:lvl2pPr marL="457200" indent="0">
+              <a:buNone/>
+              <a:defRPr sz="2800"/>
+            </a:lvl2pPr>
+            <a:lvl3pPr marL="914400" indent="0">
+              <a:buNone/>
+              <a:defRPr sz="2400"/>
+            </a:lvl3pPr>
+            <a:lvl4pPr marL="1371600" indent="0">
+              <a:buNone/>
+              <a:defRPr sz="2000"/>
+            </a:lvl4pPr>
+            <a:lvl5pPr marL="1828800" indent="0">
+              <a:buNone/>
+              <a:defRPr sz="2000"/>
+            </a:lvl5pPr>
+            <a:lvl6pPr marL="2286000" indent="0">
+              <a:buNone/>
+              <a:defRPr sz="2000"/>
+            </a:lvl6pPr>
+            <a:lvl7pPr marL="2743200" indent="0">
+              <a:buNone/>
+              <a:defRPr sz="2000"/>
+            </a:lvl7pPr>
+            <a:lvl8pPr marL="3200400" indent="0">
+              <a:buNone/>
+              <a:defRPr sz="2000"/>
+            </a:lvl8pPr>
+            <a:lvl9pPr marL="3657600" indent="0">
+              <a:buNone/>
+              <a:defRPr sz="2000"/>
+            </a:lvl9pPr>
+          </a:lstStyle>
+          <a:p>
+            <a:r>
+              <a:rPr lang="nl-NL"/>
+              <a:t>Klik op het pictogram als u een afbeelding wilt toevoegen</a:t>
+            </a:r>
+            <a:endParaRPr lang="en-US" dirty="0"/>
+          </a:p>
+        </p:txBody>
+      </p:sp>
+    </p:spTree>
+    <p:extLst>
+      <p:ext uri="{BB962C8B-B14F-4D97-AF65-F5344CB8AC3E}">
+        <p14:creationId xmlns:p14="http://schemas.microsoft.com/office/powerpoint/2010/main" val="2423791778"/>
+      </p:ext>
+    </p:extLst>
+  </p:cSld>
+  <p:clrMapOvr>
+    <a:masterClrMapping/>
+  </p:clrMapOvr>
+  <p:timing>
+    <p:tnLst>
+      <p:par>
+        <p:cTn id="1" dur="indefinite" restart="never" nodeType="tmRoot">
+          <p:childTnLst>
+            <p:seq concurrent="1" nextAc="seek">
+              <p:cTn id="2" dur="indefinite" nodeType="mainSeq">
+                <p:childTnLst>
+                  <p:par>
+                    <p:cTn id="3" fill="hold">
+                      <p:stCondLst>
+                        <p:cond delay="indefinite"/>
+                      </p:stCondLst>
+                      <p:childTnLst>
+                        <p:par>
+                          <p:cTn id="4" fill="hold">
+                            <p:stCondLst>
+                              <p:cond delay="0"/>
+                            </p:stCondLst>
+                            <p:childTnLst>
+                              <p:par>
+                                <p:cTn id="5" presetID="1" presetClass="entr" presetSubtype="0" fill="hold" grpId="0" nodeType="clickEffect">
+                                  <p:stCondLst>
+                                    <p:cond delay="0"/>
+                                  </p:stCondLst>
+                                  <p:childTnLst>
+                                    <p:set>
+                                      <p:cBhvr>
+                                        <p:cTn id="6" dur="1" fill="hold">
+                                          <p:stCondLst>
+                                            <p:cond delay="0"/>
+                                          </p:stCondLst>
+                                        </p:cTn>
+                                        <p:tgtEl>
+                                          <p:spTgt spid="5">
+                                            <p:txEl>
+                                              <p:pRg st="0" end="0"/>
+                                            </p:txEl>
+                                          </p:spTgt>
+                                        </p:tgtEl>
+                                        <p:attrNameLst>
+                                          <p:attrName>style.visibility</p:attrName>
+                                        </p:attrNameLst>
+                                      </p:cBhvr>
+                                      <p:to>
+                                        <p:strVal val="visible"/>
+                                      </p:to>
+                                    </p:set>
+                                  </p:childTnLst>
+                                </p:cTn>
+                              </p:par>
+                              <p:par>
+                                <p:cTn id="7" presetID="9" presetClass="emph" presetSubtype="0" grpId="0" nodeType="withEffect">
+                                  <p:stCondLst>
+                                    <p:cond delay="0"/>
+                                  </p:stCondLst>
+                                  <p:childTnLst>
+                                    <p:set>
+                                      <p:cBhvr>
+                                        <p:cTn id="8" dur="indefinite"/>
+                                        <p:tgtEl>
+                                          <p:spTgt spid="3">
+                                            <p:txEl>
+                                              <p:pRg st="0" end="0"/>
+                                            </p:txEl>
+                                          </p:spTgt>
+                                        </p:tgtEl>
+                                        <p:attrNameLst>
+                                          <p:attrName>style.opacity</p:attrName>
+                                        </p:attrNameLst>
+                                      </p:cBhvr>
+                                      <p:to>
+                                        <p:strVal val="0.5"/>
+                                      </p:to>
+                                    </p:set>
+                                    <p:animEffect filter="image" prLst="opacity: 0.5">
+                                      <p:cBhvr rctx="IE">
+                                        <p:cTn id="9" dur="indefinite"/>
+                                        <p:tgtEl>
+                                          <p:spTgt spid="3">
+                                            <p:txEl>
+                                              <p:pRg st="0" end="0"/>
+                                            </p:txEl>
+                                          </p:spTgt>
+                                        </p:tgtEl>
+                                      </p:cBhvr>
+                                    </p:animEffect>
+                                  </p:childTnLst>
+                                </p:cTn>
+                              </p:par>
+                            </p:childTnLst>
+                          </p:cTn>
+                        </p:par>
+                      </p:childTnLst>
+                    </p:cTn>
+                  </p:par>
+                </p:childTnLst>
+              </p:cTn>
+              <p:prevCondLst>
+                <p:cond evt="onPrev" delay="0">
+                  <p:tgtEl>
+                    <p:sldTgt/>
+                  </p:tgtEl>
+                </p:cond>
+              </p:prevCondLst>
+              <p:nextCondLst>
+                <p:cond evt="onNext" delay="0">
+                  <p:tgtEl>
+                    <p:sldTgt/>
+                  </p:tgtEl>
+                </p:cond>
+              </p:nextCondLst>
+            </p:seq>
+          </p:childTnLst>
+        </p:cTn>
+      </p:par>
+    </p:tnLst>
+    <p:bldLst>
+      <p:bldP spid="3" grpId="0" build="p">
+        <p:tmplLst>
+          <p:tmpl lvl="1">
+            <p:tnLst>
+              <p:par>
+                <p:cTn presetID="9" presetClass="emph" presetSubtype="0" nodeType="withEffect">
+                  <p:stCondLst>
+                    <p:cond delay="0"/>
+                  </p:stCondLst>
+                  <p:childTnLst>
+                    <p:set>
+                      <p:cBhvr>
+                        <p:cTn dur="indefinite"/>
+                        <p:tgtEl>
+                          <p:spTgt spid="3"/>
+                        </p:tgtEl>
+                        <p:attrNameLst>
+                          <p:attrName>style.opacity</p:attrName>
+                        </p:attrNameLst>
+                      </p:cBhvr>
+                      <p:to>
+                        <p:strVal val="0.5"/>
+                      </p:to>
+                    </p:set>
+                    <p:animEffect filter="image" prLst="opacity: 0.5">
+                      <p:cBhvr rctx="IE">
+                        <p:cTn dur="indefinite"/>
+                        <p:tgtEl>
+                          <p:spTgt spid="3"/>
+                        </p:tgtEl>
+                      </p:cBhvr>
+                    </p:animEffect>
+                  </p:childTnLst>
+                </p:cTn>
+              </p:par>
+            </p:tnLst>
+          </p:tmpl>
+        </p:tmplLst>
+      </p:bldP>
+      <p:bldP spid="5" grpId="0" build="p">
+        <p:tmplLst>
+          <p:tmpl lvl="1">
+            <p:tnLst>
+              <p:par>
+                <p:cTn presetID="1" presetClass="entr" presetSubtype="0" fill="hold" nodeType="clickEffect">
+                  <p:stCondLst>
+                    <p:cond delay="0"/>
+                  </p:stCondLst>
+                  <p:childTnLst>
+                    <p:set>
+                      <p:cBhvr>
+                        <p:cTn dur="1" fill="hold">
+                          <p:stCondLst>
+                            <p:cond delay="0"/>
+                          </p:stCondLst>
+                        </p:cTn>
+                        <p:tgtEl>
+                          <p:spTgt spid="5"/>
+                        </p:tgtEl>
+                        <p:attrNameLst>
+                          <p:attrName>style.visibility</p:attrName>
+                        </p:attrNameLst>
+                      </p:cBhvr>
+                      <p:to>
+                        <p:strVal val="visible"/>
+                      </p:to>
+                    </p:set>
+                  </p:childTnLst>
+                </p:cTn>
+              </p:par>
+            </p:tnLst>
+          </p:tmpl>
+        </p:tmplLst>
+      </p:bldP>
+    </p:bldLst>
+  </p:timing>
 </p:sldLayout>
 </file>
 
@@ -4442,6 +5031,7 @@
     <p:sldLayoutId id="2147483684" r:id="rId12"/>
     <p:sldLayoutId id="2147483685" r:id="rId13"/>
     <p:sldLayoutId id="2147483686" r:id="rId14"/>
+    <p:sldLayoutId id="2147483687" r:id="rId15"/>
   </p:sldLayoutIdLst>
   <p:txStyles>
     <p:titleStyle>

</xml_diff>

<commit_message>
Added animations to the double captions slide template
</commit_message>
<xml_diff>
--- a/data/powerpoint/template.pptx
+++ b/data/powerpoint/template.pptx
@@ -1891,7 +1891,7 @@
           </a:lstStyle>
           <a:p>
             <a:r>
-              <a:rPr lang="nl-NL"/>
+              <a:rPr lang="nl-NL" dirty="0"/>
               <a:t>Klik op het pictogram als u een afbeelding wilt toevoegen</a:t>
             </a:r>
             <a:endParaRPr lang="en-US" dirty="0"/>
@@ -1960,14 +1960,41 @@
                                 </p:cTn>
                               </p:par>
                               <p:par>
-                                <p:cTn id="7" presetID="9" presetClass="emph" presetSubtype="0" grpId="0" nodeType="withEffect">
+                                <p:cTn id="7" presetID="1" presetClass="entr" presetSubtype="0" fill="hold" grpId="0" nodeType="withEffect">
                                   <p:stCondLst>
                                     <p:cond delay="0"/>
                                   </p:stCondLst>
                                   <p:childTnLst>
                                     <p:set>
                                       <p:cBhvr>
-                                        <p:cTn id="8" dur="indefinite"/>
+                                        <p:cTn id="8" dur="1" fill="hold">
+                                          <p:stCondLst>
+                                            <p:cond delay="0"/>
+                                          </p:stCondLst>
+                                        </p:cTn>
+                                        <p:tgtEl>
+                                          <p:spTgt spid="13"/>
+                                        </p:tgtEl>
+                                        <p:attrNameLst>
+                                          <p:attrName>style.visibility</p:attrName>
+                                        </p:attrNameLst>
+                                      </p:cBhvr>
+                                      <p:to>
+                                        <p:strVal val="visible"/>
+                                      </p:to>
+                                    </p:set>
+                                  </p:childTnLst>
+                                </p:cTn>
+                              </p:par>
+                              <p:par>
+                                <p:cTn id="9" presetID="9" presetClass="emph" presetSubtype="0" grpId="0" nodeType="withEffect">
+                                  <p:stCondLst>
+                                    <p:cond delay="0"/>
+                                  </p:stCondLst>
+                                  <p:childTnLst>
+                                    <p:set>
+                                      <p:cBhvr>
+                                        <p:cTn id="10" dur="indefinite"/>
                                         <p:tgtEl>
                                           <p:spTgt spid="3">
                                             <p:txEl>
@@ -1985,13 +2012,44 @@
                                     </p:set>
                                     <p:animEffect filter="image" prLst="opacity: 0.5">
                                       <p:cBhvr rctx="IE">
-                                        <p:cTn id="9" dur="indefinite"/>
+                                        <p:cTn id="11" dur="indefinite"/>
                                         <p:tgtEl>
                                           <p:spTgt spid="3">
                                             <p:txEl>
                                               <p:pRg st="0" end="0"/>
                                             </p:txEl>
                                           </p:spTgt>
+                                        </p:tgtEl>
+                                      </p:cBhvr>
+                                    </p:animEffect>
+                                  </p:childTnLst>
+                                </p:cTn>
+                              </p:par>
+                              <p:par>
+                                <p:cTn id="12" presetID="9" presetClass="emph" presetSubtype="0" grpId="0" nodeType="withEffect">
+                                  <p:stCondLst>
+                                    <p:cond delay="0"/>
+                                  </p:stCondLst>
+                                  <p:childTnLst>
+                                    <p:set>
+                                      <p:cBhvr>
+                                        <p:cTn id="13" dur="indefinite"/>
+                                        <p:tgtEl>
+                                          <p:spTgt spid="10"/>
+                                        </p:tgtEl>
+                                        <p:attrNameLst>
+                                          <p:attrName>style.opacity</p:attrName>
+                                        </p:attrNameLst>
+                                      </p:cBhvr>
+                                      <p:to>
+                                        <p:strVal val="0.5"/>
+                                      </p:to>
+                                    </p:set>
+                                    <p:animEffect filter="image" prLst="opacity: 0.5">
+                                      <p:cBhvr rctx="IE">
+                                        <p:cTn id="14" dur="indefinite"/>
+                                        <p:tgtEl>
+                                          <p:spTgt spid="10"/>
                                         </p:tgtEl>
                                       </p:cBhvr>
                                     </p:animEffect>
@@ -2100,6 +2158,8 @@
           </p:tmpl>
         </p:tmplLst>
       </p:bldP>
+      <p:bldP spid="10" grpId="0"/>
+      <p:bldP spid="13" grpId="0"/>
     </p:bldLst>
   </p:timing>
 </p:sldLayout>

</xml_diff>

<commit_message>
Updated powerpoint template: quote styling
</commit_message>
<xml_diff>
--- a/data/powerpoint/template.pptx
+++ b/data/powerpoint/template.pptx
@@ -197,7 +197,7 @@
           <a:p>
             <a:fld id="{FEE386D4-E0F5-48ED-B382-C5D6AB88A5B0}" type="datetimeFigureOut">
               <a:rPr lang="en-GB" smtClean="0"/>
-              <a:t>10/08/2018</a:t>
+              <a:t>11/08/2018</a:t>
             </a:fld>
             <a:endParaRPr lang="en-GB"/>
           </a:p>
@@ -596,7 +596,7 @@
           <a:p>
             <a:fld id="{09E22B56-B39A-4609-ACAF-221672A708D5}" type="datetimeFigureOut">
               <a:rPr lang="en-GB" smtClean="0"/>
-              <a:t>10/08/2018</a:t>
+              <a:t>11/08/2018</a:t>
             </a:fld>
             <a:endParaRPr lang="en-GB"/>
           </a:p>
@@ -766,7 +766,7 @@
           <a:p>
             <a:fld id="{09E22B56-B39A-4609-ACAF-221672A708D5}" type="datetimeFigureOut">
               <a:rPr lang="en-GB" smtClean="0"/>
-              <a:t>10/08/2018</a:t>
+              <a:t>11/08/2018</a:t>
             </a:fld>
             <a:endParaRPr lang="en-GB"/>
           </a:p>
@@ -946,7 +946,7 @@
           <a:p>
             <a:fld id="{09E22B56-B39A-4609-ACAF-221672A708D5}" type="datetimeFigureOut">
               <a:rPr lang="en-GB" smtClean="0"/>
-              <a:t>10/08/2018</a:t>
+              <a:t>11/08/2018</a:t>
             </a:fld>
             <a:endParaRPr lang="en-GB"/>
           </a:p>
@@ -1135,7 +1135,7 @@
           <a:p>
             <a:fld id="{09E22B56-B39A-4609-ACAF-221672A708D5}" type="datetimeFigureOut">
               <a:rPr lang="en-GB" smtClean="0"/>
-              <a:t>10/08/2018</a:t>
+              <a:t>11/08/2018</a:t>
             </a:fld>
             <a:endParaRPr lang="en-GB"/>
           </a:p>
@@ -1253,7 +1253,7 @@
           <a:p>
             <a:fld id="{09E22B56-B39A-4609-ACAF-221672A708D5}" type="datetimeFigureOut">
               <a:rPr lang="en-GB" smtClean="0"/>
-              <a:t>10/08/2018</a:t>
+              <a:t>11/08/2018</a:t>
             </a:fld>
             <a:endParaRPr lang="en-GB"/>
           </a:p>
@@ -1455,7 +1455,7 @@
           <a:p>
             <a:fld id="{09E22B56-B39A-4609-ACAF-221672A708D5}" type="datetimeFigureOut">
               <a:rPr lang="en-GB" smtClean="0"/>
-              <a:t>10/08/2018</a:t>
+              <a:t>11/08/2018</a:t>
             </a:fld>
             <a:endParaRPr lang="en-GB"/>
           </a:p>
@@ -1643,7 +1643,7 @@
           <a:p>
             <a:fld id="{09E22B56-B39A-4609-ACAF-221672A708D5}" type="datetimeFigureOut">
               <a:rPr lang="en-GB" smtClean="0"/>
-              <a:t>10/08/2018</a:t>
+              <a:t>11/08/2018</a:t>
             </a:fld>
             <a:endParaRPr lang="en-GB"/>
           </a:p>
@@ -1779,11 +1779,17 @@
           </a:xfrm>
         </p:spPr>
         <p:txBody>
-          <a:bodyPr anchor="t"/>
+          <a:bodyPr anchor="ctr"/>
           <a:lstStyle>
             <a:lvl1pPr marL="0" indent="0" algn="ctr">
               <a:buNone/>
-              <a:defRPr sz="3200"/>
+              <a:defRPr sz="3200" i="1">
+                <a:solidFill>
+                  <a:schemeClr val="accent3">
+                    <a:lumMod val="75000"/>
+                  </a:schemeClr>
+                </a:solidFill>
+              </a:defRPr>
             </a:lvl1pPr>
             <a:lvl2pPr marL="457200" indent="0">
               <a:buNone/>
@@ -1850,11 +1856,17 @@
           </a:xfrm>
         </p:spPr>
         <p:txBody>
-          <a:bodyPr anchor="t"/>
+          <a:bodyPr anchor="ctr"/>
           <a:lstStyle>
             <a:lvl1pPr marL="0" indent="0" algn="ctr">
               <a:buNone/>
-              <a:defRPr sz="3200"/>
+              <a:defRPr sz="3200" i="1">
+                <a:solidFill>
+                  <a:schemeClr val="accent3">
+                    <a:lumMod val="75000"/>
+                  </a:schemeClr>
+                </a:solidFill>
+              </a:defRPr>
             </a:lvl1pPr>
             <a:lvl2pPr marL="457200" indent="0">
               <a:buNone/>
@@ -2274,7 +2286,7 @@
           <a:p>
             <a:fld id="{09E22B56-B39A-4609-ACAF-221672A708D5}" type="datetimeFigureOut">
               <a:rPr lang="en-GB" smtClean="0"/>
-              <a:t>10/08/2018</a:t>
+              <a:t>11/08/2018</a:t>
             </a:fld>
             <a:endParaRPr lang="en-GB"/>
           </a:p>
@@ -2520,7 +2532,7 @@
           <a:p>
             <a:fld id="{09E22B56-B39A-4609-ACAF-221672A708D5}" type="datetimeFigureOut">
               <a:rPr lang="en-GB" smtClean="0"/>
-              <a:t>10/08/2018</a:t>
+              <a:t>11/08/2018</a:t>
             </a:fld>
             <a:endParaRPr lang="en-GB"/>
           </a:p>
@@ -2752,7 +2764,7 @@
           <a:p>
             <a:fld id="{09E22B56-B39A-4609-ACAF-221672A708D5}" type="datetimeFigureOut">
               <a:rPr lang="en-GB" smtClean="0"/>
-              <a:t>10/08/2018</a:t>
+              <a:t>11/08/2018</a:t>
             </a:fld>
             <a:endParaRPr lang="en-GB"/>
           </a:p>
@@ -3119,7 +3131,7 @@
           <a:p>
             <a:fld id="{09E22B56-B39A-4609-ACAF-221672A708D5}" type="datetimeFigureOut">
               <a:rPr lang="en-GB" smtClean="0"/>
-              <a:t>10/08/2018</a:t>
+              <a:t>11/08/2018</a:t>
             </a:fld>
             <a:endParaRPr lang="en-GB"/>
           </a:p>
@@ -4119,7 +4131,7 @@
           <a:p>
             <a:fld id="{09E22B56-B39A-4609-ACAF-221672A708D5}" type="datetimeFigureOut">
               <a:rPr lang="en-GB" smtClean="0"/>
-              <a:t>10/08/2018</a:t>
+              <a:t>11/08/2018</a:t>
             </a:fld>
             <a:endParaRPr lang="en-GB"/>
           </a:p>
@@ -4214,7 +4226,7 @@
           <a:p>
             <a:fld id="{09E22B56-B39A-4609-ACAF-221672A708D5}" type="datetimeFigureOut">
               <a:rPr lang="en-GB" smtClean="0"/>
-              <a:t>10/08/2018</a:t>
+              <a:t>11/08/2018</a:t>
             </a:fld>
             <a:endParaRPr lang="en-GB"/>
           </a:p>
@@ -4491,7 +4503,7 @@
           <a:p>
             <a:fld id="{09E22B56-B39A-4609-ACAF-221672A708D5}" type="datetimeFigureOut">
               <a:rPr lang="en-GB" smtClean="0"/>
-              <a:t>10/08/2018</a:t>
+              <a:t>11/08/2018</a:t>
             </a:fld>
             <a:endParaRPr lang="en-GB"/>
           </a:p>
@@ -4748,7 +4760,7 @@
           <a:p>
             <a:fld id="{09E22B56-B39A-4609-ACAF-221672A708D5}" type="datetimeFigureOut">
               <a:rPr lang="en-GB" smtClean="0"/>
-              <a:t>10/08/2018</a:t>
+              <a:t>11/08/2018</a:t>
             </a:fld>
             <a:endParaRPr lang="en-GB"/>
           </a:p>
@@ -4969,7 +4981,7 @@
             <a:fld id="{09E22B56-B39A-4609-ACAF-221672A708D5}" type="datetimeFigureOut">
               <a:rPr lang="en-GB" smtClean="0"/>
               <a:pPr/>
-              <a:t>10/08/2018</a:t>
+              <a:t>11/08/2018</a:t>
             </a:fld>
             <a:endParaRPr lang="en-GB"/>
           </a:p>

</xml_diff>

<commit_message>
Added goodreads quote generator to the historical figure quote slide generator
</commit_message>
<xml_diff>
--- a/data/powerpoint/template.pptx
+++ b/data/powerpoint/template.pptx
@@ -197,7 +197,7 @@
           <a:p>
             <a:fld id="{FEE386D4-E0F5-48ED-B382-C5D6AB88A5B0}" type="datetimeFigureOut">
               <a:rPr lang="en-GB" smtClean="0"/>
-              <a:t>11/08/2018</a:t>
+              <a:t>12/08/2018</a:t>
             </a:fld>
             <a:endParaRPr lang="en-GB"/>
           </a:p>
@@ -596,7 +596,7 @@
           <a:p>
             <a:fld id="{09E22B56-B39A-4609-ACAF-221672A708D5}" type="datetimeFigureOut">
               <a:rPr lang="en-GB" smtClean="0"/>
-              <a:t>11/08/2018</a:t>
+              <a:t>12/08/2018</a:t>
             </a:fld>
             <a:endParaRPr lang="en-GB"/>
           </a:p>
@@ -766,7 +766,7 @@
           <a:p>
             <a:fld id="{09E22B56-B39A-4609-ACAF-221672A708D5}" type="datetimeFigureOut">
               <a:rPr lang="en-GB" smtClean="0"/>
-              <a:t>11/08/2018</a:t>
+              <a:t>12/08/2018</a:t>
             </a:fld>
             <a:endParaRPr lang="en-GB"/>
           </a:p>
@@ -946,7 +946,7 @@
           <a:p>
             <a:fld id="{09E22B56-B39A-4609-ACAF-221672A708D5}" type="datetimeFigureOut">
               <a:rPr lang="en-GB" smtClean="0"/>
-              <a:t>11/08/2018</a:t>
+              <a:t>12/08/2018</a:t>
             </a:fld>
             <a:endParaRPr lang="en-GB"/>
           </a:p>
@@ -1135,7 +1135,7 @@
           <a:p>
             <a:fld id="{09E22B56-B39A-4609-ACAF-221672A708D5}" type="datetimeFigureOut">
               <a:rPr lang="en-GB" smtClean="0"/>
-              <a:t>11/08/2018</a:t>
+              <a:t>12/08/2018</a:t>
             </a:fld>
             <a:endParaRPr lang="en-GB"/>
           </a:p>
@@ -1253,7 +1253,7 @@
           <a:p>
             <a:fld id="{09E22B56-B39A-4609-ACAF-221672A708D5}" type="datetimeFigureOut">
               <a:rPr lang="en-GB" smtClean="0"/>
-              <a:t>11/08/2018</a:t>
+              <a:t>12/08/2018</a:t>
             </a:fld>
             <a:endParaRPr lang="en-GB"/>
           </a:p>
@@ -1455,7 +1455,7 @@
           <a:p>
             <a:fld id="{09E22B56-B39A-4609-ACAF-221672A708D5}" type="datetimeFigureOut">
               <a:rPr lang="en-GB" smtClean="0"/>
-              <a:t>11/08/2018</a:t>
+              <a:t>12/08/2018</a:t>
             </a:fld>
             <a:endParaRPr lang="en-GB"/>
           </a:p>
@@ -1643,7 +1643,7 @@
           <a:p>
             <a:fld id="{09E22B56-B39A-4609-ACAF-221672A708D5}" type="datetimeFigureOut">
               <a:rPr lang="en-GB" smtClean="0"/>
-              <a:t>11/08/2018</a:t>
+              <a:t>12/08/2018</a:t>
             </a:fld>
             <a:endParaRPr lang="en-GB"/>
           </a:p>
@@ -1779,14 +1779,17 @@
           </a:xfrm>
         </p:spPr>
         <p:txBody>
-          <a:bodyPr anchor="ctr"/>
+          <a:bodyPr anchor="ctr">
+            <a:normAutofit/>
+          </a:bodyPr>
           <a:lstStyle>
             <a:lvl1pPr marL="0" indent="0" algn="ctr">
               <a:buNone/>
-              <a:defRPr sz="3200" i="1">
+              <a:defRPr sz="2400" i="1">
                 <a:solidFill>
                   <a:schemeClr val="accent3">
-                    <a:lumMod val="75000"/>
+                    <a:lumMod val="40000"/>
+                    <a:lumOff val="60000"/>
                   </a:schemeClr>
                 </a:solidFill>
               </a:defRPr>
@@ -1856,14 +1859,17 @@
           </a:xfrm>
         </p:spPr>
         <p:txBody>
-          <a:bodyPr anchor="ctr"/>
+          <a:bodyPr anchor="ctr">
+            <a:normAutofit/>
+          </a:bodyPr>
           <a:lstStyle>
             <a:lvl1pPr marL="0" indent="0" algn="ctr">
               <a:buNone/>
-              <a:defRPr sz="3200" i="1">
+              <a:defRPr sz="2400" i="1">
                 <a:solidFill>
                   <a:schemeClr val="accent3">
-                    <a:lumMod val="75000"/>
+                    <a:lumMod val="40000"/>
+                    <a:lumOff val="60000"/>
                   </a:schemeClr>
                 </a:solidFill>
               </a:defRPr>
@@ -2286,7 +2292,7 @@
           <a:p>
             <a:fld id="{09E22B56-B39A-4609-ACAF-221672A708D5}" type="datetimeFigureOut">
               <a:rPr lang="en-GB" smtClean="0"/>
-              <a:t>11/08/2018</a:t>
+              <a:t>12/08/2018</a:t>
             </a:fld>
             <a:endParaRPr lang="en-GB"/>
           </a:p>
@@ -2532,7 +2538,7 @@
           <a:p>
             <a:fld id="{09E22B56-B39A-4609-ACAF-221672A708D5}" type="datetimeFigureOut">
               <a:rPr lang="en-GB" smtClean="0"/>
-              <a:t>11/08/2018</a:t>
+              <a:t>12/08/2018</a:t>
             </a:fld>
             <a:endParaRPr lang="en-GB"/>
           </a:p>
@@ -2764,7 +2770,7 @@
           <a:p>
             <a:fld id="{09E22B56-B39A-4609-ACAF-221672A708D5}" type="datetimeFigureOut">
               <a:rPr lang="en-GB" smtClean="0"/>
-              <a:t>11/08/2018</a:t>
+              <a:t>12/08/2018</a:t>
             </a:fld>
             <a:endParaRPr lang="en-GB"/>
           </a:p>
@@ -3131,7 +3137,7 @@
           <a:p>
             <a:fld id="{09E22B56-B39A-4609-ACAF-221672A708D5}" type="datetimeFigureOut">
               <a:rPr lang="en-GB" smtClean="0"/>
-              <a:t>11/08/2018</a:t>
+              <a:t>12/08/2018</a:t>
             </a:fld>
             <a:endParaRPr lang="en-GB"/>
           </a:p>
@@ -4131,7 +4137,7 @@
           <a:p>
             <a:fld id="{09E22B56-B39A-4609-ACAF-221672A708D5}" type="datetimeFigureOut">
               <a:rPr lang="en-GB" smtClean="0"/>
-              <a:t>11/08/2018</a:t>
+              <a:t>12/08/2018</a:t>
             </a:fld>
             <a:endParaRPr lang="en-GB"/>
           </a:p>
@@ -4226,7 +4232,7 @@
           <a:p>
             <a:fld id="{09E22B56-B39A-4609-ACAF-221672A708D5}" type="datetimeFigureOut">
               <a:rPr lang="en-GB" smtClean="0"/>
-              <a:t>11/08/2018</a:t>
+              <a:t>12/08/2018</a:t>
             </a:fld>
             <a:endParaRPr lang="en-GB"/>
           </a:p>
@@ -4503,7 +4509,7 @@
           <a:p>
             <a:fld id="{09E22B56-B39A-4609-ACAF-221672A708D5}" type="datetimeFigureOut">
               <a:rPr lang="en-GB" smtClean="0"/>
-              <a:t>11/08/2018</a:t>
+              <a:t>12/08/2018</a:t>
             </a:fld>
             <a:endParaRPr lang="en-GB"/>
           </a:p>
@@ -4760,7 +4766,7 @@
           <a:p>
             <a:fld id="{09E22B56-B39A-4609-ACAF-221672A708D5}" type="datetimeFigureOut">
               <a:rPr lang="en-GB" smtClean="0"/>
-              <a:t>11/08/2018</a:t>
+              <a:t>12/08/2018</a:t>
             </a:fld>
             <a:endParaRPr lang="en-GB"/>
           </a:p>
@@ -4981,7 +4987,7 @@
             <a:fld id="{09E22B56-B39A-4609-ACAF-221672A708D5}" type="datetimeFigureOut">
               <a:rPr lang="en-GB" smtClean="0"/>
               <a:pPr/>
-              <a:t>11/08/2018</a:t>
+              <a:t>12/08/2018</a:t>
             </a:fld>
             <a:endParaRPr lang="en-GB"/>
           </a:p>

</xml_diff>

<commit_message>
Removed footers from powerpoint template
</commit_message>
<xml_diff>
--- a/data/powerpoint/template.pptx
+++ b/data/powerpoint/template.pptx
@@ -581,57 +581,23 @@
       </p:sp>
       <p:sp>
         <p:nvSpPr>
-          <p:cNvPr id="4" name="Date Placeholder 3"/>
+          <p:cNvPr id="6" name="Slide Number Placeholder 5"/>
           <p:cNvSpPr>
             <a:spLocks noGrp="1"/>
           </p:cNvSpPr>
           <p:nvPr>
-            <p:ph type="dt" sz="half" idx="10"/>
-          </p:nvPr>
-        </p:nvSpPr>
-        <p:spPr/>
-        <p:txBody>
-          <a:bodyPr/>
-          <a:lstStyle/>
-          <a:p>
-            <a:fld id="{09E22B56-B39A-4609-ACAF-221672A708D5}" type="datetimeFigureOut">
-              <a:rPr lang="en-GB" smtClean="0"/>
-              <a:t>12/08/2018</a:t>
-            </a:fld>
-            <a:endParaRPr lang="en-GB"/>
-          </a:p>
-        </p:txBody>
-      </p:sp>
-      <p:sp>
-        <p:nvSpPr>
-          <p:cNvPr id="5" name="Footer Placeholder 4"/>
-          <p:cNvSpPr>
-            <a:spLocks noGrp="1"/>
-          </p:cNvSpPr>
-          <p:nvPr>
-            <p:ph type="ftr" sz="quarter" idx="11"/>
-          </p:nvPr>
-        </p:nvSpPr>
-        <p:spPr/>
-        <p:txBody>
-          <a:bodyPr/>
-          <a:lstStyle/>
-          <a:p>
-            <a:endParaRPr lang="en-GB"/>
-          </a:p>
-        </p:txBody>
-      </p:sp>
-      <p:sp>
-        <p:nvSpPr>
-          <p:cNvPr id="6" name="Slide Number Placeholder 5"/>
-          <p:cNvSpPr>
-            <a:spLocks noGrp="1"/>
-          </p:cNvSpPr>
-          <p:nvPr>
             <p:ph type="sldNum" sz="quarter" idx="12"/>
           </p:nvPr>
         </p:nvSpPr>
-        <p:spPr/>
+        <p:spPr>
+          <a:xfrm>
+            <a:off x="11446624" y="6467303"/>
+            <a:ext cx="745375" cy="390698"/>
+          </a:xfrm>
+          <a:prstGeom prst="rect">
+            <a:avLst/>
+          </a:prstGeom>
+        </p:spPr>
         <p:txBody>
           <a:bodyPr/>
           <a:lstStyle/>
@@ -751,57 +717,23 @@
       </p:sp>
       <p:sp>
         <p:nvSpPr>
-          <p:cNvPr id="4" name="Date Placeholder 3"/>
+          <p:cNvPr id="6" name="Slide Number Placeholder 5"/>
           <p:cNvSpPr>
             <a:spLocks noGrp="1"/>
           </p:cNvSpPr>
           <p:nvPr>
-            <p:ph type="dt" sz="half" idx="10"/>
-          </p:nvPr>
-        </p:nvSpPr>
-        <p:spPr/>
-        <p:txBody>
-          <a:bodyPr/>
-          <a:lstStyle/>
-          <a:p>
-            <a:fld id="{09E22B56-B39A-4609-ACAF-221672A708D5}" type="datetimeFigureOut">
-              <a:rPr lang="en-GB" smtClean="0"/>
-              <a:t>12/08/2018</a:t>
-            </a:fld>
-            <a:endParaRPr lang="en-GB"/>
-          </a:p>
-        </p:txBody>
-      </p:sp>
-      <p:sp>
-        <p:nvSpPr>
-          <p:cNvPr id="5" name="Footer Placeholder 4"/>
-          <p:cNvSpPr>
-            <a:spLocks noGrp="1"/>
-          </p:cNvSpPr>
-          <p:nvPr>
-            <p:ph type="ftr" sz="quarter" idx="11"/>
-          </p:nvPr>
-        </p:nvSpPr>
-        <p:spPr/>
-        <p:txBody>
-          <a:bodyPr/>
-          <a:lstStyle/>
-          <a:p>
-            <a:endParaRPr lang="en-GB"/>
-          </a:p>
-        </p:txBody>
-      </p:sp>
-      <p:sp>
-        <p:nvSpPr>
-          <p:cNvPr id="6" name="Slide Number Placeholder 5"/>
-          <p:cNvSpPr>
-            <a:spLocks noGrp="1"/>
-          </p:cNvSpPr>
-          <p:nvPr>
             <p:ph type="sldNum" sz="quarter" idx="12"/>
           </p:nvPr>
         </p:nvSpPr>
-        <p:spPr/>
+        <p:spPr>
+          <a:xfrm>
+            <a:off x="11446624" y="6467303"/>
+            <a:ext cx="745375" cy="390698"/>
+          </a:xfrm>
+          <a:prstGeom prst="rect">
+            <a:avLst/>
+          </a:prstGeom>
+        </p:spPr>
         <p:txBody>
           <a:bodyPr/>
           <a:lstStyle/>
@@ -931,57 +863,23 @@
       </p:sp>
       <p:sp>
         <p:nvSpPr>
-          <p:cNvPr id="4" name="Date Placeholder 3"/>
+          <p:cNvPr id="6" name="Slide Number Placeholder 5"/>
           <p:cNvSpPr>
             <a:spLocks noGrp="1"/>
           </p:cNvSpPr>
           <p:nvPr>
-            <p:ph type="dt" sz="half" idx="10"/>
-          </p:nvPr>
-        </p:nvSpPr>
-        <p:spPr/>
-        <p:txBody>
-          <a:bodyPr/>
-          <a:lstStyle/>
-          <a:p>
-            <a:fld id="{09E22B56-B39A-4609-ACAF-221672A708D5}" type="datetimeFigureOut">
-              <a:rPr lang="en-GB" smtClean="0"/>
-              <a:t>12/08/2018</a:t>
-            </a:fld>
-            <a:endParaRPr lang="en-GB"/>
-          </a:p>
-        </p:txBody>
-      </p:sp>
-      <p:sp>
-        <p:nvSpPr>
-          <p:cNvPr id="5" name="Footer Placeholder 4"/>
-          <p:cNvSpPr>
-            <a:spLocks noGrp="1"/>
-          </p:cNvSpPr>
-          <p:nvPr>
-            <p:ph type="ftr" sz="quarter" idx="11"/>
-          </p:nvPr>
-        </p:nvSpPr>
-        <p:spPr/>
-        <p:txBody>
-          <a:bodyPr/>
-          <a:lstStyle/>
-          <a:p>
-            <a:endParaRPr lang="en-GB"/>
-          </a:p>
-        </p:txBody>
-      </p:sp>
-      <p:sp>
-        <p:nvSpPr>
-          <p:cNvPr id="6" name="Slide Number Placeholder 5"/>
-          <p:cNvSpPr>
-            <a:spLocks noGrp="1"/>
-          </p:cNvSpPr>
-          <p:nvPr>
             <p:ph type="sldNum" sz="quarter" idx="12"/>
           </p:nvPr>
         </p:nvSpPr>
-        <p:spPr/>
+        <p:spPr>
+          <a:xfrm>
+            <a:off x="11446624" y="6467303"/>
+            <a:ext cx="745375" cy="390698"/>
+          </a:xfrm>
+          <a:prstGeom prst="rect">
+            <a:avLst/>
+          </a:prstGeom>
+        </p:spPr>
         <p:txBody>
           <a:bodyPr/>
           <a:lstStyle/>
@@ -1120,57 +1018,23 @@
       </p:sp>
       <p:sp>
         <p:nvSpPr>
-          <p:cNvPr id="3" name="Date Placeholder 2"/>
+          <p:cNvPr id="5" name="Slide Number Placeholder 4"/>
           <p:cNvSpPr>
             <a:spLocks noGrp="1"/>
           </p:cNvSpPr>
           <p:nvPr>
-            <p:ph type="dt" sz="half" idx="10"/>
-          </p:nvPr>
-        </p:nvSpPr>
-        <p:spPr/>
-        <p:txBody>
-          <a:bodyPr/>
-          <a:lstStyle/>
-          <a:p>
-            <a:fld id="{09E22B56-B39A-4609-ACAF-221672A708D5}" type="datetimeFigureOut">
-              <a:rPr lang="en-GB" smtClean="0"/>
-              <a:t>12/08/2018</a:t>
-            </a:fld>
-            <a:endParaRPr lang="en-GB"/>
-          </a:p>
-        </p:txBody>
-      </p:sp>
-      <p:sp>
-        <p:nvSpPr>
-          <p:cNvPr id="4" name="Footer Placeholder 3"/>
-          <p:cNvSpPr>
-            <a:spLocks noGrp="1"/>
-          </p:cNvSpPr>
-          <p:nvPr>
-            <p:ph type="ftr" sz="quarter" idx="11"/>
-          </p:nvPr>
-        </p:nvSpPr>
-        <p:spPr/>
-        <p:txBody>
-          <a:bodyPr/>
-          <a:lstStyle/>
-          <a:p>
-            <a:endParaRPr lang="en-GB"/>
-          </a:p>
-        </p:txBody>
-      </p:sp>
-      <p:sp>
-        <p:nvSpPr>
-          <p:cNvPr id="5" name="Slide Number Placeholder 4"/>
-          <p:cNvSpPr>
-            <a:spLocks noGrp="1"/>
-          </p:cNvSpPr>
-          <p:nvPr>
             <p:ph type="sldNum" sz="quarter" idx="12"/>
           </p:nvPr>
         </p:nvSpPr>
-        <p:spPr/>
+        <p:spPr>
+          <a:xfrm>
+            <a:off x="11446624" y="6467303"/>
+            <a:ext cx="745375" cy="390698"/>
+          </a:xfrm>
+          <a:prstGeom prst="rect">
+            <a:avLst/>
+          </a:prstGeom>
+        </p:spPr>
         <p:txBody>
           <a:bodyPr/>
           <a:lstStyle/>
@@ -1215,94 +1079,6 @@
       </p:grpSpPr>
       <p:sp>
         <p:nvSpPr>
-          <p:cNvPr id="2" name="Title 1"/>
-          <p:cNvSpPr>
-            <a:spLocks noGrp="1"/>
-          </p:cNvSpPr>
-          <p:nvPr>
-            <p:ph type="title"/>
-          </p:nvPr>
-        </p:nvSpPr>
-        <p:spPr/>
-        <p:txBody>
-          <a:bodyPr/>
-          <a:lstStyle/>
-          <a:p>
-            <a:r>
-              <a:rPr lang="nl-NL"/>
-              <a:t>Klik om stijl te bewerken</a:t>
-            </a:r>
-            <a:endParaRPr lang="en-US" dirty="0"/>
-          </a:p>
-        </p:txBody>
-      </p:sp>
-      <p:sp>
-        <p:nvSpPr>
-          <p:cNvPr id="4" name="Date Placeholder 3"/>
-          <p:cNvSpPr>
-            <a:spLocks noGrp="1"/>
-          </p:cNvSpPr>
-          <p:nvPr>
-            <p:ph type="dt" sz="half" idx="10"/>
-          </p:nvPr>
-        </p:nvSpPr>
-        <p:spPr/>
-        <p:txBody>
-          <a:bodyPr/>
-          <a:lstStyle/>
-          <a:p>
-            <a:fld id="{09E22B56-B39A-4609-ACAF-221672A708D5}" type="datetimeFigureOut">
-              <a:rPr lang="en-GB" smtClean="0"/>
-              <a:t>12/08/2018</a:t>
-            </a:fld>
-            <a:endParaRPr lang="en-GB"/>
-          </a:p>
-        </p:txBody>
-      </p:sp>
-      <p:sp>
-        <p:nvSpPr>
-          <p:cNvPr id="5" name="Footer Placeholder 4"/>
-          <p:cNvSpPr>
-            <a:spLocks noGrp="1"/>
-          </p:cNvSpPr>
-          <p:nvPr>
-            <p:ph type="ftr" sz="quarter" idx="11"/>
-          </p:nvPr>
-        </p:nvSpPr>
-        <p:spPr/>
-        <p:txBody>
-          <a:bodyPr/>
-          <a:lstStyle/>
-          <a:p>
-            <a:endParaRPr lang="en-GB"/>
-          </a:p>
-        </p:txBody>
-      </p:sp>
-      <p:sp>
-        <p:nvSpPr>
-          <p:cNvPr id="6" name="Slide Number Placeholder 5"/>
-          <p:cNvSpPr>
-            <a:spLocks noGrp="1"/>
-          </p:cNvSpPr>
-          <p:nvPr>
-            <p:ph type="sldNum" sz="quarter" idx="12"/>
-          </p:nvPr>
-        </p:nvSpPr>
-        <p:spPr/>
-        <p:txBody>
-          <a:bodyPr/>
-          <a:lstStyle/>
-          <a:p>
-            <a:fld id="{1F469EBC-A649-4E3E-8046-4745AB923F3E}" type="slidenum">
-              <a:rPr lang="en-GB" smtClean="0"/>
-              <a:t>‹nr.›</a:t>
-            </a:fld>
-            <a:endParaRPr lang="en-GB"/>
-          </a:p>
-        </p:txBody>
-      </p:sp>
-      <p:sp>
-        <p:nvSpPr>
           <p:cNvPr id="7" name="Picture Placeholder 2">
             <a:extLst>
               <a:ext uri="{FF2B5EF4-FFF2-40B4-BE49-F238E27FC236}">
@@ -1365,10 +1141,64 @@
           </a:lstStyle>
           <a:p>
             <a:r>
-              <a:rPr lang="nl-NL"/>
+              <a:rPr lang="nl-NL" dirty="0"/>
               <a:t>Klik op het pictogram als u een afbeelding wilt toevoegen</a:t>
             </a:r>
             <a:endParaRPr lang="en-US" dirty="0"/>
+          </a:p>
+        </p:txBody>
+      </p:sp>
+      <p:sp>
+        <p:nvSpPr>
+          <p:cNvPr id="2" name="Title 1"/>
+          <p:cNvSpPr>
+            <a:spLocks noGrp="1"/>
+          </p:cNvSpPr>
+          <p:nvPr>
+            <p:ph type="title"/>
+          </p:nvPr>
+        </p:nvSpPr>
+        <p:spPr/>
+        <p:txBody>
+          <a:bodyPr/>
+          <a:lstStyle/>
+          <a:p>
+            <a:r>
+              <a:rPr lang="nl-NL"/>
+              <a:t>Klik om stijl te bewerken</a:t>
+            </a:r>
+            <a:endParaRPr lang="en-US" dirty="0"/>
+          </a:p>
+        </p:txBody>
+      </p:sp>
+      <p:sp>
+        <p:nvSpPr>
+          <p:cNvPr id="6" name="Slide Number Placeholder 5"/>
+          <p:cNvSpPr>
+            <a:spLocks noGrp="1"/>
+          </p:cNvSpPr>
+          <p:nvPr>
+            <p:ph type="sldNum" sz="quarter" idx="12"/>
+          </p:nvPr>
+        </p:nvSpPr>
+        <p:spPr>
+          <a:xfrm>
+            <a:off x="11446624" y="6467303"/>
+            <a:ext cx="745375" cy="390698"/>
+          </a:xfrm>
+          <a:prstGeom prst="rect">
+            <a:avLst/>
+          </a:prstGeom>
+        </p:spPr>
+        <p:txBody>
+          <a:bodyPr/>
+          <a:lstStyle/>
+          <a:p>
+            <a:fld id="{1F469EBC-A649-4E3E-8046-4745AB923F3E}" type="slidenum">
+              <a:rPr lang="en-GB" smtClean="0"/>
+              <a:t>‹nr.›</a:t>
+            </a:fld>
+            <a:endParaRPr lang="en-GB"/>
           </a:p>
         </p:txBody>
       </p:sp>
@@ -1440,57 +1270,23 @@
       </p:sp>
       <p:sp>
         <p:nvSpPr>
-          <p:cNvPr id="4" name="Date Placeholder 3"/>
+          <p:cNvPr id="6" name="Slide Number Placeholder 5"/>
           <p:cNvSpPr>
             <a:spLocks noGrp="1"/>
           </p:cNvSpPr>
           <p:nvPr>
-            <p:ph type="dt" sz="half" idx="10"/>
-          </p:nvPr>
-        </p:nvSpPr>
-        <p:spPr/>
-        <p:txBody>
-          <a:bodyPr/>
-          <a:lstStyle/>
-          <a:p>
-            <a:fld id="{09E22B56-B39A-4609-ACAF-221672A708D5}" type="datetimeFigureOut">
-              <a:rPr lang="en-GB" smtClean="0"/>
-              <a:t>12/08/2018</a:t>
-            </a:fld>
-            <a:endParaRPr lang="en-GB"/>
-          </a:p>
-        </p:txBody>
-      </p:sp>
-      <p:sp>
-        <p:nvSpPr>
-          <p:cNvPr id="5" name="Footer Placeholder 4"/>
-          <p:cNvSpPr>
-            <a:spLocks noGrp="1"/>
-          </p:cNvSpPr>
-          <p:nvPr>
-            <p:ph type="ftr" sz="quarter" idx="11"/>
-          </p:nvPr>
-        </p:nvSpPr>
-        <p:spPr/>
-        <p:txBody>
-          <a:bodyPr/>
-          <a:lstStyle/>
-          <a:p>
-            <a:endParaRPr lang="en-GB"/>
-          </a:p>
-        </p:txBody>
-      </p:sp>
-      <p:sp>
-        <p:nvSpPr>
-          <p:cNvPr id="6" name="Slide Number Placeholder 5"/>
-          <p:cNvSpPr>
-            <a:spLocks noGrp="1"/>
-          </p:cNvSpPr>
-          <p:nvPr>
             <p:ph type="sldNum" sz="quarter" idx="12"/>
           </p:nvPr>
         </p:nvSpPr>
-        <p:spPr/>
+        <p:spPr>
+          <a:xfrm>
+            <a:off x="11446624" y="6467303"/>
+            <a:ext cx="745375" cy="390698"/>
+          </a:xfrm>
+          <a:prstGeom prst="rect">
+            <a:avLst/>
+          </a:prstGeom>
+        </p:spPr>
         <p:txBody>
           <a:bodyPr/>
           <a:lstStyle/>
@@ -1573,7 +1369,7 @@
         </p:nvSpPr>
         <p:spPr>
           <a:xfrm>
-            <a:off x="839788" y="1185863"/>
+            <a:off x="839788" y="5848323"/>
             <a:ext cx="5157787" cy="823912"/>
           </a:xfrm>
         </p:spPr>
@@ -1628,57 +1424,23 @@
       </p:sp>
       <p:sp>
         <p:nvSpPr>
-          <p:cNvPr id="7" name="Date Placeholder 6"/>
+          <p:cNvPr id="9" name="Slide Number Placeholder 8"/>
           <p:cNvSpPr>
             <a:spLocks noGrp="1"/>
           </p:cNvSpPr>
           <p:nvPr>
-            <p:ph type="dt" sz="half" idx="10"/>
-          </p:nvPr>
-        </p:nvSpPr>
-        <p:spPr/>
-        <p:txBody>
-          <a:bodyPr/>
-          <a:lstStyle/>
-          <a:p>
-            <a:fld id="{09E22B56-B39A-4609-ACAF-221672A708D5}" type="datetimeFigureOut">
-              <a:rPr lang="en-GB" smtClean="0"/>
-              <a:t>12/08/2018</a:t>
-            </a:fld>
-            <a:endParaRPr lang="en-GB"/>
-          </a:p>
-        </p:txBody>
-      </p:sp>
-      <p:sp>
-        <p:nvSpPr>
-          <p:cNvPr id="8" name="Footer Placeholder 7"/>
-          <p:cNvSpPr>
-            <a:spLocks noGrp="1"/>
-          </p:cNvSpPr>
-          <p:nvPr>
-            <p:ph type="ftr" sz="quarter" idx="11"/>
-          </p:nvPr>
-        </p:nvSpPr>
-        <p:spPr/>
-        <p:txBody>
-          <a:bodyPr/>
-          <a:lstStyle/>
-          <a:p>
-            <a:endParaRPr lang="en-GB"/>
-          </a:p>
-        </p:txBody>
-      </p:sp>
-      <p:sp>
-        <p:nvSpPr>
-          <p:cNvPr id="9" name="Slide Number Placeholder 8"/>
-          <p:cNvSpPr>
-            <a:spLocks noGrp="1"/>
-          </p:cNvSpPr>
-          <p:nvPr>
             <p:ph type="sldNum" sz="quarter" idx="12"/>
           </p:nvPr>
         </p:nvSpPr>
-        <p:spPr/>
+        <p:spPr>
+          <a:xfrm>
+            <a:off x="11446624" y="6467303"/>
+            <a:ext cx="745375" cy="390698"/>
+          </a:xfrm>
+          <a:prstGeom prst="rect">
+            <a:avLst/>
+          </a:prstGeom>
+        </p:spPr>
         <p:txBody>
           <a:bodyPr/>
           <a:lstStyle/>
@@ -1703,7 +1465,7 @@
         </p:nvSpPr>
         <p:spPr>
           <a:xfrm>
-            <a:off x="6169024" y="1185863"/>
+            <a:off x="6169024" y="5848323"/>
             <a:ext cx="5183188" cy="823912"/>
           </a:xfrm>
         </p:spPr>
@@ -1774,8 +1536,8 @@
         </p:nvSpPr>
         <p:spPr>
           <a:xfrm>
-            <a:off x="824706" y="2009775"/>
-            <a:ext cx="5172869" cy="4346575"/>
+            <a:off x="829866" y="1244054"/>
+            <a:ext cx="5172869" cy="4604269"/>
           </a:xfrm>
         </p:spPr>
         <p:txBody>
@@ -1787,10 +1549,7 @@
               <a:buNone/>
               <a:defRPr sz="2400" i="1">
                 <a:solidFill>
-                  <a:schemeClr val="accent3">
-                    <a:lumMod val="40000"/>
-                    <a:lumOff val="60000"/>
-                  </a:schemeClr>
+                  <a:schemeClr val="tx1"/>
                 </a:solidFill>
               </a:defRPr>
             </a:lvl1pPr>
@@ -1854,8 +1613,8 @@
         </p:nvSpPr>
         <p:spPr>
           <a:xfrm>
-            <a:off x="6174183" y="2009775"/>
-            <a:ext cx="5172869" cy="4346575"/>
+            <a:off x="6179343" y="1244054"/>
+            <a:ext cx="5172869" cy="4604269"/>
           </a:xfrm>
         </p:spPr>
         <p:txBody>
@@ -1867,10 +1626,7 @@
               <a:buNone/>
               <a:defRPr sz="2400" i="1">
                 <a:solidFill>
-                  <a:schemeClr val="accent3">
-                    <a:lumMod val="40000"/>
-                    <a:lumOff val="60000"/>
-                  </a:schemeClr>
+                  <a:schemeClr val="tx1"/>
                 </a:solidFill>
               </a:defRPr>
             </a:lvl1pPr>
@@ -2277,57 +2033,23 @@
       </p:sp>
       <p:sp>
         <p:nvSpPr>
-          <p:cNvPr id="4" name="Date Placeholder 3"/>
+          <p:cNvPr id="6" name="Slide Number Placeholder 5"/>
           <p:cNvSpPr>
             <a:spLocks noGrp="1"/>
           </p:cNvSpPr>
           <p:nvPr>
-            <p:ph type="dt" sz="half" idx="10"/>
-          </p:nvPr>
-        </p:nvSpPr>
-        <p:spPr/>
-        <p:txBody>
-          <a:bodyPr/>
-          <a:lstStyle/>
-          <a:p>
-            <a:fld id="{09E22B56-B39A-4609-ACAF-221672A708D5}" type="datetimeFigureOut">
-              <a:rPr lang="en-GB" smtClean="0"/>
-              <a:t>12/08/2018</a:t>
-            </a:fld>
-            <a:endParaRPr lang="en-GB"/>
-          </a:p>
-        </p:txBody>
-      </p:sp>
-      <p:sp>
-        <p:nvSpPr>
-          <p:cNvPr id="5" name="Footer Placeholder 4"/>
-          <p:cNvSpPr>
-            <a:spLocks noGrp="1"/>
-          </p:cNvSpPr>
-          <p:nvPr>
-            <p:ph type="ftr" sz="quarter" idx="11"/>
-          </p:nvPr>
-        </p:nvSpPr>
-        <p:spPr/>
-        <p:txBody>
-          <a:bodyPr/>
-          <a:lstStyle/>
-          <a:p>
-            <a:endParaRPr lang="en-GB"/>
-          </a:p>
-        </p:txBody>
-      </p:sp>
-      <p:sp>
-        <p:nvSpPr>
-          <p:cNvPr id="6" name="Slide Number Placeholder 5"/>
-          <p:cNvSpPr>
-            <a:spLocks noGrp="1"/>
-          </p:cNvSpPr>
-          <p:nvPr>
             <p:ph type="sldNum" sz="quarter" idx="12"/>
           </p:nvPr>
         </p:nvSpPr>
-        <p:spPr/>
+        <p:spPr>
+          <a:xfrm>
+            <a:off x="11446624" y="6467303"/>
+            <a:ext cx="745375" cy="390698"/>
+          </a:xfrm>
+          <a:prstGeom prst="rect">
+            <a:avLst/>
+          </a:prstGeom>
+        </p:spPr>
         <p:txBody>
           <a:bodyPr/>
           <a:lstStyle/>
@@ -2523,57 +2245,23 @@
       </p:sp>
       <p:sp>
         <p:nvSpPr>
-          <p:cNvPr id="4" name="Date Placeholder 3"/>
+          <p:cNvPr id="6" name="Slide Number Placeholder 5"/>
           <p:cNvSpPr>
             <a:spLocks noGrp="1"/>
           </p:cNvSpPr>
           <p:nvPr>
-            <p:ph type="dt" sz="half" idx="10"/>
-          </p:nvPr>
-        </p:nvSpPr>
-        <p:spPr/>
-        <p:txBody>
-          <a:bodyPr/>
-          <a:lstStyle/>
-          <a:p>
-            <a:fld id="{09E22B56-B39A-4609-ACAF-221672A708D5}" type="datetimeFigureOut">
-              <a:rPr lang="en-GB" smtClean="0"/>
-              <a:t>12/08/2018</a:t>
-            </a:fld>
-            <a:endParaRPr lang="en-GB"/>
-          </a:p>
-        </p:txBody>
-      </p:sp>
-      <p:sp>
-        <p:nvSpPr>
-          <p:cNvPr id="5" name="Footer Placeholder 4"/>
-          <p:cNvSpPr>
-            <a:spLocks noGrp="1"/>
-          </p:cNvSpPr>
-          <p:nvPr>
-            <p:ph type="ftr" sz="quarter" idx="11"/>
-          </p:nvPr>
-        </p:nvSpPr>
-        <p:spPr/>
-        <p:txBody>
-          <a:bodyPr/>
-          <a:lstStyle/>
-          <a:p>
-            <a:endParaRPr lang="en-GB"/>
-          </a:p>
-        </p:txBody>
-      </p:sp>
-      <p:sp>
-        <p:nvSpPr>
-          <p:cNvPr id="6" name="Slide Number Placeholder 5"/>
-          <p:cNvSpPr>
-            <a:spLocks noGrp="1"/>
-          </p:cNvSpPr>
-          <p:nvPr>
             <p:ph type="sldNum" sz="quarter" idx="12"/>
           </p:nvPr>
         </p:nvSpPr>
-        <p:spPr/>
+        <p:spPr>
+          <a:xfrm>
+            <a:off x="11446624" y="6467303"/>
+            <a:ext cx="745375" cy="390698"/>
+          </a:xfrm>
+          <a:prstGeom prst="rect">
+            <a:avLst/>
+          </a:prstGeom>
+        </p:spPr>
         <p:txBody>
           <a:bodyPr/>
           <a:lstStyle/>
@@ -2755,57 +2443,23 @@
       </p:sp>
       <p:sp>
         <p:nvSpPr>
-          <p:cNvPr id="5" name="Date Placeholder 4"/>
+          <p:cNvPr id="7" name="Slide Number Placeholder 6"/>
           <p:cNvSpPr>
             <a:spLocks noGrp="1"/>
           </p:cNvSpPr>
           <p:nvPr>
-            <p:ph type="dt" sz="half" idx="10"/>
-          </p:nvPr>
-        </p:nvSpPr>
-        <p:spPr/>
-        <p:txBody>
-          <a:bodyPr/>
-          <a:lstStyle/>
-          <a:p>
-            <a:fld id="{09E22B56-B39A-4609-ACAF-221672A708D5}" type="datetimeFigureOut">
-              <a:rPr lang="en-GB" smtClean="0"/>
-              <a:t>12/08/2018</a:t>
-            </a:fld>
-            <a:endParaRPr lang="en-GB"/>
-          </a:p>
-        </p:txBody>
-      </p:sp>
-      <p:sp>
-        <p:nvSpPr>
-          <p:cNvPr id="6" name="Footer Placeholder 5"/>
-          <p:cNvSpPr>
-            <a:spLocks noGrp="1"/>
-          </p:cNvSpPr>
-          <p:nvPr>
-            <p:ph type="ftr" sz="quarter" idx="11"/>
-          </p:nvPr>
-        </p:nvSpPr>
-        <p:spPr/>
-        <p:txBody>
-          <a:bodyPr/>
-          <a:lstStyle/>
-          <a:p>
-            <a:endParaRPr lang="en-GB"/>
-          </a:p>
-        </p:txBody>
-      </p:sp>
-      <p:sp>
-        <p:nvSpPr>
-          <p:cNvPr id="7" name="Slide Number Placeholder 6"/>
-          <p:cNvSpPr>
-            <a:spLocks noGrp="1"/>
-          </p:cNvSpPr>
-          <p:nvPr>
             <p:ph type="sldNum" sz="quarter" idx="12"/>
           </p:nvPr>
         </p:nvSpPr>
-        <p:spPr/>
+        <p:spPr>
+          <a:xfrm>
+            <a:off x="11446624" y="6467303"/>
+            <a:ext cx="745375" cy="390698"/>
+          </a:xfrm>
+          <a:prstGeom prst="rect">
+            <a:avLst/>
+          </a:prstGeom>
+        </p:spPr>
         <p:txBody>
           <a:bodyPr/>
           <a:lstStyle/>
@@ -3122,57 +2776,23 @@
       </p:sp>
       <p:sp>
         <p:nvSpPr>
-          <p:cNvPr id="7" name="Date Placeholder 6"/>
+          <p:cNvPr id="9" name="Slide Number Placeholder 8"/>
           <p:cNvSpPr>
             <a:spLocks noGrp="1"/>
           </p:cNvSpPr>
           <p:nvPr>
-            <p:ph type="dt" sz="half" idx="10"/>
-          </p:nvPr>
-        </p:nvSpPr>
-        <p:spPr/>
-        <p:txBody>
-          <a:bodyPr/>
-          <a:lstStyle/>
-          <a:p>
-            <a:fld id="{09E22B56-B39A-4609-ACAF-221672A708D5}" type="datetimeFigureOut">
-              <a:rPr lang="en-GB" smtClean="0"/>
-              <a:t>12/08/2018</a:t>
-            </a:fld>
-            <a:endParaRPr lang="en-GB"/>
-          </a:p>
-        </p:txBody>
-      </p:sp>
-      <p:sp>
-        <p:nvSpPr>
-          <p:cNvPr id="8" name="Footer Placeholder 7"/>
-          <p:cNvSpPr>
-            <a:spLocks noGrp="1"/>
-          </p:cNvSpPr>
-          <p:nvPr>
-            <p:ph type="ftr" sz="quarter" idx="11"/>
-          </p:nvPr>
-        </p:nvSpPr>
-        <p:spPr/>
-        <p:txBody>
-          <a:bodyPr/>
-          <a:lstStyle/>
-          <a:p>
-            <a:endParaRPr lang="en-GB"/>
-          </a:p>
-        </p:txBody>
-      </p:sp>
-      <p:sp>
-        <p:nvSpPr>
-          <p:cNvPr id="9" name="Slide Number Placeholder 8"/>
-          <p:cNvSpPr>
-            <a:spLocks noGrp="1"/>
-          </p:cNvSpPr>
-          <p:nvPr>
             <p:ph type="sldNum" sz="quarter" idx="12"/>
           </p:nvPr>
         </p:nvSpPr>
-        <p:spPr/>
+        <p:spPr>
+          <a:xfrm>
+            <a:off x="11446624" y="6467303"/>
+            <a:ext cx="745375" cy="390698"/>
+          </a:xfrm>
+          <a:prstGeom prst="rect">
+            <a:avLst/>
+          </a:prstGeom>
+        </p:spPr>
         <p:txBody>
           <a:bodyPr/>
           <a:lstStyle/>
@@ -4122,57 +3742,23 @@
       </p:sp>
       <p:sp>
         <p:nvSpPr>
-          <p:cNvPr id="3" name="Date Placeholder 2"/>
+          <p:cNvPr id="5" name="Slide Number Placeholder 4"/>
           <p:cNvSpPr>
             <a:spLocks noGrp="1"/>
           </p:cNvSpPr>
           <p:nvPr>
-            <p:ph type="dt" sz="half" idx="10"/>
-          </p:nvPr>
-        </p:nvSpPr>
-        <p:spPr/>
-        <p:txBody>
-          <a:bodyPr/>
-          <a:lstStyle/>
-          <a:p>
-            <a:fld id="{09E22B56-B39A-4609-ACAF-221672A708D5}" type="datetimeFigureOut">
-              <a:rPr lang="en-GB" smtClean="0"/>
-              <a:t>12/08/2018</a:t>
-            </a:fld>
-            <a:endParaRPr lang="en-GB"/>
-          </a:p>
-        </p:txBody>
-      </p:sp>
-      <p:sp>
-        <p:nvSpPr>
-          <p:cNvPr id="4" name="Footer Placeholder 3"/>
-          <p:cNvSpPr>
-            <a:spLocks noGrp="1"/>
-          </p:cNvSpPr>
-          <p:nvPr>
-            <p:ph type="ftr" sz="quarter" idx="11"/>
-          </p:nvPr>
-        </p:nvSpPr>
-        <p:spPr/>
-        <p:txBody>
-          <a:bodyPr/>
-          <a:lstStyle/>
-          <a:p>
-            <a:endParaRPr lang="en-GB"/>
-          </a:p>
-        </p:txBody>
-      </p:sp>
-      <p:sp>
-        <p:nvSpPr>
-          <p:cNvPr id="5" name="Slide Number Placeholder 4"/>
-          <p:cNvSpPr>
-            <a:spLocks noGrp="1"/>
-          </p:cNvSpPr>
-          <p:nvPr>
             <p:ph type="sldNum" sz="quarter" idx="12"/>
           </p:nvPr>
         </p:nvSpPr>
-        <p:spPr/>
+        <p:spPr>
+          <a:xfrm>
+            <a:off x="11446624" y="6467303"/>
+            <a:ext cx="745375" cy="390698"/>
+          </a:xfrm>
+          <a:prstGeom prst="rect">
+            <a:avLst/>
+          </a:prstGeom>
+        </p:spPr>
         <p:txBody>
           <a:bodyPr/>
           <a:lstStyle/>
@@ -4217,57 +3803,23 @@
       </p:grpSpPr>
       <p:sp>
         <p:nvSpPr>
-          <p:cNvPr id="2" name="Date Placeholder 1"/>
+          <p:cNvPr id="4" name="Slide Number Placeholder 3"/>
           <p:cNvSpPr>
             <a:spLocks noGrp="1"/>
           </p:cNvSpPr>
           <p:nvPr>
-            <p:ph type="dt" sz="half" idx="10"/>
-          </p:nvPr>
-        </p:nvSpPr>
-        <p:spPr/>
-        <p:txBody>
-          <a:bodyPr/>
-          <a:lstStyle/>
-          <a:p>
-            <a:fld id="{09E22B56-B39A-4609-ACAF-221672A708D5}" type="datetimeFigureOut">
-              <a:rPr lang="en-GB" smtClean="0"/>
-              <a:t>12/08/2018</a:t>
-            </a:fld>
-            <a:endParaRPr lang="en-GB"/>
-          </a:p>
-        </p:txBody>
-      </p:sp>
-      <p:sp>
-        <p:nvSpPr>
-          <p:cNvPr id="3" name="Footer Placeholder 2"/>
-          <p:cNvSpPr>
-            <a:spLocks noGrp="1"/>
-          </p:cNvSpPr>
-          <p:nvPr>
-            <p:ph type="ftr" sz="quarter" idx="11"/>
-          </p:nvPr>
-        </p:nvSpPr>
-        <p:spPr/>
-        <p:txBody>
-          <a:bodyPr/>
-          <a:lstStyle/>
-          <a:p>
-            <a:endParaRPr lang="en-GB"/>
-          </a:p>
-        </p:txBody>
-      </p:sp>
-      <p:sp>
-        <p:nvSpPr>
-          <p:cNvPr id="4" name="Slide Number Placeholder 3"/>
-          <p:cNvSpPr>
-            <a:spLocks noGrp="1"/>
-          </p:cNvSpPr>
-          <p:nvPr>
             <p:ph type="sldNum" sz="quarter" idx="12"/>
           </p:nvPr>
         </p:nvSpPr>
-        <p:spPr/>
+        <p:spPr>
+          <a:xfrm>
+            <a:off x="11446624" y="6467303"/>
+            <a:ext cx="745375" cy="390698"/>
+          </a:xfrm>
+          <a:prstGeom prst="rect">
+            <a:avLst/>
+          </a:prstGeom>
+        </p:spPr>
         <p:txBody>
           <a:bodyPr/>
           <a:lstStyle/>
@@ -4494,57 +4046,23 @@
       </p:sp>
       <p:sp>
         <p:nvSpPr>
-          <p:cNvPr id="5" name="Date Placeholder 4"/>
+          <p:cNvPr id="7" name="Slide Number Placeholder 6"/>
           <p:cNvSpPr>
             <a:spLocks noGrp="1"/>
           </p:cNvSpPr>
           <p:nvPr>
-            <p:ph type="dt" sz="half" idx="10"/>
-          </p:nvPr>
-        </p:nvSpPr>
-        <p:spPr/>
-        <p:txBody>
-          <a:bodyPr/>
-          <a:lstStyle/>
-          <a:p>
-            <a:fld id="{09E22B56-B39A-4609-ACAF-221672A708D5}" type="datetimeFigureOut">
-              <a:rPr lang="en-GB" smtClean="0"/>
-              <a:t>12/08/2018</a:t>
-            </a:fld>
-            <a:endParaRPr lang="en-GB"/>
-          </a:p>
-        </p:txBody>
-      </p:sp>
-      <p:sp>
-        <p:nvSpPr>
-          <p:cNvPr id="6" name="Footer Placeholder 5"/>
-          <p:cNvSpPr>
-            <a:spLocks noGrp="1"/>
-          </p:cNvSpPr>
-          <p:nvPr>
-            <p:ph type="ftr" sz="quarter" idx="11"/>
-          </p:nvPr>
-        </p:nvSpPr>
-        <p:spPr/>
-        <p:txBody>
-          <a:bodyPr/>
-          <a:lstStyle/>
-          <a:p>
-            <a:endParaRPr lang="en-GB"/>
-          </a:p>
-        </p:txBody>
-      </p:sp>
-      <p:sp>
-        <p:nvSpPr>
-          <p:cNvPr id="7" name="Slide Number Placeholder 6"/>
-          <p:cNvSpPr>
-            <a:spLocks noGrp="1"/>
-          </p:cNvSpPr>
-          <p:nvPr>
             <p:ph type="sldNum" sz="quarter" idx="12"/>
           </p:nvPr>
         </p:nvSpPr>
-        <p:spPr/>
+        <p:spPr>
+          <a:xfrm>
+            <a:off x="11446624" y="6467303"/>
+            <a:ext cx="745375" cy="390698"/>
+          </a:xfrm>
+          <a:prstGeom prst="rect">
+            <a:avLst/>
+          </a:prstGeom>
+        </p:spPr>
         <p:txBody>
           <a:bodyPr/>
           <a:lstStyle/>
@@ -4751,57 +4269,23 @@
       </p:sp>
       <p:sp>
         <p:nvSpPr>
-          <p:cNvPr id="5" name="Date Placeholder 4"/>
+          <p:cNvPr id="7" name="Slide Number Placeholder 6"/>
           <p:cNvSpPr>
             <a:spLocks noGrp="1"/>
           </p:cNvSpPr>
           <p:nvPr>
-            <p:ph type="dt" sz="half" idx="10"/>
-          </p:nvPr>
-        </p:nvSpPr>
-        <p:spPr/>
-        <p:txBody>
-          <a:bodyPr/>
-          <a:lstStyle/>
-          <a:p>
-            <a:fld id="{09E22B56-B39A-4609-ACAF-221672A708D5}" type="datetimeFigureOut">
-              <a:rPr lang="en-GB" smtClean="0"/>
-              <a:t>12/08/2018</a:t>
-            </a:fld>
-            <a:endParaRPr lang="en-GB"/>
-          </a:p>
-        </p:txBody>
-      </p:sp>
-      <p:sp>
-        <p:nvSpPr>
-          <p:cNvPr id="6" name="Footer Placeholder 5"/>
-          <p:cNvSpPr>
-            <a:spLocks noGrp="1"/>
-          </p:cNvSpPr>
-          <p:nvPr>
-            <p:ph type="ftr" sz="quarter" idx="11"/>
-          </p:nvPr>
-        </p:nvSpPr>
-        <p:spPr/>
-        <p:txBody>
-          <a:bodyPr/>
-          <a:lstStyle/>
-          <a:p>
-            <a:endParaRPr lang="en-GB"/>
-          </a:p>
-        </p:txBody>
-      </p:sp>
-      <p:sp>
-        <p:nvSpPr>
-          <p:cNvPr id="7" name="Slide Number Placeholder 6"/>
-          <p:cNvSpPr>
-            <a:spLocks noGrp="1"/>
-          </p:cNvSpPr>
-          <p:nvPr>
             <p:ph type="sldNum" sz="quarter" idx="12"/>
           </p:nvPr>
         </p:nvSpPr>
-        <p:spPr/>
+        <p:spPr>
+          <a:xfrm>
+            <a:off x="11446624" y="6467303"/>
+            <a:ext cx="745375" cy="390698"/>
+          </a:xfrm>
+          <a:prstGeom prst="rect">
+            <a:avLst/>
+          </a:prstGeom>
+        </p:spPr>
         <p:txBody>
           <a:bodyPr/>
           <a:lstStyle/>
@@ -4895,7 +4379,7 @@
         <p:spPr>
           <a:xfrm>
             <a:off x="838200" y="1267326"/>
-            <a:ext cx="10515600" cy="4909637"/>
+            <a:ext cx="10515600" cy="5499234"/>
           </a:xfrm>
           <a:prstGeom prst="rect">
             <a:avLst/>
@@ -4946,111 +4430,24 @@
       </p:sp>
       <p:sp>
         <p:nvSpPr>
-          <p:cNvPr id="4" name="Date Placeholder 3"/>
+          <p:cNvPr id="7" name="Tijdelijke aanduiding voor dianummer 6">
+            <a:extLst>
+              <a:ext uri="{FF2B5EF4-FFF2-40B4-BE49-F238E27FC236}">
+                <a16:creationId xmlns:a16="http://schemas.microsoft.com/office/drawing/2014/main" id="{2BE5B0FB-02F3-4043-B775-9AA6BB7C99CC}"/>
+              </a:ext>
+            </a:extLst>
+          </p:cNvPr>
           <p:cNvSpPr>
             <a:spLocks noGrp="1"/>
           </p:cNvSpPr>
           <p:nvPr>
-            <p:ph type="dt" sz="half" idx="2"/>
+            <p:ph type="sldNum" sz="quarter" idx="4"/>
           </p:nvPr>
         </p:nvSpPr>
         <p:spPr>
           <a:xfrm>
-            <a:off x="838200" y="6356350"/>
-            <a:ext cx="2743200" cy="365125"/>
-          </a:xfrm>
-          <a:prstGeom prst="rect">
-            <a:avLst/>
-          </a:prstGeom>
-        </p:spPr>
-        <p:txBody>
-          <a:bodyPr vert="horz" lIns="91440" tIns="45720" rIns="91440" bIns="45720" rtlCol="0" anchor="ctr"/>
-          <a:lstStyle>
-            <a:lvl1pPr algn="l">
-              <a:defRPr sz="1200">
-                <a:solidFill>
-                  <a:schemeClr val="tx1">
-                    <a:tint val="75000"/>
-                  </a:schemeClr>
-                </a:solidFill>
-                <a:effectLst>
-                  <a:outerShdw blurRad="38100" dist="38100" dir="2700000" algn="tl">
-                    <a:srgbClr val="000000">
-                      <a:alpha val="43137"/>
-                    </a:srgbClr>
-                  </a:outerShdw>
-                </a:effectLst>
-              </a:defRPr>
-            </a:lvl1pPr>
-          </a:lstStyle>
-          <a:p>
-            <a:fld id="{09E22B56-B39A-4609-ACAF-221672A708D5}" type="datetimeFigureOut">
-              <a:rPr lang="en-GB" smtClean="0"/>
-              <a:pPr/>
-              <a:t>12/08/2018</a:t>
-            </a:fld>
-            <a:endParaRPr lang="en-GB"/>
-          </a:p>
-        </p:txBody>
-      </p:sp>
-      <p:sp>
-        <p:nvSpPr>
-          <p:cNvPr id="5" name="Footer Placeholder 4"/>
-          <p:cNvSpPr>
-            <a:spLocks noGrp="1"/>
-          </p:cNvSpPr>
-          <p:nvPr>
-            <p:ph type="ftr" sz="quarter" idx="3"/>
-          </p:nvPr>
-        </p:nvSpPr>
-        <p:spPr>
-          <a:xfrm>
-            <a:off x="4038600" y="6356350"/>
-            <a:ext cx="4114800" cy="365125"/>
-          </a:xfrm>
-          <a:prstGeom prst="rect">
-            <a:avLst/>
-          </a:prstGeom>
-        </p:spPr>
-        <p:txBody>
-          <a:bodyPr vert="horz" lIns="91440" tIns="45720" rIns="91440" bIns="45720" rtlCol="0" anchor="ctr"/>
-          <a:lstStyle>
-            <a:lvl1pPr algn="ctr">
-              <a:defRPr sz="1200">
-                <a:solidFill>
-                  <a:schemeClr val="tx1">
-                    <a:tint val="75000"/>
-                  </a:schemeClr>
-                </a:solidFill>
-                <a:effectLst>
-                  <a:outerShdw blurRad="38100" dist="38100" dir="2700000" algn="tl">
-                    <a:srgbClr val="000000">
-                      <a:alpha val="43137"/>
-                    </a:srgbClr>
-                  </a:outerShdw>
-                </a:effectLst>
-              </a:defRPr>
-            </a:lvl1pPr>
-          </a:lstStyle>
-          <a:p>
-            <a:endParaRPr lang="en-GB"/>
-          </a:p>
-        </p:txBody>
-      </p:sp>
-      <p:sp>
-        <p:nvSpPr>
-          <p:cNvPr id="6" name="Slide Number Placeholder 5"/>
-          <p:cNvSpPr>
-            <a:spLocks noGrp="1"/>
-          </p:cNvSpPr>
-          <p:nvPr>
-            <p:ph type="sldNum" sz="quarter" idx="4"/>
-          </p:nvPr>
-        </p:nvSpPr>
-        <p:spPr>
-          <a:xfrm>
-            <a:off x="8610600" y="6356350"/>
-            <a:ext cx="2743200" cy="365125"/>
+            <a:off x="11430000" y="6508865"/>
+            <a:ext cx="762000" cy="349134"/>
           </a:xfrm>
           <a:prstGeom prst="rect">
             <a:avLst/>
@@ -5066,20 +4463,12 @@
                     <a:tint val="75000"/>
                   </a:schemeClr>
                 </a:solidFill>
-                <a:effectLst>
-                  <a:outerShdw blurRad="38100" dist="38100" dir="2700000" algn="tl">
-                    <a:srgbClr val="000000">
-                      <a:alpha val="43137"/>
-                    </a:srgbClr>
-                  </a:outerShdw>
-                </a:effectLst>
               </a:defRPr>
             </a:lvl1pPr>
           </a:lstStyle>
           <a:p>
-            <a:fld id="{1F469EBC-A649-4E3E-8046-4745AB923F3E}" type="slidenum">
+            <a:fld id="{855360DC-B2AA-4E4F-89F8-6C8B81DF6F4E}" type="slidenum">
               <a:rPr lang="en-GB" smtClean="0"/>
-              <a:pPr/>
               <a:t>‹nr.›</a:t>
             </a:fld>
             <a:endParaRPr lang="en-GB"/>
@@ -5111,6 +4500,7 @@
     <p:sldLayoutId id="2147483686" r:id="rId14"/>
     <p:sldLayoutId id="2147483687" r:id="rId15"/>
   </p:sldLayoutIdLst>
+  <p:hf hdr="0" ftr="0" dt="0"/>
   <p:txStyles>
     <p:titleStyle>
       <a:lvl1pPr algn="ctr" defTabSz="914400" rtl="0" eaLnBrk="1" latinLnBrk="0" hangingPunct="1">

</xml_diff>

<commit_message>
Added slide numbers to the powerpoints
</commit_message>
<xml_diff>
--- a/data/powerpoint/template.pptx
+++ b/data/powerpoint/template.pptx
@@ -197,7 +197,7 @@
           <a:p>
             <a:fld id="{FEE386D4-E0F5-48ED-B382-C5D6AB88A5B0}" type="datetimeFigureOut">
               <a:rPr lang="en-GB" smtClean="0"/>
-              <a:t>12/08/2018</a:t>
+              <a:t>13/08/2018</a:t>
             </a:fld>
             <a:endParaRPr lang="en-GB"/>
           </a:p>
@@ -4430,24 +4430,20 @@
       </p:sp>
       <p:sp>
         <p:nvSpPr>
-          <p:cNvPr id="7" name="Tijdelijke aanduiding voor dianummer 6">
+          <p:cNvPr id="4" name="Tekstvak 3">
             <a:extLst>
               <a:ext uri="{FF2B5EF4-FFF2-40B4-BE49-F238E27FC236}">
-                <a16:creationId xmlns:a16="http://schemas.microsoft.com/office/drawing/2014/main" id="{2BE5B0FB-02F3-4043-B775-9AA6BB7C99CC}"/>
+                <a16:creationId xmlns:a16="http://schemas.microsoft.com/office/drawing/2014/main" id="{74C5C451-D909-4140-B381-9B55CB5F4E37}"/>
               </a:ext>
             </a:extLst>
           </p:cNvPr>
-          <p:cNvSpPr>
-            <a:spLocks noGrp="1"/>
-          </p:cNvSpPr>
-          <p:nvPr>
-            <p:ph type="sldNum" sz="quarter" idx="4"/>
-          </p:nvPr>
+          <p:cNvSpPr txBox="1"/>
+          <p:nvPr userDrawn="1"/>
         </p:nvSpPr>
         <p:spPr>
           <a:xfrm>
-            <a:off x="11430000" y="6508865"/>
-            <a:ext cx="762000" cy="349134"/>
+            <a:off x="11471564" y="6517178"/>
+            <a:ext cx="720436" cy="340822"/>
           </a:xfrm>
           <a:prstGeom prst="rect">
             <a:avLst/>
@@ -4456,6 +4452,9 @@
         <p:txBody>
           <a:bodyPr vert="horz" lIns="91440" tIns="45720" rIns="91440" bIns="45720" rtlCol="0" anchor="ctr"/>
           <a:lstStyle>
+            <a:defPPr>
+              <a:defRPr lang="en-US"/>
+            </a:defPPr>
             <a:lvl1pPr algn="r">
               <a:defRPr sz="1200">
                 <a:solidFill>
@@ -4467,11 +4466,12 @@
             </a:lvl1pPr>
           </a:lstStyle>
           <a:p>
-            <a:fld id="{855360DC-B2AA-4E4F-89F8-6C8B81DF6F4E}" type="slidenum">
+            <a:pPr lvl="0"/>
+            <a:fld id="{D3555157-950B-4007-A6E1-787135ACA693}" type="slidenum">
               <a:rPr lang="en-GB" smtClean="0"/>
               <a:t>‹nr.›</a:t>
             </a:fld>
-            <a:endParaRPr lang="en-GB"/>
+            <a:endParaRPr lang="en-GB" dirty="0"/>
           </a:p>
         </p:txBody>
       </p:sp>

</xml_diff>

<commit_message>
Added three images slide template
</commit_message>
<xml_diff>
--- a/data/powerpoint/template.pptx
+++ b/data/powerpoint/template.pptx
@@ -197,7 +197,7 @@
           <a:p>
             <a:fld id="{FEE386D4-E0F5-48ED-B382-C5D6AB88A5B0}" type="datetimeFigureOut">
               <a:rPr lang="en-GB" smtClean="0"/>
-              <a:t>13/08/2018</a:t>
+              <a:t>14/08/2018</a:t>
             </a:fld>
             <a:endParaRPr lang="en-GB"/>
           </a:p>
@@ -1934,6 +1934,893 @@
       </p:bldP>
       <p:bldP spid="10" grpId="0"/>
       <p:bldP spid="13" grpId="0"/>
+    </p:bldLst>
+  </p:timing>
+</p:sldLayout>
+</file>
+
+<file path=ppt/slideLayouts/slideLayout16.xml><?xml version="1.0" encoding="utf-8"?>
+<p:sldLayout xmlns:a="http://schemas.openxmlformats.org/drawingml/2006/main" xmlns:r="http://schemas.openxmlformats.org/officeDocument/2006/relationships" xmlns:p="http://schemas.openxmlformats.org/presentationml/2006/main" preserve="1" userDrawn="1">
+  <p:cSld name="2_Vergelijking">
+    <p:spTree>
+      <p:nvGrpSpPr>
+        <p:cNvPr id="1" name=""/>
+        <p:cNvGrpSpPr/>
+        <p:nvPr/>
+      </p:nvGrpSpPr>
+      <p:grpSpPr>
+        <a:xfrm>
+          <a:off x="0" y="0"/>
+          <a:ext cx="0" cy="0"/>
+          <a:chOff x="0" y="0"/>
+          <a:chExt cx="0" cy="0"/>
+        </a:xfrm>
+      </p:grpSpPr>
+      <p:sp>
+        <p:nvSpPr>
+          <p:cNvPr id="2" name="Title 1"/>
+          <p:cNvSpPr>
+            <a:spLocks noGrp="1"/>
+          </p:cNvSpPr>
+          <p:nvPr>
+            <p:ph type="title"/>
+          </p:nvPr>
+        </p:nvSpPr>
+        <p:spPr>
+          <a:xfrm>
+            <a:off x="839788" y="365125"/>
+            <a:ext cx="10515600" cy="774000"/>
+          </a:xfrm>
+        </p:spPr>
+        <p:txBody>
+          <a:bodyPr/>
+          <a:lstStyle/>
+          <a:p>
+            <a:r>
+              <a:rPr lang="nl-NL"/>
+              <a:t>Klik om stijl te bewerken</a:t>
+            </a:r>
+            <a:endParaRPr lang="en-US" dirty="0"/>
+          </a:p>
+        </p:txBody>
+      </p:sp>
+      <p:sp>
+        <p:nvSpPr>
+          <p:cNvPr id="3" name="Text Placeholder 2"/>
+          <p:cNvSpPr>
+            <a:spLocks noGrp="1"/>
+          </p:cNvSpPr>
+          <p:nvPr>
+            <p:ph type="body" idx="1"/>
+          </p:nvPr>
+        </p:nvSpPr>
+        <p:spPr>
+          <a:xfrm>
+            <a:off x="839789" y="5848323"/>
+            <a:ext cx="3482568" cy="823912"/>
+          </a:xfrm>
+        </p:spPr>
+        <p:txBody>
+          <a:bodyPr anchor="ctr"/>
+          <a:lstStyle>
+            <a:lvl1pPr marL="0" indent="0" algn="ctr">
+              <a:buNone/>
+              <a:defRPr sz="2400" b="1"/>
+            </a:lvl1pPr>
+            <a:lvl2pPr marL="457200" indent="0">
+              <a:buNone/>
+              <a:defRPr sz="2000" b="1"/>
+            </a:lvl2pPr>
+            <a:lvl3pPr marL="914400" indent="0">
+              <a:buNone/>
+              <a:defRPr sz="1800" b="1"/>
+            </a:lvl3pPr>
+            <a:lvl4pPr marL="1371600" indent="0">
+              <a:buNone/>
+              <a:defRPr sz="1600" b="1"/>
+            </a:lvl4pPr>
+            <a:lvl5pPr marL="1828800" indent="0">
+              <a:buNone/>
+              <a:defRPr sz="1600" b="1"/>
+            </a:lvl5pPr>
+            <a:lvl6pPr marL="2286000" indent="0">
+              <a:buNone/>
+              <a:defRPr sz="1600" b="1"/>
+            </a:lvl6pPr>
+            <a:lvl7pPr marL="2743200" indent="0">
+              <a:buNone/>
+              <a:defRPr sz="1600" b="1"/>
+            </a:lvl7pPr>
+            <a:lvl8pPr marL="3200400" indent="0">
+              <a:buNone/>
+              <a:defRPr sz="1600" b="1"/>
+            </a:lvl8pPr>
+            <a:lvl9pPr marL="3657600" indent="0">
+              <a:buNone/>
+              <a:defRPr sz="1600" b="1"/>
+            </a:lvl9pPr>
+          </a:lstStyle>
+          <a:p>
+            <a:pPr lvl="0"/>
+            <a:r>
+              <a:rPr lang="nl-NL"/>
+              <a:t>Tekststijl van het model bewerken</a:t>
+            </a:r>
+          </a:p>
+        </p:txBody>
+      </p:sp>
+      <p:sp>
+        <p:nvSpPr>
+          <p:cNvPr id="9" name="Slide Number Placeholder 8"/>
+          <p:cNvSpPr>
+            <a:spLocks noGrp="1"/>
+          </p:cNvSpPr>
+          <p:nvPr>
+            <p:ph type="sldNum" sz="quarter" idx="12"/>
+          </p:nvPr>
+        </p:nvSpPr>
+        <p:spPr>
+          <a:xfrm>
+            <a:off x="11446624" y="6467303"/>
+            <a:ext cx="745375" cy="390698"/>
+          </a:xfrm>
+          <a:prstGeom prst="rect">
+            <a:avLst/>
+          </a:prstGeom>
+        </p:spPr>
+        <p:txBody>
+          <a:bodyPr/>
+          <a:lstStyle/>
+          <a:p>
+            <a:fld id="{1F469EBC-A649-4E3E-8046-4745AB923F3E}" type="slidenum">
+              <a:rPr lang="en-GB" smtClean="0"/>
+              <a:t>‹nr.›</a:t>
+            </a:fld>
+            <a:endParaRPr lang="en-GB"/>
+          </a:p>
+        </p:txBody>
+      </p:sp>
+      <p:sp>
+        <p:nvSpPr>
+          <p:cNvPr id="5" name="Text Placeholder 4"/>
+          <p:cNvSpPr>
+            <a:spLocks noGrp="1"/>
+          </p:cNvSpPr>
+          <p:nvPr>
+            <p:ph type="body" sz="quarter" idx="3"/>
+          </p:nvPr>
+        </p:nvSpPr>
+        <p:spPr>
+          <a:xfrm>
+            <a:off x="4343238" y="5848323"/>
+            <a:ext cx="3499457" cy="823912"/>
+          </a:xfrm>
+        </p:spPr>
+        <p:txBody>
+          <a:bodyPr anchor="ctr"/>
+          <a:lstStyle>
+            <a:lvl1pPr marL="0" indent="0" algn="ctr">
+              <a:buNone/>
+              <a:defRPr sz="2400" b="1"/>
+            </a:lvl1pPr>
+            <a:lvl2pPr marL="457200" indent="0">
+              <a:buNone/>
+              <a:defRPr sz="2000" b="1"/>
+            </a:lvl2pPr>
+            <a:lvl3pPr marL="914400" indent="0">
+              <a:buNone/>
+              <a:defRPr sz="1800" b="1"/>
+            </a:lvl3pPr>
+            <a:lvl4pPr marL="1371600" indent="0">
+              <a:buNone/>
+              <a:defRPr sz="1600" b="1"/>
+            </a:lvl4pPr>
+            <a:lvl5pPr marL="1828800" indent="0">
+              <a:buNone/>
+              <a:defRPr sz="1600" b="1"/>
+            </a:lvl5pPr>
+            <a:lvl6pPr marL="2286000" indent="0">
+              <a:buNone/>
+              <a:defRPr sz="1600" b="1"/>
+            </a:lvl6pPr>
+            <a:lvl7pPr marL="2743200" indent="0">
+              <a:buNone/>
+              <a:defRPr sz="1600" b="1"/>
+            </a:lvl7pPr>
+            <a:lvl8pPr marL="3200400" indent="0">
+              <a:buNone/>
+              <a:defRPr sz="1600" b="1"/>
+            </a:lvl8pPr>
+            <a:lvl9pPr marL="3657600" indent="0">
+              <a:buNone/>
+              <a:defRPr sz="1600" b="1"/>
+            </a:lvl9pPr>
+          </a:lstStyle>
+          <a:p>
+            <a:pPr lvl="0"/>
+            <a:r>
+              <a:rPr lang="nl-NL" dirty="0"/>
+              <a:t>Tekststijl van het model bewerken</a:t>
+            </a:r>
+          </a:p>
+        </p:txBody>
+      </p:sp>
+      <p:sp>
+        <p:nvSpPr>
+          <p:cNvPr id="10" name="Picture Placeholder 2">
+            <a:extLst>
+              <a:ext uri="{FF2B5EF4-FFF2-40B4-BE49-F238E27FC236}">
+                <a16:creationId xmlns:a16="http://schemas.microsoft.com/office/drawing/2014/main" id="{F6240A81-61E1-4F0E-8486-34C6FA7C8F1D}"/>
+              </a:ext>
+            </a:extLst>
+          </p:cNvPr>
+          <p:cNvSpPr>
+            <a:spLocks noGrp="1" noChangeAspect="1"/>
+          </p:cNvSpPr>
+          <p:nvPr>
+            <p:ph type="pic" idx="13"/>
+          </p:nvPr>
+        </p:nvSpPr>
+        <p:spPr>
+          <a:xfrm>
+            <a:off x="829867" y="1244054"/>
+            <a:ext cx="3492751" cy="4604269"/>
+          </a:xfrm>
+        </p:spPr>
+        <p:txBody>
+          <a:bodyPr anchor="ctr">
+            <a:normAutofit/>
+          </a:bodyPr>
+          <a:lstStyle>
+            <a:lvl1pPr marL="0" indent="0" algn="ctr">
+              <a:buNone/>
+              <a:defRPr sz="2400" i="1">
+                <a:solidFill>
+                  <a:schemeClr val="tx1"/>
+                </a:solidFill>
+              </a:defRPr>
+            </a:lvl1pPr>
+            <a:lvl2pPr marL="457200" indent="0">
+              <a:buNone/>
+              <a:defRPr sz="2800"/>
+            </a:lvl2pPr>
+            <a:lvl3pPr marL="914400" indent="0">
+              <a:buNone/>
+              <a:defRPr sz="2400"/>
+            </a:lvl3pPr>
+            <a:lvl4pPr marL="1371600" indent="0">
+              <a:buNone/>
+              <a:defRPr sz="2000"/>
+            </a:lvl4pPr>
+            <a:lvl5pPr marL="1828800" indent="0">
+              <a:buNone/>
+              <a:defRPr sz="2000"/>
+            </a:lvl5pPr>
+            <a:lvl6pPr marL="2286000" indent="0">
+              <a:buNone/>
+              <a:defRPr sz="2000"/>
+            </a:lvl6pPr>
+            <a:lvl7pPr marL="2743200" indent="0">
+              <a:buNone/>
+              <a:defRPr sz="2000"/>
+            </a:lvl7pPr>
+            <a:lvl8pPr marL="3200400" indent="0">
+              <a:buNone/>
+              <a:defRPr sz="2000"/>
+            </a:lvl8pPr>
+            <a:lvl9pPr marL="3657600" indent="0">
+              <a:buNone/>
+              <a:defRPr sz="2000"/>
+            </a:lvl9pPr>
+          </a:lstStyle>
+          <a:p>
+            <a:r>
+              <a:rPr lang="nl-NL"/>
+              <a:t>Klik op het pictogram als u een afbeelding wilt toevoegen</a:t>
+            </a:r>
+            <a:endParaRPr lang="en-US" dirty="0"/>
+          </a:p>
+        </p:txBody>
+      </p:sp>
+      <p:sp>
+        <p:nvSpPr>
+          <p:cNvPr id="13" name="Picture Placeholder 2">
+            <a:extLst>
+              <a:ext uri="{FF2B5EF4-FFF2-40B4-BE49-F238E27FC236}">
+                <a16:creationId xmlns:a16="http://schemas.microsoft.com/office/drawing/2014/main" id="{0B9372D3-59C0-456D-89B2-9ED076865C2E}"/>
+              </a:ext>
+            </a:extLst>
+          </p:cNvPr>
+          <p:cNvSpPr>
+            <a:spLocks noGrp="1" noChangeAspect="1"/>
+          </p:cNvSpPr>
+          <p:nvPr>
+            <p:ph type="pic" idx="14"/>
+          </p:nvPr>
+        </p:nvSpPr>
+        <p:spPr>
+          <a:xfrm>
+            <a:off x="4353558" y="1244054"/>
+            <a:ext cx="3492490" cy="4604269"/>
+          </a:xfrm>
+        </p:spPr>
+        <p:txBody>
+          <a:bodyPr anchor="ctr">
+            <a:normAutofit/>
+          </a:bodyPr>
+          <a:lstStyle>
+            <a:lvl1pPr marL="0" indent="0" algn="ctr">
+              <a:buNone/>
+              <a:defRPr sz="2400" i="1">
+                <a:solidFill>
+                  <a:schemeClr val="tx1"/>
+                </a:solidFill>
+              </a:defRPr>
+            </a:lvl1pPr>
+            <a:lvl2pPr marL="457200" indent="0">
+              <a:buNone/>
+              <a:defRPr sz="2800"/>
+            </a:lvl2pPr>
+            <a:lvl3pPr marL="914400" indent="0">
+              <a:buNone/>
+              <a:defRPr sz="2400"/>
+            </a:lvl3pPr>
+            <a:lvl4pPr marL="1371600" indent="0">
+              <a:buNone/>
+              <a:defRPr sz="2000"/>
+            </a:lvl4pPr>
+            <a:lvl5pPr marL="1828800" indent="0">
+              <a:buNone/>
+              <a:defRPr sz="2000"/>
+            </a:lvl5pPr>
+            <a:lvl6pPr marL="2286000" indent="0">
+              <a:buNone/>
+              <a:defRPr sz="2000"/>
+            </a:lvl6pPr>
+            <a:lvl7pPr marL="2743200" indent="0">
+              <a:buNone/>
+              <a:defRPr sz="2000"/>
+            </a:lvl7pPr>
+            <a:lvl8pPr marL="3200400" indent="0">
+              <a:buNone/>
+              <a:defRPr sz="2000"/>
+            </a:lvl8pPr>
+            <a:lvl9pPr marL="3657600" indent="0">
+              <a:buNone/>
+              <a:defRPr sz="2000"/>
+            </a:lvl9pPr>
+          </a:lstStyle>
+          <a:p>
+            <a:r>
+              <a:rPr lang="nl-NL" dirty="0"/>
+              <a:t>Klik op het pictogram als u een afbeelding wilt toevoegen</a:t>
+            </a:r>
+            <a:endParaRPr lang="en-US" dirty="0"/>
+          </a:p>
+        </p:txBody>
+      </p:sp>
+      <p:sp>
+        <p:nvSpPr>
+          <p:cNvPr id="12" name="Text Placeholder 4">
+            <a:extLst>
+              <a:ext uri="{FF2B5EF4-FFF2-40B4-BE49-F238E27FC236}">
+                <a16:creationId xmlns:a16="http://schemas.microsoft.com/office/drawing/2014/main" id="{40DFE8DB-86A6-4DF2-979B-7B94C278B273}"/>
+              </a:ext>
+            </a:extLst>
+          </p:cNvPr>
+          <p:cNvSpPr>
+            <a:spLocks noGrp="1"/>
+          </p:cNvSpPr>
+          <p:nvPr>
+            <p:ph type="body" sz="quarter" idx="15"/>
+          </p:nvPr>
+        </p:nvSpPr>
+        <p:spPr>
+          <a:xfrm>
+            <a:off x="7849401" y="5848323"/>
+            <a:ext cx="3499457" cy="823912"/>
+          </a:xfrm>
+        </p:spPr>
+        <p:txBody>
+          <a:bodyPr anchor="ctr"/>
+          <a:lstStyle>
+            <a:lvl1pPr marL="0" indent="0" algn="ctr">
+              <a:buNone/>
+              <a:defRPr sz="2400" b="1"/>
+            </a:lvl1pPr>
+            <a:lvl2pPr marL="457200" indent="0">
+              <a:buNone/>
+              <a:defRPr sz="2000" b="1"/>
+            </a:lvl2pPr>
+            <a:lvl3pPr marL="914400" indent="0">
+              <a:buNone/>
+              <a:defRPr sz="1800" b="1"/>
+            </a:lvl3pPr>
+            <a:lvl4pPr marL="1371600" indent="0">
+              <a:buNone/>
+              <a:defRPr sz="1600" b="1"/>
+            </a:lvl4pPr>
+            <a:lvl5pPr marL="1828800" indent="0">
+              <a:buNone/>
+              <a:defRPr sz="1600" b="1"/>
+            </a:lvl5pPr>
+            <a:lvl6pPr marL="2286000" indent="0">
+              <a:buNone/>
+              <a:defRPr sz="1600" b="1"/>
+            </a:lvl6pPr>
+            <a:lvl7pPr marL="2743200" indent="0">
+              <a:buNone/>
+              <a:defRPr sz="1600" b="1"/>
+            </a:lvl7pPr>
+            <a:lvl8pPr marL="3200400" indent="0">
+              <a:buNone/>
+              <a:defRPr sz="1600" b="1"/>
+            </a:lvl8pPr>
+            <a:lvl9pPr marL="3657600" indent="0">
+              <a:buNone/>
+              <a:defRPr sz="1600" b="1"/>
+            </a:lvl9pPr>
+          </a:lstStyle>
+          <a:p>
+            <a:pPr lvl="0"/>
+            <a:r>
+              <a:rPr lang="nl-NL" dirty="0"/>
+              <a:t>Tekststijl van het model bewerken</a:t>
+            </a:r>
+          </a:p>
+        </p:txBody>
+      </p:sp>
+      <p:sp>
+        <p:nvSpPr>
+          <p:cNvPr id="14" name="Picture Placeholder 2">
+            <a:extLst>
+              <a:ext uri="{FF2B5EF4-FFF2-40B4-BE49-F238E27FC236}">
+                <a16:creationId xmlns:a16="http://schemas.microsoft.com/office/drawing/2014/main" id="{C9B09FD1-0CE5-40F0-895B-A7B688884CE9}"/>
+              </a:ext>
+            </a:extLst>
+          </p:cNvPr>
+          <p:cNvSpPr>
+            <a:spLocks noGrp="1" noChangeAspect="1"/>
+          </p:cNvSpPr>
+          <p:nvPr>
+            <p:ph type="pic" idx="16"/>
+          </p:nvPr>
+        </p:nvSpPr>
+        <p:spPr>
+          <a:xfrm>
+            <a:off x="7859721" y="1244054"/>
+            <a:ext cx="3492490" cy="4604269"/>
+          </a:xfrm>
+        </p:spPr>
+        <p:txBody>
+          <a:bodyPr anchor="ctr">
+            <a:normAutofit/>
+          </a:bodyPr>
+          <a:lstStyle>
+            <a:lvl1pPr marL="0" indent="0" algn="ctr">
+              <a:buNone/>
+              <a:defRPr sz="2400" i="1">
+                <a:solidFill>
+                  <a:schemeClr val="tx1"/>
+                </a:solidFill>
+              </a:defRPr>
+            </a:lvl1pPr>
+            <a:lvl2pPr marL="457200" indent="0">
+              <a:buNone/>
+              <a:defRPr sz="2800"/>
+            </a:lvl2pPr>
+            <a:lvl3pPr marL="914400" indent="0">
+              <a:buNone/>
+              <a:defRPr sz="2400"/>
+            </a:lvl3pPr>
+            <a:lvl4pPr marL="1371600" indent="0">
+              <a:buNone/>
+              <a:defRPr sz="2000"/>
+            </a:lvl4pPr>
+            <a:lvl5pPr marL="1828800" indent="0">
+              <a:buNone/>
+              <a:defRPr sz="2000"/>
+            </a:lvl5pPr>
+            <a:lvl6pPr marL="2286000" indent="0">
+              <a:buNone/>
+              <a:defRPr sz="2000"/>
+            </a:lvl6pPr>
+            <a:lvl7pPr marL="2743200" indent="0">
+              <a:buNone/>
+              <a:defRPr sz="2000"/>
+            </a:lvl7pPr>
+            <a:lvl8pPr marL="3200400" indent="0">
+              <a:buNone/>
+              <a:defRPr sz="2000"/>
+            </a:lvl8pPr>
+            <a:lvl9pPr marL="3657600" indent="0">
+              <a:buNone/>
+              <a:defRPr sz="2000"/>
+            </a:lvl9pPr>
+          </a:lstStyle>
+          <a:p>
+            <a:r>
+              <a:rPr lang="nl-NL" dirty="0"/>
+              <a:t>Klik op het pictogram als u een afbeelding wilt toevoegen</a:t>
+            </a:r>
+            <a:endParaRPr lang="en-US" dirty="0"/>
+          </a:p>
+        </p:txBody>
+      </p:sp>
+    </p:spTree>
+    <p:extLst>
+      <p:ext uri="{BB962C8B-B14F-4D97-AF65-F5344CB8AC3E}">
+        <p14:creationId xmlns:p14="http://schemas.microsoft.com/office/powerpoint/2010/main" val="2960243164"/>
+      </p:ext>
+    </p:extLst>
+  </p:cSld>
+  <p:clrMapOvr>
+    <a:masterClrMapping/>
+  </p:clrMapOvr>
+  <p:timing>
+    <p:tnLst>
+      <p:par>
+        <p:cTn id="1" dur="indefinite" restart="never" nodeType="tmRoot">
+          <p:childTnLst>
+            <p:seq concurrent="1" nextAc="seek">
+              <p:cTn id="2" dur="indefinite" nodeType="mainSeq">
+                <p:childTnLst>
+                  <p:par>
+                    <p:cTn id="3" fill="hold">
+                      <p:stCondLst>
+                        <p:cond delay="indefinite"/>
+                      </p:stCondLst>
+                      <p:childTnLst>
+                        <p:par>
+                          <p:cTn id="4" fill="hold">
+                            <p:stCondLst>
+                              <p:cond delay="0"/>
+                            </p:stCondLst>
+                            <p:childTnLst>
+                              <p:par>
+                                <p:cTn id="5" presetID="1" presetClass="entr" presetSubtype="0" fill="hold" grpId="0" nodeType="clickEffect">
+                                  <p:stCondLst>
+                                    <p:cond delay="0"/>
+                                  </p:stCondLst>
+                                  <p:childTnLst>
+                                    <p:set>
+                                      <p:cBhvr>
+                                        <p:cTn id="6" dur="1" fill="hold">
+                                          <p:stCondLst>
+                                            <p:cond delay="0"/>
+                                          </p:stCondLst>
+                                        </p:cTn>
+                                        <p:tgtEl>
+                                          <p:spTgt spid="5">
+                                            <p:txEl>
+                                              <p:pRg st="0" end="0"/>
+                                            </p:txEl>
+                                          </p:spTgt>
+                                        </p:tgtEl>
+                                        <p:attrNameLst>
+                                          <p:attrName>style.visibility</p:attrName>
+                                        </p:attrNameLst>
+                                      </p:cBhvr>
+                                      <p:to>
+                                        <p:strVal val="visible"/>
+                                      </p:to>
+                                    </p:set>
+                                  </p:childTnLst>
+                                </p:cTn>
+                              </p:par>
+                              <p:par>
+                                <p:cTn id="7" presetID="1" presetClass="entr" presetSubtype="0" fill="hold" grpId="0" nodeType="withEffect">
+                                  <p:stCondLst>
+                                    <p:cond delay="0"/>
+                                  </p:stCondLst>
+                                  <p:childTnLst>
+                                    <p:set>
+                                      <p:cBhvr>
+                                        <p:cTn id="8" dur="1" fill="hold">
+                                          <p:stCondLst>
+                                            <p:cond delay="0"/>
+                                          </p:stCondLst>
+                                        </p:cTn>
+                                        <p:tgtEl>
+                                          <p:spTgt spid="13"/>
+                                        </p:tgtEl>
+                                        <p:attrNameLst>
+                                          <p:attrName>style.visibility</p:attrName>
+                                        </p:attrNameLst>
+                                      </p:cBhvr>
+                                      <p:to>
+                                        <p:strVal val="visible"/>
+                                      </p:to>
+                                    </p:set>
+                                  </p:childTnLst>
+                                </p:cTn>
+                              </p:par>
+                              <p:par>
+                                <p:cTn id="9" presetID="9" presetClass="emph" presetSubtype="0" grpId="0" nodeType="withEffect">
+                                  <p:stCondLst>
+                                    <p:cond delay="0"/>
+                                  </p:stCondLst>
+                                  <p:childTnLst>
+                                    <p:set>
+                                      <p:cBhvr>
+                                        <p:cTn id="10" dur="indefinite"/>
+                                        <p:tgtEl>
+                                          <p:spTgt spid="3">
+                                            <p:txEl>
+                                              <p:pRg st="0" end="0"/>
+                                            </p:txEl>
+                                          </p:spTgt>
+                                        </p:tgtEl>
+                                        <p:attrNameLst>
+                                          <p:attrName>style.opacity</p:attrName>
+                                        </p:attrNameLst>
+                                      </p:cBhvr>
+                                      <p:to>
+                                        <p:strVal val="0.5"/>
+                                      </p:to>
+                                    </p:set>
+                                    <p:animEffect filter="image" prLst="opacity: 0.5">
+                                      <p:cBhvr rctx="IE">
+                                        <p:cTn id="11" dur="indefinite"/>
+                                        <p:tgtEl>
+                                          <p:spTgt spid="3">
+                                            <p:txEl>
+                                              <p:pRg st="0" end="0"/>
+                                            </p:txEl>
+                                          </p:spTgt>
+                                        </p:tgtEl>
+                                      </p:cBhvr>
+                                    </p:animEffect>
+                                  </p:childTnLst>
+                                </p:cTn>
+                              </p:par>
+                              <p:par>
+                                <p:cTn id="12" presetID="9" presetClass="emph" presetSubtype="0" grpId="0" nodeType="withEffect">
+                                  <p:stCondLst>
+                                    <p:cond delay="0"/>
+                                  </p:stCondLst>
+                                  <p:childTnLst>
+                                    <p:set>
+                                      <p:cBhvr>
+                                        <p:cTn id="13" dur="indefinite"/>
+                                        <p:tgtEl>
+                                          <p:spTgt spid="10"/>
+                                        </p:tgtEl>
+                                        <p:attrNameLst>
+                                          <p:attrName>style.opacity</p:attrName>
+                                        </p:attrNameLst>
+                                      </p:cBhvr>
+                                      <p:to>
+                                        <p:strVal val="0.5"/>
+                                      </p:to>
+                                    </p:set>
+                                    <p:animEffect filter="image" prLst="opacity: 0.5">
+                                      <p:cBhvr rctx="IE">
+                                        <p:cTn id="14" dur="indefinite"/>
+                                        <p:tgtEl>
+                                          <p:spTgt spid="10"/>
+                                        </p:tgtEl>
+                                      </p:cBhvr>
+                                    </p:animEffect>
+                                  </p:childTnLst>
+                                </p:cTn>
+                              </p:par>
+                            </p:childTnLst>
+                          </p:cTn>
+                        </p:par>
+                      </p:childTnLst>
+                    </p:cTn>
+                  </p:par>
+                  <p:par>
+                    <p:cTn id="15" fill="hold">
+                      <p:stCondLst>
+                        <p:cond delay="indefinite"/>
+                      </p:stCondLst>
+                      <p:childTnLst>
+                        <p:par>
+                          <p:cTn id="16" fill="hold">
+                            <p:stCondLst>
+                              <p:cond delay="0"/>
+                            </p:stCondLst>
+                            <p:childTnLst>
+                              <p:par>
+                                <p:cTn id="17" presetID="1" presetClass="entr" presetSubtype="0" fill="hold" grpId="0" nodeType="clickEffect">
+                                  <p:stCondLst>
+                                    <p:cond delay="0"/>
+                                  </p:stCondLst>
+                                  <p:childTnLst>
+                                    <p:set>
+                                      <p:cBhvr>
+                                        <p:cTn id="18" dur="1" fill="hold">
+                                          <p:stCondLst>
+                                            <p:cond delay="0"/>
+                                          </p:stCondLst>
+                                        </p:cTn>
+                                        <p:tgtEl>
+                                          <p:spTgt spid="12">
+                                            <p:txEl>
+                                              <p:pRg st="0" end="0"/>
+                                            </p:txEl>
+                                          </p:spTgt>
+                                        </p:tgtEl>
+                                        <p:attrNameLst>
+                                          <p:attrName>style.visibility</p:attrName>
+                                        </p:attrNameLst>
+                                      </p:cBhvr>
+                                      <p:to>
+                                        <p:strVal val="visible"/>
+                                      </p:to>
+                                    </p:set>
+                                  </p:childTnLst>
+                                </p:cTn>
+                              </p:par>
+                              <p:par>
+                                <p:cTn id="19" presetID="1" presetClass="entr" presetSubtype="0" fill="hold" grpId="0" nodeType="withEffect">
+                                  <p:stCondLst>
+                                    <p:cond delay="0"/>
+                                  </p:stCondLst>
+                                  <p:childTnLst>
+                                    <p:set>
+                                      <p:cBhvr>
+                                        <p:cTn id="20" dur="1" fill="hold">
+                                          <p:stCondLst>
+                                            <p:cond delay="0"/>
+                                          </p:stCondLst>
+                                        </p:cTn>
+                                        <p:tgtEl>
+                                          <p:spTgt spid="14"/>
+                                        </p:tgtEl>
+                                        <p:attrNameLst>
+                                          <p:attrName>style.visibility</p:attrName>
+                                        </p:attrNameLst>
+                                      </p:cBhvr>
+                                      <p:to>
+                                        <p:strVal val="visible"/>
+                                      </p:to>
+                                    </p:set>
+                                  </p:childTnLst>
+                                </p:cTn>
+                              </p:par>
+                            </p:childTnLst>
+                          </p:cTn>
+                        </p:par>
+                      </p:childTnLst>
+                    </p:cTn>
+                  </p:par>
+                </p:childTnLst>
+              </p:cTn>
+              <p:prevCondLst>
+                <p:cond evt="onPrev" delay="0">
+                  <p:tgtEl>
+                    <p:sldTgt/>
+                  </p:tgtEl>
+                </p:cond>
+              </p:prevCondLst>
+              <p:nextCondLst>
+                <p:cond evt="onNext" delay="0">
+                  <p:tgtEl>
+                    <p:sldTgt/>
+                  </p:tgtEl>
+                </p:cond>
+              </p:nextCondLst>
+            </p:seq>
+          </p:childTnLst>
+        </p:cTn>
+      </p:par>
+    </p:tnLst>
+    <p:bldLst>
+      <p:bldP spid="3" grpId="0" build="p">
+        <p:tmplLst>
+          <p:tmpl lvl="1">
+            <p:tnLst>
+              <p:par>
+                <p:cTn presetID="9" presetClass="emph" presetSubtype="0" nodeType="withEffect">
+                  <p:stCondLst>
+                    <p:cond delay="0"/>
+                  </p:stCondLst>
+                  <p:childTnLst>
+                    <p:set>
+                      <p:cBhvr>
+                        <p:cTn dur="indefinite"/>
+                        <p:tgtEl>
+                          <p:spTgt spid="3"/>
+                        </p:tgtEl>
+                        <p:attrNameLst>
+                          <p:attrName>style.opacity</p:attrName>
+                        </p:attrNameLst>
+                      </p:cBhvr>
+                      <p:to>
+                        <p:strVal val="0.5"/>
+                      </p:to>
+                    </p:set>
+                    <p:animEffect filter="image" prLst="opacity: 0.5">
+                      <p:cBhvr rctx="IE">
+                        <p:cTn dur="indefinite"/>
+                        <p:tgtEl>
+                          <p:spTgt spid="3"/>
+                        </p:tgtEl>
+                      </p:cBhvr>
+                    </p:animEffect>
+                  </p:childTnLst>
+                </p:cTn>
+              </p:par>
+            </p:tnLst>
+          </p:tmpl>
+        </p:tmplLst>
+      </p:bldP>
+      <p:bldP spid="5" grpId="0" build="p">
+        <p:tmplLst>
+          <p:tmpl lvl="1">
+            <p:tnLst>
+              <p:par>
+                <p:cTn presetID="1" presetClass="entr" presetSubtype="0" fill="hold" nodeType="clickEffect">
+                  <p:stCondLst>
+                    <p:cond delay="0"/>
+                  </p:stCondLst>
+                  <p:childTnLst>
+                    <p:set>
+                      <p:cBhvr>
+                        <p:cTn dur="1" fill="hold">
+                          <p:stCondLst>
+                            <p:cond delay="0"/>
+                          </p:stCondLst>
+                        </p:cTn>
+                        <p:tgtEl>
+                          <p:spTgt spid="5"/>
+                        </p:tgtEl>
+                        <p:attrNameLst>
+                          <p:attrName>style.visibility</p:attrName>
+                        </p:attrNameLst>
+                      </p:cBhvr>
+                      <p:to>
+                        <p:strVal val="visible"/>
+                      </p:to>
+                    </p:set>
+                  </p:childTnLst>
+                </p:cTn>
+              </p:par>
+            </p:tnLst>
+          </p:tmpl>
+        </p:tmplLst>
+      </p:bldP>
+      <p:bldP spid="10" grpId="0"/>
+      <p:bldP spid="13" grpId="0"/>
+      <p:bldP spid="12" grpId="0" build="p">
+        <p:tmplLst>
+          <p:tmpl lvl="1">
+            <p:tnLst>
+              <p:par>
+                <p:cTn presetID="1" presetClass="entr" presetSubtype="0" fill="hold" nodeType="clickEffect">
+                  <p:stCondLst>
+                    <p:cond delay="0"/>
+                  </p:stCondLst>
+                  <p:childTnLst>
+                    <p:set>
+                      <p:cBhvr>
+                        <p:cTn dur="1" fill="hold">
+                          <p:stCondLst>
+                            <p:cond delay="0"/>
+                          </p:stCondLst>
+                        </p:cTn>
+                        <p:tgtEl>
+                          <p:spTgt spid="12"/>
+                        </p:tgtEl>
+                        <p:attrNameLst>
+                          <p:attrName>style.visibility</p:attrName>
+                        </p:attrNameLst>
+                      </p:cBhvr>
+                      <p:to>
+                        <p:strVal val="visible"/>
+                      </p:to>
+                    </p:set>
+                  </p:childTnLst>
+                </p:cTn>
+              </p:par>
+            </p:tnLst>
+          </p:tmpl>
+        </p:tmplLst>
+      </p:bldP>
+      <p:bldP spid="14" grpId="0"/>
     </p:bldLst>
   </p:timing>
 </p:sldLayout>
@@ -4499,6 +5386,7 @@
     <p:sldLayoutId id="2147483685" r:id="rId13"/>
     <p:sldLayoutId id="2147483686" r:id="rId14"/>
     <p:sldLayoutId id="2147483687" r:id="rId15"/>
+    <p:sldLayoutId id="2147483688" r:id="rId16"/>
   </p:sldLayoutIdLst>
   <p:hf hdr="0" ftr="0" dt="0"/>
   <p:txStyles>

</xml_diff>

<commit_message>
Animated three image slide template
</commit_message>
<xml_diff>
--- a/data/powerpoint/template.pptx
+++ b/data/powerpoint/template.pptx
@@ -579,37 +579,6 @@
           </a:p>
         </p:txBody>
       </p:sp>
-      <p:sp>
-        <p:nvSpPr>
-          <p:cNvPr id="6" name="Slide Number Placeholder 5"/>
-          <p:cNvSpPr>
-            <a:spLocks noGrp="1"/>
-          </p:cNvSpPr>
-          <p:nvPr>
-            <p:ph type="sldNum" sz="quarter" idx="12"/>
-          </p:nvPr>
-        </p:nvSpPr>
-        <p:spPr>
-          <a:xfrm>
-            <a:off x="11446624" y="6467303"/>
-            <a:ext cx="745375" cy="390698"/>
-          </a:xfrm>
-          <a:prstGeom prst="rect">
-            <a:avLst/>
-          </a:prstGeom>
-        </p:spPr>
-        <p:txBody>
-          <a:bodyPr/>
-          <a:lstStyle/>
-          <a:p>
-            <a:fld id="{1F469EBC-A649-4E3E-8046-4745AB923F3E}" type="slidenum">
-              <a:rPr lang="en-GB" smtClean="0"/>
-              <a:t>‹nr.›</a:t>
-            </a:fld>
-            <a:endParaRPr lang="en-GB"/>
-          </a:p>
-        </p:txBody>
-      </p:sp>
     </p:spTree>
     <p:extLst>
       <p:ext uri="{BB962C8B-B14F-4D97-AF65-F5344CB8AC3E}">
@@ -712,37 +681,6 @@
               <a:t>Vijfde niveau</a:t>
             </a:r>
             <a:endParaRPr lang="en-US" dirty="0"/>
-          </a:p>
-        </p:txBody>
-      </p:sp>
-      <p:sp>
-        <p:nvSpPr>
-          <p:cNvPr id="6" name="Slide Number Placeholder 5"/>
-          <p:cNvSpPr>
-            <a:spLocks noGrp="1"/>
-          </p:cNvSpPr>
-          <p:nvPr>
-            <p:ph type="sldNum" sz="quarter" idx="12"/>
-          </p:nvPr>
-        </p:nvSpPr>
-        <p:spPr>
-          <a:xfrm>
-            <a:off x="11446624" y="6467303"/>
-            <a:ext cx="745375" cy="390698"/>
-          </a:xfrm>
-          <a:prstGeom prst="rect">
-            <a:avLst/>
-          </a:prstGeom>
-        </p:spPr>
-        <p:txBody>
-          <a:bodyPr/>
-          <a:lstStyle/>
-          <a:p>
-            <a:fld id="{1F469EBC-A649-4E3E-8046-4745AB923F3E}" type="slidenum">
-              <a:rPr lang="en-GB" smtClean="0"/>
-              <a:t>‹nr.›</a:t>
-            </a:fld>
-            <a:endParaRPr lang="en-GB"/>
           </a:p>
         </p:txBody>
       </p:sp>
@@ -858,37 +796,6 @@
               <a:t>Vijfde niveau</a:t>
             </a:r>
             <a:endParaRPr lang="en-US" dirty="0"/>
-          </a:p>
-        </p:txBody>
-      </p:sp>
-      <p:sp>
-        <p:nvSpPr>
-          <p:cNvPr id="6" name="Slide Number Placeholder 5"/>
-          <p:cNvSpPr>
-            <a:spLocks noGrp="1"/>
-          </p:cNvSpPr>
-          <p:nvPr>
-            <p:ph type="sldNum" sz="quarter" idx="12"/>
-          </p:nvPr>
-        </p:nvSpPr>
-        <p:spPr>
-          <a:xfrm>
-            <a:off x="11446624" y="6467303"/>
-            <a:ext cx="745375" cy="390698"/>
-          </a:xfrm>
-          <a:prstGeom prst="rect">
-            <a:avLst/>
-          </a:prstGeom>
-        </p:spPr>
-        <p:txBody>
-          <a:bodyPr/>
-          <a:lstStyle/>
-          <a:p>
-            <a:fld id="{1F469EBC-A649-4E3E-8046-4745AB923F3E}" type="slidenum">
-              <a:rPr lang="en-GB" smtClean="0"/>
-              <a:t>‹nr.›</a:t>
-            </a:fld>
-            <a:endParaRPr lang="en-GB"/>
           </a:p>
         </p:txBody>
       </p:sp>
@@ -1016,37 +923,6 @@
           </a:p>
         </p:txBody>
       </p:sp>
-      <p:sp>
-        <p:nvSpPr>
-          <p:cNvPr id="5" name="Slide Number Placeholder 4"/>
-          <p:cNvSpPr>
-            <a:spLocks noGrp="1"/>
-          </p:cNvSpPr>
-          <p:nvPr>
-            <p:ph type="sldNum" sz="quarter" idx="12"/>
-          </p:nvPr>
-        </p:nvSpPr>
-        <p:spPr>
-          <a:xfrm>
-            <a:off x="11446624" y="6467303"/>
-            <a:ext cx="745375" cy="390698"/>
-          </a:xfrm>
-          <a:prstGeom prst="rect">
-            <a:avLst/>
-          </a:prstGeom>
-        </p:spPr>
-        <p:txBody>
-          <a:bodyPr/>
-          <a:lstStyle/>
-          <a:p>
-            <a:fld id="{1F469EBC-A649-4E3E-8046-4745AB923F3E}" type="slidenum">
-              <a:rPr lang="en-GB" smtClean="0"/>
-              <a:t>‹nr.›</a:t>
-            </a:fld>
-            <a:endParaRPr lang="en-GB"/>
-          </a:p>
-        </p:txBody>
-      </p:sp>
     </p:spTree>
     <p:extLst>
       <p:ext uri="{BB962C8B-B14F-4D97-AF65-F5344CB8AC3E}">
@@ -1171,37 +1047,6 @@
           </a:p>
         </p:txBody>
       </p:sp>
-      <p:sp>
-        <p:nvSpPr>
-          <p:cNvPr id="6" name="Slide Number Placeholder 5"/>
-          <p:cNvSpPr>
-            <a:spLocks noGrp="1"/>
-          </p:cNvSpPr>
-          <p:nvPr>
-            <p:ph type="sldNum" sz="quarter" idx="12"/>
-          </p:nvPr>
-        </p:nvSpPr>
-        <p:spPr>
-          <a:xfrm>
-            <a:off x="11446624" y="6467303"/>
-            <a:ext cx="745375" cy="390698"/>
-          </a:xfrm>
-          <a:prstGeom prst="rect">
-            <a:avLst/>
-          </a:prstGeom>
-        </p:spPr>
-        <p:txBody>
-          <a:bodyPr/>
-          <a:lstStyle/>
-          <a:p>
-            <a:fld id="{1F469EBC-A649-4E3E-8046-4745AB923F3E}" type="slidenum">
-              <a:rPr lang="en-GB" smtClean="0"/>
-              <a:t>‹nr.›</a:t>
-            </a:fld>
-            <a:endParaRPr lang="en-GB"/>
-          </a:p>
-        </p:txBody>
-      </p:sp>
     </p:spTree>
     <p:extLst>
       <p:ext uri="{BB962C8B-B14F-4D97-AF65-F5344CB8AC3E}">
@@ -1268,37 +1113,6 @@
           </a:p>
         </p:txBody>
       </p:sp>
-      <p:sp>
-        <p:nvSpPr>
-          <p:cNvPr id="6" name="Slide Number Placeholder 5"/>
-          <p:cNvSpPr>
-            <a:spLocks noGrp="1"/>
-          </p:cNvSpPr>
-          <p:nvPr>
-            <p:ph type="sldNum" sz="quarter" idx="12"/>
-          </p:nvPr>
-        </p:nvSpPr>
-        <p:spPr>
-          <a:xfrm>
-            <a:off x="11446624" y="6467303"/>
-            <a:ext cx="745375" cy="390698"/>
-          </a:xfrm>
-          <a:prstGeom prst="rect">
-            <a:avLst/>
-          </a:prstGeom>
-        </p:spPr>
-        <p:txBody>
-          <a:bodyPr/>
-          <a:lstStyle/>
-          <a:p>
-            <a:fld id="{1F469EBC-A649-4E3E-8046-4745AB923F3E}" type="slidenum">
-              <a:rPr lang="en-GB" smtClean="0"/>
-              <a:t>‹nr.›</a:t>
-            </a:fld>
-            <a:endParaRPr lang="en-GB"/>
-          </a:p>
-        </p:txBody>
-      </p:sp>
     </p:spTree>
     <p:extLst>
       <p:ext uri="{BB962C8B-B14F-4D97-AF65-F5344CB8AC3E}">
@@ -1419,37 +1233,6 @@
               <a:rPr lang="nl-NL"/>
               <a:t>Tekststijl van het model bewerken</a:t>
             </a:r>
-          </a:p>
-        </p:txBody>
-      </p:sp>
-      <p:sp>
-        <p:nvSpPr>
-          <p:cNvPr id="9" name="Slide Number Placeholder 8"/>
-          <p:cNvSpPr>
-            <a:spLocks noGrp="1"/>
-          </p:cNvSpPr>
-          <p:nvPr>
-            <p:ph type="sldNum" sz="quarter" idx="12"/>
-          </p:nvPr>
-        </p:nvSpPr>
-        <p:spPr>
-          <a:xfrm>
-            <a:off x="11446624" y="6467303"/>
-            <a:ext cx="745375" cy="390698"/>
-          </a:xfrm>
-          <a:prstGeom prst="rect">
-            <a:avLst/>
-          </a:prstGeom>
-        </p:spPr>
-        <p:txBody>
-          <a:bodyPr/>
-          <a:lstStyle/>
-          <a:p>
-            <a:fld id="{1F469EBC-A649-4E3E-8046-4745AB923F3E}" type="slidenum">
-              <a:rPr lang="en-GB" smtClean="0"/>
-              <a:t>‹nr.›</a:t>
-            </a:fld>
-            <a:endParaRPr lang="en-GB"/>
           </a:p>
         </p:txBody>
       </p:sp>
@@ -2051,37 +1834,6 @@
       </p:sp>
       <p:sp>
         <p:nvSpPr>
-          <p:cNvPr id="9" name="Slide Number Placeholder 8"/>
-          <p:cNvSpPr>
-            <a:spLocks noGrp="1"/>
-          </p:cNvSpPr>
-          <p:nvPr>
-            <p:ph type="sldNum" sz="quarter" idx="12"/>
-          </p:nvPr>
-        </p:nvSpPr>
-        <p:spPr>
-          <a:xfrm>
-            <a:off x="11446624" y="6467303"/>
-            <a:ext cx="745375" cy="390698"/>
-          </a:xfrm>
-          <a:prstGeom prst="rect">
-            <a:avLst/>
-          </a:prstGeom>
-        </p:spPr>
-        <p:txBody>
-          <a:bodyPr/>
-          <a:lstStyle/>
-          <a:p>
-            <a:fld id="{1F469EBC-A649-4E3E-8046-4745AB923F3E}" type="slidenum">
-              <a:rPr lang="en-GB" smtClean="0"/>
-              <a:t>‹nr.›</a:t>
-            </a:fld>
-            <a:endParaRPr lang="en-GB"/>
-          </a:p>
-        </p:txBody>
-      </p:sp>
-      <p:sp>
-        <p:nvSpPr>
           <p:cNvPr id="5" name="Text Placeholder 4"/>
           <p:cNvSpPr>
             <a:spLocks noGrp="1"/>
@@ -2491,11 +2243,7 @@
                                           </p:stCondLst>
                                         </p:cTn>
                                         <p:tgtEl>
-                                          <p:spTgt spid="5">
-                                            <p:txEl>
-                                              <p:pRg st="0" end="0"/>
-                                            </p:txEl>
-                                          </p:spTgt>
+                                          <p:spTgt spid="10"/>
                                         </p:tgtEl>
                                         <p:attrNameLst>
                                           <p:attrName>style.visibility</p:attrName>
@@ -2522,6 +2270,55 @@
                                           </p:stCondLst>
                                         </p:cTn>
                                         <p:tgtEl>
+                                          <p:spTgt spid="3">
+                                            <p:txEl>
+                                              <p:pRg st="0" end="0"/>
+                                            </p:txEl>
+                                          </p:spTgt>
+                                        </p:tgtEl>
+                                        <p:attrNameLst>
+                                          <p:attrName>style.visibility</p:attrName>
+                                        </p:attrNameLst>
+                                      </p:cBhvr>
+                                      <p:to>
+                                        <p:strVal val="visible"/>
+                                      </p:to>
+                                    </p:set>
+                                  </p:childTnLst>
+                                </p:cTn>
+                              </p:par>
+                            </p:childTnLst>
+                          </p:cTn>
+                        </p:par>
+                      </p:childTnLst>
+                    </p:cTn>
+                  </p:par>
+                  <p:par>
+                    <p:cTn id="9" fill="hold">
+                      <p:stCondLst>
+                        <p:cond delay="indefinite"/>
+                      </p:stCondLst>
+                      <p:childTnLst>
+                        <p:par>
+                          <p:cTn id="10" fill="hold">
+                            <p:stCondLst>
+                              <p:cond delay="0"/>
+                            </p:stCondLst>
+                            <p:childTnLst>
+                              <p:par>
+                                <p:cTn id="11" presetID="1" presetClass="entr" presetSubtype="0" fill="hold" grpId="0" nodeType="clickEffect">
+                                  <p:stCondLst>
+                                    <p:cond delay="0"/>
+                                  </p:stCondLst>
+                                  <p:childTnLst>
+                                    <p:set>
+                                      <p:cBhvr>
+                                        <p:cTn id="12" dur="1" fill="hold">
+                                          <p:stCondLst>
+                                            <p:cond delay="0"/>
+                                          </p:stCondLst>
+                                        </p:cTn>
+                                        <p:tgtEl>
                                           <p:spTgt spid="13"/>
                                         </p:tgtEl>
                                         <p:attrNameLst>
@@ -2536,14 +2333,76 @@
                                 </p:cTn>
                               </p:par>
                               <p:par>
-                                <p:cTn id="9" presetID="9" presetClass="emph" presetSubtype="0" grpId="0" nodeType="withEffect">
+                                <p:cTn id="13" presetID="1" presetClass="entr" presetSubtype="0" fill="hold" grpId="0" nodeType="withEffect">
                                   <p:stCondLst>
                                     <p:cond delay="0"/>
                                   </p:stCondLst>
                                   <p:childTnLst>
                                     <p:set>
                                       <p:cBhvr>
-                                        <p:cTn id="10" dur="indefinite"/>
+                                        <p:cTn id="14" dur="1" fill="hold">
+                                          <p:stCondLst>
+                                            <p:cond delay="0"/>
+                                          </p:stCondLst>
+                                        </p:cTn>
+                                        <p:tgtEl>
+                                          <p:spTgt spid="5">
+                                            <p:txEl>
+                                              <p:pRg st="0" end="0"/>
+                                            </p:txEl>
+                                          </p:spTgt>
+                                        </p:tgtEl>
+                                        <p:attrNameLst>
+                                          <p:attrName>style.visibility</p:attrName>
+                                        </p:attrNameLst>
+                                      </p:cBhvr>
+                                      <p:to>
+                                        <p:strVal val="visible"/>
+                                      </p:to>
+                                    </p:set>
+                                  </p:childTnLst>
+                                </p:cTn>
+                              </p:par>
+                              <p:par>
+                                <p:cTn id="15" presetID="9" presetClass="emph" presetSubtype="0" grpId="1" nodeType="withEffect">
+                                  <p:stCondLst>
+                                    <p:cond delay="0"/>
+                                  </p:stCondLst>
+                                  <p:childTnLst>
+                                    <p:set>
+                                      <p:cBhvr>
+                                        <p:cTn id="16" dur="indefinite"/>
+                                        <p:tgtEl>
+                                          <p:spTgt spid="10"/>
+                                        </p:tgtEl>
+                                        <p:attrNameLst>
+                                          <p:attrName>style.opacity</p:attrName>
+                                        </p:attrNameLst>
+                                      </p:cBhvr>
+                                      <p:to>
+                                        <p:strVal val="0.5"/>
+                                      </p:to>
+                                    </p:set>
+                                    <p:animEffect filter="image" prLst="opacity: 0.5">
+                                      <p:cBhvr rctx="IE">
+                                        <p:cTn id="17" dur="indefinite"/>
+                                        <p:tgtEl>
+                                          <p:spTgt spid="10"/>
+                                        </p:tgtEl>
+                                      </p:cBhvr>
+                                    </p:animEffect>
+                                  </p:childTnLst>
+                                </p:cTn>
+                              </p:par>
+                              <p:par>
+                                <p:cTn id="18" presetID="9" presetClass="emph" presetSubtype="0" grpId="1" nodeType="withEffect">
+                                  <p:stCondLst>
+                                    <p:cond delay="0"/>
+                                  </p:stCondLst>
+                                  <p:childTnLst>
+                                    <p:set>
+                                      <p:cBhvr>
+                                        <p:cTn id="19" dur="indefinite"/>
                                         <p:tgtEl>
                                           <p:spTgt spid="3">
                                             <p:txEl>
@@ -2561,44 +2420,13 @@
                                     </p:set>
                                     <p:animEffect filter="image" prLst="opacity: 0.5">
                                       <p:cBhvr rctx="IE">
-                                        <p:cTn id="11" dur="indefinite"/>
+                                        <p:cTn id="20" dur="indefinite"/>
                                         <p:tgtEl>
                                           <p:spTgt spid="3">
                                             <p:txEl>
                                               <p:pRg st="0" end="0"/>
                                             </p:txEl>
                                           </p:spTgt>
-                                        </p:tgtEl>
-                                      </p:cBhvr>
-                                    </p:animEffect>
-                                  </p:childTnLst>
-                                </p:cTn>
-                              </p:par>
-                              <p:par>
-                                <p:cTn id="12" presetID="9" presetClass="emph" presetSubtype="0" grpId="0" nodeType="withEffect">
-                                  <p:stCondLst>
-                                    <p:cond delay="0"/>
-                                  </p:stCondLst>
-                                  <p:childTnLst>
-                                    <p:set>
-                                      <p:cBhvr>
-                                        <p:cTn id="13" dur="indefinite"/>
-                                        <p:tgtEl>
-                                          <p:spTgt spid="10"/>
-                                        </p:tgtEl>
-                                        <p:attrNameLst>
-                                          <p:attrName>style.opacity</p:attrName>
-                                        </p:attrNameLst>
-                                      </p:cBhvr>
-                                      <p:to>
-                                        <p:strVal val="0.5"/>
-                                      </p:to>
-                                    </p:set>
-                                    <p:animEffect filter="image" prLst="opacity: 0.5">
-                                      <p:cBhvr rctx="IE">
-                                        <p:cTn id="14" dur="indefinite"/>
-                                        <p:tgtEl>
-                                          <p:spTgt spid="10"/>
                                         </p:tgtEl>
                                       </p:cBhvr>
                                     </p:animEffect>
@@ -2612,26 +2440,53 @@
                     </p:cTn>
                   </p:par>
                   <p:par>
-                    <p:cTn id="15" fill="hold">
+                    <p:cTn id="21" fill="hold">
                       <p:stCondLst>
                         <p:cond delay="indefinite"/>
                       </p:stCondLst>
                       <p:childTnLst>
                         <p:par>
-                          <p:cTn id="16" fill="hold">
+                          <p:cTn id="22" fill="hold">
                             <p:stCondLst>
                               <p:cond delay="0"/>
                             </p:stCondLst>
                             <p:childTnLst>
                               <p:par>
-                                <p:cTn id="17" presetID="1" presetClass="entr" presetSubtype="0" fill="hold" grpId="0" nodeType="clickEffect">
+                                <p:cTn id="23" presetID="1" presetClass="entr" presetSubtype="0" fill="hold" grpId="0" nodeType="clickEffect">
                                   <p:stCondLst>
                                     <p:cond delay="0"/>
                                   </p:stCondLst>
                                   <p:childTnLst>
                                     <p:set>
                                       <p:cBhvr>
-                                        <p:cTn id="18" dur="1" fill="hold">
+                                        <p:cTn id="24" dur="1" fill="hold">
+                                          <p:stCondLst>
+                                            <p:cond delay="0"/>
+                                          </p:stCondLst>
+                                        </p:cTn>
+                                        <p:tgtEl>
+                                          <p:spTgt spid="14"/>
+                                        </p:tgtEl>
+                                        <p:attrNameLst>
+                                          <p:attrName>style.visibility</p:attrName>
+                                        </p:attrNameLst>
+                                      </p:cBhvr>
+                                      <p:to>
+                                        <p:strVal val="visible"/>
+                                      </p:to>
+                                    </p:set>
+                                  </p:childTnLst>
+                                </p:cTn>
+                              </p:par>
+                              <p:par>
+                                <p:cTn id="25" presetID="1" presetClass="entr" presetSubtype="0" fill="hold" grpId="0" nodeType="withEffect">
+                                  <p:stCondLst>
+                                    <p:cond delay="0"/>
+                                  </p:stCondLst>
+                                  <p:childTnLst>
+                                    <p:set>
+                                      <p:cBhvr>
+                                        <p:cTn id="26" dur="1" fill="hold">
                                           <p:stCondLst>
                                             <p:cond delay="0"/>
                                           </p:stCondLst>
@@ -2654,30 +2509,91 @@
                                   </p:childTnLst>
                                 </p:cTn>
                               </p:par>
+                            </p:childTnLst>
+                          </p:cTn>
+                        </p:par>
+                        <p:par>
+                          <p:cTn id="27" fill="hold">
+                            <p:stCondLst>
+                              <p:cond delay="0"/>
+                            </p:stCondLst>
+                            <p:childTnLst>
                               <p:par>
-                                <p:cTn id="19" presetID="1" presetClass="entr" presetSubtype="0" fill="hold" grpId="0" nodeType="withEffect">
+                                <p:cTn id="28" presetID="9" presetClass="emph" presetSubtype="0" grpId="1" nodeType="afterEffect">
                                   <p:stCondLst>
                                     <p:cond delay="0"/>
                                   </p:stCondLst>
                                   <p:childTnLst>
                                     <p:set>
                                       <p:cBhvr>
-                                        <p:cTn id="20" dur="1" fill="hold">
-                                          <p:stCondLst>
-                                            <p:cond delay="0"/>
-                                          </p:stCondLst>
-                                        </p:cTn>
+                                        <p:cTn id="29" dur="indefinite"/>
                                         <p:tgtEl>
-                                          <p:spTgt spid="14"/>
+                                          <p:spTgt spid="13"/>
                                         </p:tgtEl>
                                         <p:attrNameLst>
-                                          <p:attrName>style.visibility</p:attrName>
+                                          <p:attrName>style.opacity</p:attrName>
                                         </p:attrNameLst>
                                       </p:cBhvr>
                                       <p:to>
-                                        <p:strVal val="visible"/>
+                                        <p:strVal val="0.5"/>
                                       </p:to>
                                     </p:set>
+                                    <p:animEffect filter="image" prLst="opacity: 0.5">
+                                      <p:cBhvr rctx="IE">
+                                        <p:cTn id="30" dur="indefinite"/>
+                                        <p:tgtEl>
+                                          <p:spTgt spid="13"/>
+                                        </p:tgtEl>
+                                      </p:cBhvr>
+                                    </p:animEffect>
+                                  </p:childTnLst>
+                                </p:cTn>
+                              </p:par>
+                            </p:childTnLst>
+                          </p:cTn>
+                        </p:par>
+                        <p:par>
+                          <p:cTn id="31" fill="hold">
+                            <p:stCondLst>
+                              <p:cond delay="0"/>
+                            </p:stCondLst>
+                            <p:childTnLst>
+                              <p:par>
+                                <p:cTn id="32" presetID="9" presetClass="emph" presetSubtype="0" grpId="1" nodeType="afterEffect">
+                                  <p:stCondLst>
+                                    <p:cond delay="0"/>
+                                  </p:stCondLst>
+                                  <p:childTnLst>
+                                    <p:set>
+                                      <p:cBhvr>
+                                        <p:cTn id="33" dur="indefinite"/>
+                                        <p:tgtEl>
+                                          <p:spTgt spid="5">
+                                            <p:txEl>
+                                              <p:pRg st="0" end="0"/>
+                                            </p:txEl>
+                                          </p:spTgt>
+                                        </p:tgtEl>
+                                        <p:attrNameLst>
+                                          <p:attrName>style.opacity</p:attrName>
+                                        </p:attrNameLst>
+                                      </p:cBhvr>
+                                      <p:to>
+                                        <p:strVal val="0.5"/>
+                                      </p:to>
+                                    </p:set>
+                                    <p:animEffect filter="image" prLst="opacity: 0.5">
+                                      <p:cBhvr rctx="IE">
+                                        <p:cTn id="34" dur="indefinite"/>
+                                        <p:tgtEl>
+                                          <p:spTgt spid="5">
+                                            <p:txEl>
+                                              <p:pRg st="0" end="0"/>
+                                            </p:txEl>
+                                          </p:spTgt>
+                                        </p:tgtEl>
+                                      </p:cBhvr>
+                                    </p:animEffect>
                                   </p:childTnLst>
                                 </p:cTn>
                               </p:par>
@@ -2710,6 +2626,41 @@
     </p:tnLst>
     <p:bldLst>
       <p:bldP spid="3" grpId="0" build="p">
+        <p:tmplLst>
+          <p:tmpl lvl="1">
+            <p:tnLst>
+              <p:par>
+                <p:cTn presetID="1" presetClass="entr" presetSubtype="0" fill="hold" nodeType="withEffect">
+                  <p:stCondLst>
+                    <p:cond delay="0"/>
+                  </p:stCondLst>
+                  <p:childTnLst>
+                    <p:set>
+                      <p:cBhvr>
+                        <p:cTn dur="1" fill="hold">
+                          <p:stCondLst>
+                            <p:cond delay="0"/>
+                          </p:stCondLst>
+                        </p:cTn>
+                        <p:tgtEl>
+                          <p:spTgt spid="3"/>
+                        </p:tgtEl>
+                        <p:attrNameLst>
+                          <p:attrName>style.visibility</p:attrName>
+                        </p:attrNameLst>
+                      </p:cBhvr>
+                      <p:to>
+                        <p:strVal val="visible"/>
+                      </p:to>
+                    </p:set>
+                  </p:childTnLst>
+                </p:cTn>
+              </p:par>
+            </p:tnLst>
+          </p:tmpl>
+        </p:tmplLst>
+      </p:bldP>
+      <p:bldP spid="3" grpId="1" build="p">
         <p:tmplLst>
           <p:tmpl lvl="1">
             <p:tnLst>
@@ -2753,7 +2704,7 @@
           <p:tmpl lvl="1">
             <p:tnLst>
               <p:par>
-                <p:cTn presetID="1" presetClass="entr" presetSubtype="0" fill="hold" nodeType="clickEffect">
+                <p:cTn presetID="1" presetClass="entr" presetSubtype="0" fill="hold" nodeType="withEffect">
                   <p:stCondLst>
                     <p:cond delay="0"/>
                   </p:stCondLst>
@@ -2783,14 +2734,55 @@
           </p:tmpl>
         </p:tmplLst>
       </p:bldP>
+      <p:bldP spid="5" grpId="1" build="p">
+        <p:tmplLst>
+          <p:tmpl lvl="1">
+            <p:tnLst>
+              <p:par>
+                <p:cTn presetID="9" presetClass="emph" presetSubtype="0" nodeType="afterEffect">
+                  <p:stCondLst>
+                    <p:cond delay="0"/>
+                  </p:stCondLst>
+                  <p:childTnLst>
+                    <p:set>
+                      <p:cBhvr>
+                        <p:cTn dur="indefinite"/>
+                        <p:tgtEl>
+                          <p:spTgt spid="5"/>
+                        </p:tgtEl>
+                        <p:attrNameLst>
+                          <p:attrName>style.opacity</p:attrName>
+                        </p:attrNameLst>
+                      </p:cBhvr>
+                      <p:to>
+                        <p:strVal val="0.5"/>
+                      </p:to>
+                    </p:set>
+                    <p:animEffect filter="image" prLst="opacity: 0.5">
+                      <p:cBhvr rctx="IE">
+                        <p:cTn dur="indefinite"/>
+                        <p:tgtEl>
+                          <p:spTgt spid="5"/>
+                        </p:tgtEl>
+                      </p:cBhvr>
+                    </p:animEffect>
+                  </p:childTnLst>
+                </p:cTn>
+              </p:par>
+            </p:tnLst>
+          </p:tmpl>
+        </p:tmplLst>
+      </p:bldP>
       <p:bldP spid="10" grpId="0"/>
+      <p:bldP spid="10" grpId="1"/>
       <p:bldP spid="13" grpId="0"/>
+      <p:bldP spid="13" grpId="1"/>
       <p:bldP spid="12" grpId="0" build="p">
         <p:tmplLst>
           <p:tmpl lvl="1">
             <p:tnLst>
               <p:par>
-                <p:cTn presetID="1" presetClass="entr" presetSubtype="0" fill="hold" nodeType="clickEffect">
+                <p:cTn presetID="1" presetClass="entr" presetSubtype="0" fill="hold" nodeType="withEffect">
                   <p:stCondLst>
                     <p:cond delay="0"/>
                   </p:stCondLst>
@@ -2918,37 +2910,6 @@
           </a:p>
         </p:txBody>
       </p:sp>
-      <p:sp>
-        <p:nvSpPr>
-          <p:cNvPr id="6" name="Slide Number Placeholder 5"/>
-          <p:cNvSpPr>
-            <a:spLocks noGrp="1"/>
-          </p:cNvSpPr>
-          <p:nvPr>
-            <p:ph type="sldNum" sz="quarter" idx="12"/>
-          </p:nvPr>
-        </p:nvSpPr>
-        <p:spPr>
-          <a:xfrm>
-            <a:off x="11446624" y="6467303"/>
-            <a:ext cx="745375" cy="390698"/>
-          </a:xfrm>
-          <a:prstGeom prst="rect">
-            <a:avLst/>
-          </a:prstGeom>
-        </p:spPr>
-        <p:txBody>
-          <a:bodyPr/>
-          <a:lstStyle/>
-          <a:p>
-            <a:fld id="{1F469EBC-A649-4E3E-8046-4745AB923F3E}" type="slidenum">
-              <a:rPr lang="en-GB" smtClean="0"/>
-              <a:t>‹nr.›</a:t>
-            </a:fld>
-            <a:endParaRPr lang="en-GB"/>
-          </a:p>
-        </p:txBody>
-      </p:sp>
     </p:spTree>
     <p:extLst>
       <p:ext uri="{BB962C8B-B14F-4D97-AF65-F5344CB8AC3E}">
@@ -3130,37 +3091,6 @@
           </a:p>
         </p:txBody>
       </p:sp>
-      <p:sp>
-        <p:nvSpPr>
-          <p:cNvPr id="6" name="Slide Number Placeholder 5"/>
-          <p:cNvSpPr>
-            <a:spLocks noGrp="1"/>
-          </p:cNvSpPr>
-          <p:nvPr>
-            <p:ph type="sldNum" sz="quarter" idx="12"/>
-          </p:nvPr>
-        </p:nvSpPr>
-        <p:spPr>
-          <a:xfrm>
-            <a:off x="11446624" y="6467303"/>
-            <a:ext cx="745375" cy="390698"/>
-          </a:xfrm>
-          <a:prstGeom prst="rect">
-            <a:avLst/>
-          </a:prstGeom>
-        </p:spPr>
-        <p:txBody>
-          <a:bodyPr/>
-          <a:lstStyle/>
-          <a:p>
-            <a:fld id="{1F469EBC-A649-4E3E-8046-4745AB923F3E}" type="slidenum">
-              <a:rPr lang="en-GB" smtClean="0"/>
-              <a:t>‹nr.›</a:t>
-            </a:fld>
-            <a:endParaRPr lang="en-GB"/>
-          </a:p>
-        </p:txBody>
-      </p:sp>
     </p:spTree>
     <p:extLst>
       <p:ext uri="{BB962C8B-B14F-4D97-AF65-F5344CB8AC3E}">
@@ -3325,37 +3255,6 @@
               <a:t>Vijfde niveau</a:t>
             </a:r>
             <a:endParaRPr lang="en-US" dirty="0"/>
-          </a:p>
-        </p:txBody>
-      </p:sp>
-      <p:sp>
-        <p:nvSpPr>
-          <p:cNvPr id="7" name="Slide Number Placeholder 6"/>
-          <p:cNvSpPr>
-            <a:spLocks noGrp="1"/>
-          </p:cNvSpPr>
-          <p:nvPr>
-            <p:ph type="sldNum" sz="quarter" idx="12"/>
-          </p:nvPr>
-        </p:nvSpPr>
-        <p:spPr>
-          <a:xfrm>
-            <a:off x="11446624" y="6467303"/>
-            <a:ext cx="745375" cy="390698"/>
-          </a:xfrm>
-          <a:prstGeom prst="rect">
-            <a:avLst/>
-          </a:prstGeom>
-        </p:spPr>
-        <p:txBody>
-          <a:bodyPr/>
-          <a:lstStyle/>
-          <a:p>
-            <a:fld id="{1F469EBC-A649-4E3E-8046-4745AB923F3E}" type="slidenum">
-              <a:rPr lang="en-GB" smtClean="0"/>
-              <a:t>‹nr.›</a:t>
-            </a:fld>
-            <a:endParaRPr lang="en-GB"/>
           </a:p>
         </p:txBody>
       </p:sp>
@@ -3658,37 +3557,6 @@
               <a:t>Vijfde niveau</a:t>
             </a:r>
             <a:endParaRPr lang="en-US" dirty="0"/>
-          </a:p>
-        </p:txBody>
-      </p:sp>
-      <p:sp>
-        <p:nvSpPr>
-          <p:cNvPr id="9" name="Slide Number Placeholder 8"/>
-          <p:cNvSpPr>
-            <a:spLocks noGrp="1"/>
-          </p:cNvSpPr>
-          <p:nvPr>
-            <p:ph type="sldNum" sz="quarter" idx="12"/>
-          </p:nvPr>
-        </p:nvSpPr>
-        <p:spPr>
-          <a:xfrm>
-            <a:off x="11446624" y="6467303"/>
-            <a:ext cx="745375" cy="390698"/>
-          </a:xfrm>
-          <a:prstGeom prst="rect">
-            <a:avLst/>
-          </a:prstGeom>
-        </p:spPr>
-        <p:txBody>
-          <a:bodyPr/>
-          <a:lstStyle/>
-          <a:p>
-            <a:fld id="{1F469EBC-A649-4E3E-8046-4745AB923F3E}" type="slidenum">
-              <a:rPr lang="en-GB" smtClean="0"/>
-              <a:t>‹nr.›</a:t>
-            </a:fld>
-            <a:endParaRPr lang="en-GB"/>
           </a:p>
         </p:txBody>
       </p:sp>
@@ -4627,37 +4495,6 @@
           </a:p>
         </p:txBody>
       </p:sp>
-      <p:sp>
-        <p:nvSpPr>
-          <p:cNvPr id="5" name="Slide Number Placeholder 4"/>
-          <p:cNvSpPr>
-            <a:spLocks noGrp="1"/>
-          </p:cNvSpPr>
-          <p:nvPr>
-            <p:ph type="sldNum" sz="quarter" idx="12"/>
-          </p:nvPr>
-        </p:nvSpPr>
-        <p:spPr>
-          <a:xfrm>
-            <a:off x="11446624" y="6467303"/>
-            <a:ext cx="745375" cy="390698"/>
-          </a:xfrm>
-          <a:prstGeom prst="rect">
-            <a:avLst/>
-          </a:prstGeom>
-        </p:spPr>
-        <p:txBody>
-          <a:bodyPr/>
-          <a:lstStyle/>
-          <a:p>
-            <a:fld id="{1F469EBC-A649-4E3E-8046-4745AB923F3E}" type="slidenum">
-              <a:rPr lang="en-GB" smtClean="0"/>
-              <a:t>‹nr.›</a:t>
-            </a:fld>
-            <a:endParaRPr lang="en-GB"/>
-          </a:p>
-        </p:txBody>
-      </p:sp>
     </p:spTree>
     <p:extLst>
       <p:ext uri="{BB962C8B-B14F-4D97-AF65-F5344CB8AC3E}">
@@ -4688,37 +4525,6 @@
           <a:chExt cx="0" cy="0"/>
         </a:xfrm>
       </p:grpSpPr>
-      <p:sp>
-        <p:nvSpPr>
-          <p:cNvPr id="4" name="Slide Number Placeholder 3"/>
-          <p:cNvSpPr>
-            <a:spLocks noGrp="1"/>
-          </p:cNvSpPr>
-          <p:nvPr>
-            <p:ph type="sldNum" sz="quarter" idx="12"/>
-          </p:nvPr>
-        </p:nvSpPr>
-        <p:spPr>
-          <a:xfrm>
-            <a:off x="11446624" y="6467303"/>
-            <a:ext cx="745375" cy="390698"/>
-          </a:xfrm>
-          <a:prstGeom prst="rect">
-            <a:avLst/>
-          </a:prstGeom>
-        </p:spPr>
-        <p:txBody>
-          <a:bodyPr/>
-          <a:lstStyle/>
-          <a:p>
-            <a:fld id="{1F469EBC-A649-4E3E-8046-4745AB923F3E}" type="slidenum">
-              <a:rPr lang="en-GB" smtClean="0"/>
-              <a:t>‹nr.›</a:t>
-            </a:fld>
-            <a:endParaRPr lang="en-GB"/>
-          </a:p>
-        </p:txBody>
-      </p:sp>
     </p:spTree>
     <p:extLst>
       <p:ext uri="{BB962C8B-B14F-4D97-AF65-F5344CB8AC3E}">
@@ -4928,37 +4734,6 @@
               <a:rPr lang="nl-NL"/>
               <a:t>Tekststijl van het model bewerken</a:t>
             </a:r>
-          </a:p>
-        </p:txBody>
-      </p:sp>
-      <p:sp>
-        <p:nvSpPr>
-          <p:cNvPr id="7" name="Slide Number Placeholder 6"/>
-          <p:cNvSpPr>
-            <a:spLocks noGrp="1"/>
-          </p:cNvSpPr>
-          <p:nvPr>
-            <p:ph type="sldNum" sz="quarter" idx="12"/>
-          </p:nvPr>
-        </p:nvSpPr>
-        <p:spPr>
-          <a:xfrm>
-            <a:off x="11446624" y="6467303"/>
-            <a:ext cx="745375" cy="390698"/>
-          </a:xfrm>
-          <a:prstGeom prst="rect">
-            <a:avLst/>
-          </a:prstGeom>
-        </p:spPr>
-        <p:txBody>
-          <a:bodyPr/>
-          <a:lstStyle/>
-          <a:p>
-            <a:fld id="{1F469EBC-A649-4E3E-8046-4745AB923F3E}" type="slidenum">
-              <a:rPr lang="en-GB" smtClean="0"/>
-              <a:t>‹nr.›</a:t>
-            </a:fld>
-            <a:endParaRPr lang="en-GB"/>
           </a:p>
         </p:txBody>
       </p:sp>

</xml_diff>

<commit_message>
Updated powerpoint template to have the subtitle be grey and italic
</commit_message>
<xml_diff>
--- a/data/powerpoint/template.pptx
+++ b/data/powerpoint/template.pptx
@@ -535,7 +535,13 @@
           <a:lstStyle>
             <a:lvl1pPr marL="0" indent="0" algn="ctr">
               <a:buNone/>
-              <a:defRPr sz="2400"/>
+              <a:defRPr sz="2400" i="1">
+                <a:solidFill>
+                  <a:schemeClr val="tx1">
+                    <a:lumMod val="75000"/>
+                  </a:schemeClr>
+                </a:solidFill>
+              </a:defRPr>
             </a:lvl1pPr>
             <a:lvl2pPr marL="457200" indent="0" algn="ctr">
               <a:buNone/>

</xml_diff>

<commit_message>
Made the template powerpoint have its title a bit lower to support longer titles
</commit_message>
<xml_diff>
--- a/data/powerpoint/template.pptx
+++ b/data/powerpoint/template.pptx
@@ -197,7 +197,7 @@
           <a:p>
             <a:fld id="{FEE386D4-E0F5-48ED-B382-C5D6AB88A5B0}" type="datetimeFigureOut">
               <a:rPr lang="en-GB" smtClean="0"/>
-              <a:t>14/08/2018</a:t>
+              <a:t>16/08/2018</a:t>
             </a:fld>
             <a:endParaRPr lang="en-GB"/>
           </a:p>
@@ -495,7 +495,7 @@
         <p:spPr>
           <a:xfrm>
             <a:off x="1524000" y="1122363"/>
-            <a:ext cx="9144000" cy="2387600"/>
+            <a:ext cx="9144000" cy="2626678"/>
           </a:xfrm>
         </p:spPr>
         <p:txBody>
@@ -526,8 +526,8 @@
         </p:nvSpPr>
         <p:spPr>
           <a:xfrm>
-            <a:off x="1524000" y="3602038"/>
-            <a:ext cx="9144000" cy="1655762"/>
+            <a:off x="1524000" y="3848794"/>
+            <a:ext cx="9144000" cy="1409006"/>
           </a:xfrm>
         </p:spPr>
         <p:txBody>
@@ -578,7 +578,7 @@
           </a:lstStyle>
           <a:p>
             <a:r>
-              <a:rPr lang="nl-NL"/>
+              <a:rPr lang="nl-NL" dirty="0"/>
               <a:t>Klikken om de ondertitelstijl van het model te bewerken</a:t>
             </a:r>
             <a:endParaRPr lang="en-US" dirty="0"/>

</xml_diff>

<commit_message>
Added backgrounds to large quote slides
</commit_message>
<xml_diff>
--- a/data/powerpoint/template.pptx
+++ b/data/powerpoint/template.pptx
@@ -197,7 +197,7 @@
           <a:p>
             <a:fld id="{FEE386D4-E0F5-48ED-B382-C5D6AB88A5B0}" type="datetimeFigureOut">
               <a:rPr lang="en-GB" smtClean="0"/>
-              <a:t>16/08/2018</a:t>
+              <a:t>20/08/2018</a:t>
             </a:fld>
             <a:endParaRPr lang="en-GB"/>
           </a:p>
@@ -1083,6 +1083,73 @@
           <a:chExt cx="0" cy="0"/>
         </a:xfrm>
       </p:grpSpPr>
+      <p:sp>
+        <p:nvSpPr>
+          <p:cNvPr id="4" name="Picture Placeholder 2">
+            <a:extLst>
+              <a:ext uri="{FF2B5EF4-FFF2-40B4-BE49-F238E27FC236}">
+                <a16:creationId xmlns:a16="http://schemas.microsoft.com/office/drawing/2014/main" id="{8E6FF89B-1B2B-4A0B-8918-72D2A6956F30}"/>
+              </a:ext>
+            </a:extLst>
+          </p:cNvPr>
+          <p:cNvSpPr>
+            <a:spLocks noGrp="1" noChangeAspect="1"/>
+          </p:cNvSpPr>
+          <p:nvPr>
+            <p:ph type="pic" idx="10"/>
+          </p:nvPr>
+        </p:nvSpPr>
+        <p:spPr>
+          <a:xfrm>
+            <a:off x="0" y="0"/>
+            <a:ext cx="12192000" cy="6858000"/>
+          </a:xfrm>
+        </p:spPr>
+        <p:txBody>
+          <a:bodyPr anchor="t"/>
+          <a:lstStyle>
+            <a:lvl1pPr marL="0" indent="0">
+              <a:buNone/>
+              <a:defRPr sz="3200"/>
+            </a:lvl1pPr>
+            <a:lvl2pPr marL="457200" indent="0">
+              <a:buNone/>
+              <a:defRPr sz="2800"/>
+            </a:lvl2pPr>
+            <a:lvl3pPr marL="914400" indent="0">
+              <a:buNone/>
+              <a:defRPr sz="2400"/>
+            </a:lvl3pPr>
+            <a:lvl4pPr marL="1371600" indent="0">
+              <a:buNone/>
+              <a:defRPr sz="2000"/>
+            </a:lvl4pPr>
+            <a:lvl5pPr marL="1828800" indent="0">
+              <a:buNone/>
+              <a:defRPr sz="2000"/>
+            </a:lvl5pPr>
+            <a:lvl6pPr marL="2286000" indent="0">
+              <a:buNone/>
+              <a:defRPr sz="2000"/>
+            </a:lvl6pPr>
+            <a:lvl7pPr marL="2743200" indent="0">
+              <a:buNone/>
+              <a:defRPr sz="2000"/>
+            </a:lvl7pPr>
+            <a:lvl8pPr marL="3200400" indent="0">
+              <a:buNone/>
+              <a:defRPr sz="2000"/>
+            </a:lvl8pPr>
+            <a:lvl9pPr marL="3657600" indent="0">
+              <a:buNone/>
+              <a:defRPr sz="2000"/>
+            </a:lvl9pPr>
+          </a:lstStyle>
+          <a:p>
+            <a:endParaRPr lang="nl-NL" dirty="0"/>
+          </a:p>
+        </p:txBody>
+      </p:sp>
       <p:sp>
         <p:nvSpPr>
           <p:cNvPr id="3" name="Content Placeholder 2"/>

</xml_diff>

<commit_message>
Added optional titles to large quote slides
</commit_message>
<xml_diff>
--- a/data/powerpoint/template.pptx
+++ b/data/powerpoint/template.pptx
@@ -1152,6 +1152,60 @@
       </p:sp>
       <p:sp>
         <p:nvSpPr>
+          <p:cNvPr id="2" name="Rechthoek 1">
+            <a:extLst>
+              <a:ext uri="{FF2B5EF4-FFF2-40B4-BE49-F238E27FC236}">
+                <a16:creationId xmlns:a16="http://schemas.microsoft.com/office/drawing/2014/main" id="{D8213A21-CA1B-4907-B5CA-D2DBF1B165A2}"/>
+              </a:ext>
+            </a:extLst>
+          </p:cNvPr>
+          <p:cNvSpPr/>
+          <p:nvPr userDrawn="1"/>
+        </p:nvSpPr>
+        <p:spPr>
+          <a:xfrm>
+            <a:off x="0" y="0"/>
+            <a:ext cx="12192000" cy="6858000"/>
+          </a:xfrm>
+          <a:prstGeom prst="rect">
+            <a:avLst/>
+          </a:prstGeom>
+          <a:solidFill>
+            <a:srgbClr val="000000">
+              <a:alpha val="65098"/>
+            </a:srgbClr>
+          </a:solidFill>
+          <a:ln>
+            <a:noFill/>
+          </a:ln>
+        </p:spPr>
+        <p:style>
+          <a:lnRef idx="2">
+            <a:schemeClr val="dk1">
+              <a:shade val="50000"/>
+            </a:schemeClr>
+          </a:lnRef>
+          <a:fillRef idx="1">
+            <a:schemeClr val="dk1"/>
+          </a:fillRef>
+          <a:effectRef idx="0">
+            <a:schemeClr val="dk1"/>
+          </a:effectRef>
+          <a:fontRef idx="minor">
+            <a:schemeClr val="lt1"/>
+          </a:fontRef>
+        </p:style>
+        <p:txBody>
+          <a:bodyPr rtlCol="0" anchor="ctr"/>
+          <a:lstStyle/>
+          <a:p>
+            <a:pPr algn="ctr"/>
+            <a:endParaRPr lang="en-GB"/>
+          </a:p>
+        </p:txBody>
+      </p:sp>
+      <p:sp>
+        <p:nvSpPr>
           <p:cNvPr id="3" name="Content Placeholder 2"/>
           <p:cNvSpPr>
             <a:spLocks noGrp="1"/>
@@ -1181,6 +1235,40 @@
             <a:r>
               <a:rPr lang="nl-NL" dirty="0"/>
               <a:t>TEKSTSTIJL VAN HET MODEL BEWERKEN</a:t>
+            </a:r>
+            <a:endParaRPr lang="en-US" dirty="0"/>
+          </a:p>
+        </p:txBody>
+      </p:sp>
+      <p:sp>
+        <p:nvSpPr>
+          <p:cNvPr id="5" name="Title 1">
+            <a:extLst>
+              <a:ext uri="{FF2B5EF4-FFF2-40B4-BE49-F238E27FC236}">
+                <a16:creationId xmlns:a16="http://schemas.microsoft.com/office/drawing/2014/main" id="{077CBF8F-F9E1-42AD-ADBA-858C26DC7EB1}"/>
+              </a:ext>
+            </a:extLst>
+          </p:cNvPr>
+          <p:cNvSpPr>
+            <a:spLocks noGrp="1"/>
+          </p:cNvSpPr>
+          <p:nvPr>
+            <p:ph type="title"/>
+          </p:nvPr>
+        </p:nvSpPr>
+        <p:spPr>
+          <a:xfrm>
+            <a:off x="838200" y="365126"/>
+            <a:ext cx="10515600" cy="773863"/>
+          </a:xfrm>
+        </p:spPr>
+        <p:txBody>
+          <a:bodyPr/>
+          <a:lstStyle/>
+          <a:p>
+            <a:r>
+              <a:rPr lang="nl-NL"/>
+              <a:t>Klik om stijl te bewerken</a:t>
             </a:r>
             <a:endParaRPr lang="en-US" dirty="0"/>
           </a:p>

</xml_diff>

<commit_message>
Added fake transparency on big quote slides
</commit_message>
<xml_diff>
--- a/data/powerpoint/template.pptx
+++ b/data/powerpoint/template.pptx
@@ -1152,55 +1152,68 @@
       </p:sp>
       <p:sp>
         <p:nvSpPr>
-          <p:cNvPr id="2" name="Rechthoek 1">
+          <p:cNvPr id="11" name="Picture Placeholder 2">
             <a:extLst>
               <a:ext uri="{FF2B5EF4-FFF2-40B4-BE49-F238E27FC236}">
-                <a16:creationId xmlns:a16="http://schemas.microsoft.com/office/drawing/2014/main" id="{D8213A21-CA1B-4907-B5CA-D2DBF1B165A2}"/>
+                <a16:creationId xmlns:a16="http://schemas.microsoft.com/office/drawing/2014/main" id="{80D58F11-272C-43CF-8B25-2C75EA1BA293}"/>
               </a:ext>
             </a:extLst>
           </p:cNvPr>
-          <p:cNvSpPr/>
-          <p:nvPr userDrawn="1"/>
+          <p:cNvSpPr>
+            <a:spLocks noGrp="1" noChangeAspect="1"/>
+          </p:cNvSpPr>
+          <p:nvPr>
+            <p:ph type="pic" idx="11"/>
+          </p:nvPr>
         </p:nvSpPr>
         <p:spPr>
           <a:xfrm>
             <a:off x="0" y="0"/>
             <a:ext cx="12192000" cy="6858000"/>
           </a:xfrm>
-          <a:prstGeom prst="rect">
-            <a:avLst/>
-          </a:prstGeom>
-          <a:solidFill>
-            <a:srgbClr val="000000">
-              <a:alpha val="65098"/>
-            </a:srgbClr>
-          </a:solidFill>
-          <a:ln>
-            <a:noFill/>
-          </a:ln>
         </p:spPr>
-        <p:style>
-          <a:lnRef idx="2">
-            <a:schemeClr val="dk1">
-              <a:shade val="50000"/>
-            </a:schemeClr>
-          </a:lnRef>
-          <a:fillRef idx="1">
-            <a:schemeClr val="dk1"/>
-          </a:fillRef>
-          <a:effectRef idx="0">
-            <a:schemeClr val="dk1"/>
-          </a:effectRef>
-          <a:fontRef idx="minor">
-            <a:schemeClr val="lt1"/>
-          </a:fontRef>
-        </p:style>
         <p:txBody>
-          <a:bodyPr rtlCol="0" anchor="ctr"/>
-          <a:lstStyle/>
-          <a:p>
-            <a:pPr algn="ctr"/>
-            <a:endParaRPr lang="en-GB"/>
+          <a:bodyPr anchor="t"/>
+          <a:lstStyle>
+            <a:lvl1pPr marL="0" indent="0">
+              <a:buNone/>
+              <a:defRPr sz="3200"/>
+            </a:lvl1pPr>
+            <a:lvl2pPr marL="457200" indent="0">
+              <a:buNone/>
+              <a:defRPr sz="2800"/>
+            </a:lvl2pPr>
+            <a:lvl3pPr marL="914400" indent="0">
+              <a:buNone/>
+              <a:defRPr sz="2400"/>
+            </a:lvl3pPr>
+            <a:lvl4pPr marL="1371600" indent="0">
+              <a:buNone/>
+              <a:defRPr sz="2000"/>
+            </a:lvl4pPr>
+            <a:lvl5pPr marL="1828800" indent="0">
+              <a:buNone/>
+              <a:defRPr sz="2000"/>
+            </a:lvl5pPr>
+            <a:lvl6pPr marL="2286000" indent="0">
+              <a:buNone/>
+              <a:defRPr sz="2000"/>
+            </a:lvl6pPr>
+            <a:lvl7pPr marL="2743200" indent="0">
+              <a:buNone/>
+              <a:defRPr sz="2000"/>
+            </a:lvl7pPr>
+            <a:lvl8pPr marL="3200400" indent="0">
+              <a:buNone/>
+              <a:defRPr sz="2000"/>
+            </a:lvl8pPr>
+            <a:lvl9pPr marL="3657600" indent="0">
+              <a:buNone/>
+              <a:defRPr sz="2000"/>
+            </a:lvl9pPr>
+          </a:lstStyle>
+          <a:p>
+            <a:endParaRPr lang="nl-NL" dirty="0"/>
           </a:p>
         </p:txBody>
       </p:sp>

</xml_diff>

<commit_message>
Added chart slide generation
</commit_message>
<xml_diff>
--- a/data/powerpoint/template.pptx
+++ b/data/powerpoint/template.pptx
@@ -2989,6 +2989,89 @@
       <p:bldP spid="14" grpId="0"/>
     </p:bldLst>
   </p:timing>
+</p:sldLayout>
+</file>
+
+<file path=ppt/slideLayouts/slideLayout17.xml><?xml version="1.0" encoding="utf-8"?>
+<p:sldLayout xmlns:a="http://schemas.openxmlformats.org/drawingml/2006/main" xmlns:r="http://schemas.openxmlformats.org/officeDocument/2006/relationships" xmlns:p="http://schemas.openxmlformats.org/presentationml/2006/main" preserve="1" userDrawn="1">
+  <p:cSld name="3_Titel en object">
+    <p:spTree>
+      <p:nvGrpSpPr>
+        <p:cNvPr id="1" name=""/>
+        <p:cNvGrpSpPr/>
+        <p:nvPr/>
+      </p:nvGrpSpPr>
+      <p:grpSpPr>
+        <a:xfrm>
+          <a:off x="0" y="0"/>
+          <a:ext cx="0" cy="0"/>
+          <a:chOff x="0" y="0"/>
+          <a:chExt cx="0" cy="0"/>
+        </a:xfrm>
+      </p:grpSpPr>
+      <p:sp>
+        <p:nvSpPr>
+          <p:cNvPr id="2" name="Title 1"/>
+          <p:cNvSpPr>
+            <a:spLocks noGrp="1"/>
+          </p:cNvSpPr>
+          <p:nvPr>
+            <p:ph type="title"/>
+          </p:nvPr>
+        </p:nvSpPr>
+        <p:spPr/>
+        <p:txBody>
+          <a:bodyPr/>
+          <a:lstStyle/>
+          <a:p>
+            <a:r>
+              <a:rPr lang="nl-NL"/>
+              <a:t>Klik om stijl te bewerken</a:t>
+            </a:r>
+            <a:endParaRPr lang="en-US" dirty="0"/>
+          </a:p>
+        </p:txBody>
+      </p:sp>
+      <p:sp>
+        <p:nvSpPr>
+          <p:cNvPr id="4" name="Tijdelijke aanduiding voor grafiek 3">
+            <a:extLst>
+              <a:ext uri="{FF2B5EF4-FFF2-40B4-BE49-F238E27FC236}">
+                <a16:creationId xmlns:a16="http://schemas.microsoft.com/office/drawing/2014/main" id="{DF69D003-E69C-41B7-BEF3-1328288ABCBF}"/>
+              </a:ext>
+            </a:extLst>
+          </p:cNvPr>
+          <p:cNvSpPr>
+            <a:spLocks noGrp="1"/>
+          </p:cNvSpPr>
+          <p:nvPr>
+            <p:ph type="chart" sz="quarter" idx="10"/>
+          </p:nvPr>
+        </p:nvSpPr>
+        <p:spPr>
+          <a:xfrm>
+            <a:off x="838200" y="1226012"/>
+            <a:ext cx="10515600" cy="5470525"/>
+          </a:xfrm>
+        </p:spPr>
+        <p:txBody>
+          <a:bodyPr/>
+          <a:lstStyle/>
+          <a:p>
+            <a:endParaRPr lang="en-GB"/>
+          </a:p>
+        </p:txBody>
+      </p:sp>
+    </p:spTree>
+    <p:extLst>
+      <p:ext uri="{BB962C8B-B14F-4D97-AF65-F5344CB8AC3E}">
+        <p14:creationId xmlns:p14="http://schemas.microsoft.com/office/powerpoint/2010/main" val="2560801024"/>
+      </p:ext>
+    </p:extLst>
+  </p:cSld>
+  <p:clrMapOvr>
+    <a:masterClrMapping/>
+  </p:clrMapOvr>
 </p:sldLayout>
 </file>
 
@@ -5336,6 +5419,7 @@
     <p:sldLayoutId id="2147483686" r:id="rId14"/>
     <p:sldLayoutId id="2147483687" r:id="rId15"/>
     <p:sldLayoutId id="2147483688" r:id="rId16"/>
+    <p:sldLayoutId id="2147483689" r:id="rId17"/>
   </p:sldLayoutIdLst>
   <p:hf hdr="0" ftr="0" dt="0"/>
   <p:txStyles>

</xml_diff>

<commit_message>
Changed colour scheme of ppt template to Aspect
</commit_message>
<xml_diff>
--- a/data/powerpoint/template.pptx
+++ b/data/powerpoint/template.pptx
@@ -197,7 +197,7 @@
           <a:p>
             <a:fld id="{FEE386D4-E0F5-48ED-B382-C5D6AB88A5B0}" type="datetimeFigureOut">
               <a:rPr lang="en-GB" smtClean="0"/>
-              <a:t>21/08/2018</a:t>
+              <a:t>22/08/2018</a:t>
             </a:fld>
             <a:endParaRPr lang="en-GB"/>
           </a:p>
@@ -5750,7 +5750,7 @@
 <file path=ppt/theme/theme1.xml><?xml version="1.0" encoding="utf-8"?>
 <a:theme xmlns:a="http://schemas.openxmlformats.org/drawingml/2006/main" name="Office Theme">
   <a:themeElements>
-    <a:clrScheme name="Kantoorthema">
+    <a:clrScheme name="Aspect">
       <a:dk1>
         <a:sysClr val="windowText" lastClr="000000"/>
       </a:dk1>
@@ -5758,34 +5758,34 @@
         <a:sysClr val="window" lastClr="FFFFFF"/>
       </a:lt1>
       <a:dk2>
-        <a:srgbClr val="44546A"/>
+        <a:srgbClr val="323232"/>
       </a:dk2>
       <a:lt2>
-        <a:srgbClr val="E7E6E6"/>
+        <a:srgbClr val="E3DED1"/>
       </a:lt2>
       <a:accent1>
-        <a:srgbClr val="4472C4"/>
+        <a:srgbClr val="F07F09"/>
       </a:accent1>
       <a:accent2>
-        <a:srgbClr val="ED7D31"/>
+        <a:srgbClr val="9F2936"/>
       </a:accent2>
       <a:accent3>
-        <a:srgbClr val="A5A5A5"/>
+        <a:srgbClr val="1B587C"/>
       </a:accent3>
       <a:accent4>
-        <a:srgbClr val="FFC000"/>
+        <a:srgbClr val="4E8542"/>
       </a:accent4>
       <a:accent5>
-        <a:srgbClr val="5B9BD5"/>
+        <a:srgbClr val="604878"/>
       </a:accent5>
       <a:accent6>
-        <a:srgbClr val="70AD47"/>
+        <a:srgbClr val="C19859"/>
       </a:accent6>
       <a:hlink>
-        <a:srgbClr val="0563C1"/>
+        <a:srgbClr val="6B9F25"/>
       </a:hlink>
       <a:folHlink>
-        <a:srgbClr val="954F72"/>
+        <a:srgbClr val="B26B02"/>
       </a:folHlink>
     </a:clrScheme>
     <a:fontScheme name="Kantoorthema">

</xml_diff>

<commit_message>
Made the template have more room for titles (especially in chart slides)
</commit_message>
<xml_diff>
--- a/data/powerpoint/template.pptx
+++ b/data/powerpoint/template.pptx
@@ -1329,8 +1329,8 @@
         </p:nvSpPr>
         <p:spPr>
           <a:xfrm>
-            <a:off x="839788" y="365125"/>
-            <a:ext cx="10515600" cy="774000"/>
+            <a:off x="839788" y="365124"/>
+            <a:ext cx="10515600" cy="823911"/>
           </a:xfrm>
         </p:spPr>
         <p:txBody>
@@ -1926,7 +1926,7 @@
         <p:spPr>
           <a:xfrm>
             <a:off x="839788" y="365125"/>
-            <a:ext cx="10515600" cy="774000"/>
+            <a:ext cx="10515600" cy="823912"/>
           </a:xfrm>
         </p:spPr>
         <p:txBody>
@@ -3019,7 +3019,12 @@
             <p:ph type="title"/>
           </p:nvPr>
         </p:nvSpPr>
-        <p:spPr/>
+        <p:spPr>
+          <a:xfrm>
+            <a:off x="838200" y="365125"/>
+            <a:ext cx="10515600" cy="973223"/>
+          </a:xfrm>
+        </p:spPr>
         <p:txBody>
           <a:bodyPr/>
           <a:lstStyle/>
@@ -3050,8 +3055,8 @@
         </p:nvSpPr>
         <p:spPr>
           <a:xfrm>
-            <a:off x="838200" y="1226012"/>
-            <a:ext cx="10515600" cy="5470525"/>
+            <a:off x="838200" y="1413163"/>
+            <a:ext cx="10515600" cy="5283373"/>
           </a:xfrm>
         </p:spPr>
         <p:txBody>
@@ -3558,7 +3563,7 @@
         <p:spPr>
           <a:xfrm>
             <a:off x="839788" y="365125"/>
-            <a:ext cx="10515600" cy="774000"/>
+            <a:ext cx="10515600" cy="898410"/>
           </a:xfrm>
         </p:spPr>
         <p:txBody>
@@ -3585,8 +3590,8 @@
         </p:nvSpPr>
         <p:spPr>
           <a:xfrm>
-            <a:off x="839788" y="1185863"/>
-            <a:ext cx="5157787" cy="823912"/>
+            <a:off x="839788" y="1263535"/>
+            <a:ext cx="5157787" cy="746240"/>
           </a:xfrm>
         </p:spPr>
         <p:txBody>
@@ -3632,7 +3637,7 @@
           <a:p>
             <a:pPr lvl="0"/>
             <a:r>
-              <a:rPr lang="nl-NL"/>
+              <a:rPr lang="nl-NL" dirty="0"/>
               <a:t>Tekststijl van het model bewerken</a:t>
             </a:r>
           </a:p>
@@ -3707,8 +3712,8 @@
         </p:nvSpPr>
         <p:spPr>
           <a:xfrm>
-            <a:off x="6172200" y="1185863"/>
-            <a:ext cx="5183188" cy="823912"/>
+            <a:off x="6172200" y="1263535"/>
+            <a:ext cx="5183188" cy="746240"/>
           </a:xfrm>
         </p:spPr>
         <p:txBody>
@@ -5265,7 +5270,7 @@
         <p:spPr>
           <a:xfrm>
             <a:off x="838200" y="365126"/>
-            <a:ext cx="10515600" cy="773863"/>
+            <a:ext cx="10515600" cy="902200"/>
           </a:xfrm>
           <a:prstGeom prst="rect">
             <a:avLst/>
@@ -5297,8 +5302,8 @@
         </p:nvSpPr>
         <p:spPr>
           <a:xfrm>
-            <a:off x="838200" y="1267326"/>
-            <a:ext cx="10515600" cy="5499234"/>
+            <a:off x="838200" y="1354974"/>
+            <a:ext cx="10515600" cy="5411585"/>
           </a:xfrm>
           <a:prstGeom prst="rect">
             <a:avLst/>
@@ -5312,35 +5317,35 @@
           <a:p>
             <a:pPr lvl="0"/>
             <a:r>
-              <a:rPr lang="nl-NL"/>
+              <a:rPr lang="nl-NL" dirty="0"/>
               <a:t>Tekststijl van het model bewerken</a:t>
             </a:r>
           </a:p>
           <a:p>
             <a:pPr lvl="1"/>
             <a:r>
-              <a:rPr lang="nl-NL"/>
+              <a:rPr lang="nl-NL" dirty="0"/>
               <a:t>Tweede niveau</a:t>
             </a:r>
           </a:p>
           <a:p>
             <a:pPr lvl="2"/>
             <a:r>
-              <a:rPr lang="nl-NL"/>
+              <a:rPr lang="nl-NL" dirty="0"/>
               <a:t>Derde niveau</a:t>
             </a:r>
           </a:p>
           <a:p>
             <a:pPr lvl="3"/>
             <a:r>
-              <a:rPr lang="nl-NL"/>
+              <a:rPr lang="nl-NL" dirty="0"/>
               <a:t>Vierde niveau</a:t>
             </a:r>
           </a:p>
           <a:p>
             <a:pPr lvl="4"/>
             <a:r>
-              <a:rPr lang="nl-NL"/>
+              <a:rPr lang="nl-NL" dirty="0"/>
               <a:t>Vijfde niveau</a:t>
             </a:r>
             <a:endParaRPr lang="en-US" dirty="0"/>

</xml_diff>

<commit_message>
Updated position of charts
</commit_message>
<xml_diff>
--- a/data/powerpoint/template.pptx
+++ b/data/powerpoint/template.pptx
@@ -197,7 +197,7 @@
           <a:p>
             <a:fld id="{FEE386D4-E0F5-48ED-B382-C5D6AB88A5B0}" type="datetimeFigureOut">
               <a:rPr lang="en-GB" smtClean="0"/>
-              <a:t>22/08/2018</a:t>
+              <a:t>23/08/2018</a:t>
             </a:fld>
             <a:endParaRPr lang="en-GB"/>
           </a:p>
@@ -3021,8 +3021,8 @@
         </p:nvSpPr>
         <p:spPr>
           <a:xfrm>
-            <a:off x="838200" y="365125"/>
-            <a:ext cx="10515600" cy="973223"/>
+            <a:off x="1088967" y="365124"/>
+            <a:ext cx="10033462" cy="1147791"/>
           </a:xfrm>
         </p:spPr>
         <p:txBody>
@@ -3055,8 +3055,8 @@
         </p:nvSpPr>
         <p:spPr>
           <a:xfrm>
-            <a:off x="838200" y="1413163"/>
-            <a:ext cx="10515600" cy="5283373"/>
+            <a:off x="1088967" y="1720735"/>
+            <a:ext cx="10033462" cy="4854632"/>
           </a:xfrm>
         </p:spPr>
         <p:txBody>

</xml_diff>

<commit_message>
Made the powerpoint template have smaller tiles, to make the content more focused
</commit_message>
<xml_diff>
--- a/data/powerpoint/template.pptx
+++ b/data/powerpoint/template.pptx
@@ -197,7 +197,7 @@
           <a:p>
             <a:fld id="{FEE386D4-E0F5-48ED-B382-C5D6AB88A5B0}" type="datetimeFigureOut">
               <a:rPr lang="en-GB" smtClean="0"/>
-              <a:t>23/08/2018</a:t>
+              <a:t>04/09/2018</a:t>
             </a:fld>
             <a:endParaRPr lang="en-GB"/>
           </a:p>
@@ -499,10 +499,12 @@
           </a:xfrm>
         </p:spPr>
         <p:txBody>
-          <a:bodyPr anchor="b"/>
+          <a:bodyPr anchor="b">
+            <a:normAutofit/>
+          </a:bodyPr>
           <a:lstStyle>
             <a:lvl1pPr algn="ctr">
-              <a:defRPr sz="6000"/>
+              <a:defRPr sz="5400"/>
             </a:lvl1pPr>
           </a:lstStyle>
           <a:p>
@@ -531,11 +533,13 @@
           </a:xfrm>
         </p:spPr>
         <p:txBody>
-          <a:bodyPr/>
+          <a:bodyPr>
+            <a:normAutofit/>
+          </a:bodyPr>
           <a:lstStyle>
             <a:lvl1pPr marL="0" indent="0" algn="ctr">
               <a:buNone/>
-              <a:defRPr sz="2400" i="1">
+              <a:defRPr sz="2400" i="0">
                 <a:solidFill>
                   <a:schemeClr val="tx1">
                     <a:lumMod val="75000"/>
@@ -5437,7 +5441,7 @@
           <a:spcPct val="0"/>
         </a:spcBef>
         <a:buNone/>
-        <a:defRPr sz="4400" kern="1200">
+        <a:defRPr sz="2800" kern="1200">
           <a:solidFill>
             <a:schemeClr val="tx1"/>
           </a:solidFill>
@@ -5464,7 +5468,7 @@
         </a:spcBef>
         <a:buFont typeface="Arial" panose="020B0604020202020204" pitchFamily="34" charset="0"/>
         <a:buChar char="•"/>
-        <a:defRPr sz="2800" kern="1200">
+        <a:defRPr sz="3200" kern="1200">
           <a:solidFill>
             <a:schemeClr val="tx1"/>
           </a:solidFill>
@@ -5489,7 +5493,7 @@
         </a:spcBef>
         <a:buFont typeface="Arial" panose="020B0604020202020204" pitchFamily="34" charset="0"/>
         <a:buChar char="•"/>
-        <a:defRPr sz="2400" kern="1200">
+        <a:defRPr sz="2800" kern="1200">
           <a:solidFill>
             <a:schemeClr val="tx1"/>
           </a:solidFill>
@@ -5514,7 +5518,7 @@
         </a:spcBef>
         <a:buFont typeface="Arial" panose="020B0604020202020204" pitchFamily="34" charset="0"/>
         <a:buChar char="•"/>
-        <a:defRPr sz="2000" kern="1200">
+        <a:defRPr sz="2400" kern="1200">
           <a:solidFill>
             <a:schemeClr val="tx1"/>
           </a:solidFill>
@@ -5539,7 +5543,7 @@
         </a:spcBef>
         <a:buFont typeface="Arial" panose="020B0604020202020204" pitchFamily="34" charset="0"/>
         <a:buChar char="•"/>
-        <a:defRPr sz="1800" kern="1200">
+        <a:defRPr sz="2000" kern="1200">
           <a:solidFill>
             <a:schemeClr val="tx1"/>
           </a:solidFill>
@@ -5564,7 +5568,7 @@
         </a:spcBef>
         <a:buFont typeface="Arial" panose="020B0604020202020204" pitchFamily="34" charset="0"/>
         <a:buChar char="•"/>
-        <a:defRPr sz="1800" kern="1200">
+        <a:defRPr sz="2000" kern="1200">
           <a:solidFill>
             <a:schemeClr val="tx1"/>
           </a:solidFill>

</xml_diff>